<commit_message>
Mise à jour manuel pour version finale
</commit_message>
<xml_diff>
--- a/AppPublication/Documentation/PublicationSuiviCompetition - Manuel d'utilisation.pptx
+++ b/AppPublication/Documentation/PublicationSuiviCompetition - Manuel d'utilisation.pptx
@@ -8,10 +8,10 @@
     <p:sldMasterId id="2147483809" r:id="rId7"/>
   </p:sldMasterIdLst>
   <p:notesMasterIdLst>
-    <p:notesMasterId r:id="rId42"/>
+    <p:notesMasterId r:id="rId44"/>
   </p:notesMasterIdLst>
   <p:handoutMasterIdLst>
-    <p:handoutMasterId r:id="rId43"/>
+    <p:handoutMasterId r:id="rId45"/>
   </p:handoutMasterIdLst>
   <p:sldIdLst>
     <p:sldId id="293" r:id="rId8"/>
@@ -37,17 +37,19 @@
     <p:sldId id="324" r:id="rId28"/>
     <p:sldId id="311" r:id="rId29"/>
     <p:sldId id="312" r:id="rId30"/>
-    <p:sldId id="303" r:id="rId31"/>
-    <p:sldId id="304" r:id="rId32"/>
-    <p:sldId id="306" r:id="rId33"/>
-    <p:sldId id="326" r:id="rId34"/>
-    <p:sldId id="329" r:id="rId35"/>
-    <p:sldId id="327" r:id="rId36"/>
-    <p:sldId id="328" r:id="rId37"/>
-    <p:sldId id="330" r:id="rId38"/>
-    <p:sldId id="331" r:id="rId39"/>
-    <p:sldId id="332" r:id="rId40"/>
-    <p:sldId id="297" r:id="rId41"/>
+    <p:sldId id="334" r:id="rId31"/>
+    <p:sldId id="335" r:id="rId32"/>
+    <p:sldId id="303" r:id="rId33"/>
+    <p:sldId id="304" r:id="rId34"/>
+    <p:sldId id="306" r:id="rId35"/>
+    <p:sldId id="326" r:id="rId36"/>
+    <p:sldId id="329" r:id="rId37"/>
+    <p:sldId id="327" r:id="rId38"/>
+    <p:sldId id="328" r:id="rId39"/>
+    <p:sldId id="330" r:id="rId40"/>
+    <p:sldId id="331" r:id="rId41"/>
+    <p:sldId id="332" r:id="rId42"/>
+    <p:sldId id="297" r:id="rId43"/>
   </p:sldIdLst>
   <p:sldSz cx="12192000" cy="6858000"/>
   <p:notesSz cx="6858000" cy="9144000"/>
@@ -262,7 +264,7 @@
           <a:p>
             <a:fld id="{2FC9C06B-3A03-409A-B425-472FC6ED632E}" type="datetimeFigureOut">
               <a:rPr lang="fr-FR" smtClean="0"/>
-              <a:t>16/03/2024</a:t>
+              <a:t>18/04/2024</a:t>
             </a:fld>
             <a:endParaRPr lang="fr-FR"/>
           </a:p>
@@ -439,7 +441,7 @@
           <a:p>
             <a:fld id="{1BF3F09E-A5E2-4FD2-AA48-324D4F0E8F41}" type="datetimeFigureOut">
               <a:rPr lang="fr"/>
-              <a:t>16/03/2024</a:t>
+              <a:t>18/04/2024</a:t>
             </a:fld>
             <a:endParaRPr lang="en-US"/>
           </a:p>
@@ -15903,7 +15905,7 @@
                 </a:solidFill>
                 <a:latin typeface="Montserrat" panose="00000800000000000000" pitchFamily="2" charset="0"/>
               </a:rPr>
-              <a:t>v1.2.1.0 – xx/04/2024 </a:t>
+              <a:t>v1.2.1.0 – 20/04/2024 </a:t>
             </a:r>
           </a:p>
         </p:txBody>
@@ -17563,7 +17565,7 @@
                 </a:solidFill>
                 <a:latin typeface="Montserrat" panose="00000800000000000000" pitchFamily="2" charset="0"/>
               </a:rPr>
-              <a:t>v1.2.1.0 – xx/04/2024 </a:t>
+              <a:t>v1.2.1.0 – 20/04/2024 </a:t>
             </a:r>
           </a:p>
         </p:txBody>
@@ -25008,7 +25010,7 @@
           <a:p>
             <a:r>
               <a:rPr lang="fr-FR" sz="1400" dirty="0"/>
-              <a:t>Disposer des informations de connexion FTP de votre fournisseur</a:t>
+              <a:t>Disposer des informations de connexion FTP de votre hébergeur</a:t>
             </a:r>
           </a:p>
           <a:p>
@@ -27176,17 +27178,17 @@
           <a:p>
             <a:r>
               <a:rPr lang="fr-FR" dirty="0"/>
-              <a:t>Problème de génération</a:t>
-            </a:r>
-          </a:p>
-        </p:txBody>
-      </p:sp>
-      <p:sp>
-        <p:nvSpPr>
-          <p:cNvPr id="3" name="Espace réservé du texte 2">
-            <a:extLst>
-              <a:ext uri="{FF2B5EF4-FFF2-40B4-BE49-F238E27FC236}">
-                <a16:creationId xmlns:a16="http://schemas.microsoft.com/office/drawing/2014/main" id="{697918DB-A234-7002-388D-E181D0CF7603}"/>
+              <a:t>Eléments à contrôler - Génération</a:t>
+            </a:r>
+          </a:p>
+        </p:txBody>
+      </p:sp>
+      <p:sp>
+        <p:nvSpPr>
+          <p:cNvPr id="10" name="Espace réservé du texte 9">
+            <a:extLst>
+              <a:ext uri="{FF2B5EF4-FFF2-40B4-BE49-F238E27FC236}">
+                <a16:creationId xmlns:a16="http://schemas.microsoft.com/office/drawing/2014/main" id="{CF3C03EA-DDD4-445D-9A36-DC7D32FDA7A4}"/>
               </a:ext>
             </a:extLst>
           </p:cNvPr>
@@ -27199,120 +27201,20 @@
         </p:nvSpPr>
         <p:spPr>
           <a:xfrm>
-            <a:off x="422693" y="1858075"/>
-            <a:ext cx="11369615" cy="4552249"/>
-          </a:xfrm>
-        </p:spPr>
-        <p:txBody>
-          <a:bodyPr>
-            <a:normAutofit fontScale="85000" lnSpcReduction="20000"/>
-          </a:bodyPr>
+            <a:off x="270763" y="1580233"/>
+            <a:ext cx="11797412" cy="448592"/>
+          </a:xfrm>
+        </p:spPr>
+        <p:txBody>
+          <a:bodyPr/>
           <a:lstStyle/>
           <a:p>
-            <a:r>
-              <a:rPr lang="fr-FR" sz="1800" i="1" dirty="0"/>
-              <a:t>Etat de la connexion au serveur de compétition</a:t>
-            </a:r>
-          </a:p>
-          <a:p>
-            <a:r>
-              <a:rPr lang="fr-FR" sz="1800" i="1" dirty="0"/>
-              <a:t>Message d’erreur</a:t>
-            </a:r>
-          </a:p>
-          <a:p>
-            <a:r>
-              <a:rPr lang="fr-FR" sz="1800" i="1" dirty="0"/>
-              <a:t>Fréquence de génération</a:t>
-            </a:r>
-          </a:p>
-          <a:p>
-            <a:r>
-              <a:rPr lang="fr-FR" sz="1800" i="1" dirty="0"/>
-              <a:t>Mauvaise configuration (répertoire temp inexistant ou inaccessible)</a:t>
-            </a:r>
-          </a:p>
-          <a:p>
-            <a:endParaRPr lang="fr-FR" sz="1800" i="1" dirty="0"/>
-          </a:p>
-          <a:p>
-            <a:r>
-              <a:rPr lang="fr-FR" sz="1800" i="1" dirty="0"/>
-              <a:t>Publication locale</a:t>
-            </a:r>
-          </a:p>
-          <a:p>
-            <a:pPr lvl="1"/>
-            <a:r>
-              <a:rPr lang="fr-FR" sz="2200" i="1" dirty="0"/>
-              <a:t>Mauvaise interface réseau</a:t>
-            </a:r>
-          </a:p>
-          <a:p>
-            <a:pPr lvl="1"/>
-            <a:r>
-              <a:rPr lang="fr-FR" sz="2200" i="1" dirty="0"/>
-              <a:t>Publication arrêtée</a:t>
-            </a:r>
-          </a:p>
-          <a:p>
-            <a:pPr lvl="1"/>
-            <a:r>
-              <a:rPr lang="fr-FR" sz="2200" i="1" dirty="0" err="1"/>
-              <a:t>Parefeu</a:t>
-            </a:r>
-            <a:r>
-              <a:rPr lang="fr-FR" sz="2200" i="1" dirty="0"/>
-              <a:t> Windows</a:t>
-            </a:r>
-          </a:p>
-          <a:p>
-            <a:r>
-              <a:rPr lang="fr-FR" sz="1800" i="1" dirty="0"/>
-              <a:t>Publication distante</a:t>
-            </a:r>
-          </a:p>
-          <a:p>
-            <a:pPr lvl="1"/>
-            <a:r>
-              <a:rPr lang="fr-FR" sz="2200" i="1" dirty="0"/>
-              <a:t>Mode FTP</a:t>
-            </a:r>
-          </a:p>
-          <a:p>
-            <a:pPr lvl="1"/>
-            <a:r>
-              <a:rPr lang="fr-FR" sz="2200" i="1" dirty="0" err="1"/>
-              <a:t>Parefeu</a:t>
-            </a:r>
-            <a:endParaRPr lang="fr-FR" sz="2200" i="1" dirty="0"/>
-          </a:p>
-          <a:p>
-            <a:pPr lvl="1"/>
-            <a:r>
-              <a:rPr lang="fr-FR" sz="2200" i="1" dirty="0"/>
-              <a:t>Login/MDP</a:t>
-            </a:r>
-          </a:p>
-          <a:p>
-            <a:pPr lvl="1"/>
-            <a:r>
-              <a:rPr lang="fr-FR" sz="2200" i="1" dirty="0"/>
-              <a:t>Répertoires distant incorrects</a:t>
-            </a:r>
-          </a:p>
-          <a:p>
-            <a:pPr lvl="1"/>
-            <a:r>
-              <a:rPr lang="fr-FR" sz="2200" i="1" dirty="0"/>
-              <a:t>Nombre de connexion simultanée</a:t>
-            </a:r>
-          </a:p>
-          <a:p>
-            <a:pPr lvl="1"/>
-            <a:r>
-              <a:rPr lang="fr-FR" sz="2200" i="1" dirty="0"/>
-              <a:t>Pb de certificat</a:t>
+            <a:pPr marL="101598" indent="0">
+              <a:buNone/>
+            </a:pPr>
+            <a:r>
+              <a:rPr lang="fr-FR" sz="1800" dirty="0"/>
+              <a:t>Si vous constatez que les données ne sont pas publiées ou ne sont pas actualisées, vérifiez les points suivants:</a:t>
             </a:r>
           </a:p>
         </p:txBody>
@@ -27345,6 +27247,331 @@
           </a:p>
         </p:txBody>
       </p:sp>
+      <p:graphicFrame>
+        <p:nvGraphicFramePr>
+          <p:cNvPr id="7" name="Tableau 6">
+            <a:extLst>
+              <a:ext uri="{FF2B5EF4-FFF2-40B4-BE49-F238E27FC236}">
+                <a16:creationId xmlns:a16="http://schemas.microsoft.com/office/drawing/2014/main" id="{C142FFEE-659B-6571-73CA-6E3D3E5DB0D6}"/>
+              </a:ext>
+            </a:extLst>
+          </p:cNvPr>
+          <p:cNvGraphicFramePr>
+            <a:graphicFrameLocks noGrp="1"/>
+          </p:cNvGraphicFramePr>
+          <p:nvPr>
+            <p:extLst>
+              <p:ext uri="{D42A27DB-BD31-4B8C-83A1-F6EECF244321}">
+                <p14:modId xmlns:p14="http://schemas.microsoft.com/office/powerpoint/2010/main" val="615822682"/>
+              </p:ext>
+            </p:extLst>
+          </p:nvPr>
+        </p:nvGraphicFramePr>
+        <p:xfrm>
+          <a:off x="270763" y="2017468"/>
+          <a:ext cx="11549762" cy="3768017"/>
+        </p:xfrm>
+        <a:graphic>
+          <a:graphicData uri="http://schemas.openxmlformats.org/drawingml/2006/table">
+            <a:tbl>
+              <a:tblPr firstRow="1" bandRow="1">
+                <a:tableStyleId>{5C22544A-7EE6-4342-B048-85BDC9FD1C3A}</a:tableStyleId>
+              </a:tblPr>
+              <a:tblGrid>
+                <a:gridCol w="5605364">
+                  <a:extLst>
+                    <a:ext uri="{9D8B030D-6E8A-4147-A177-3AD203B41FA5}">
+                      <a16:colId xmlns:a16="http://schemas.microsoft.com/office/drawing/2014/main" val="1181157168"/>
+                    </a:ext>
+                  </a:extLst>
+                </a:gridCol>
+                <a:gridCol w="5944398">
+                  <a:extLst>
+                    <a:ext uri="{9D8B030D-6E8A-4147-A177-3AD203B41FA5}">
+                      <a16:colId xmlns:a16="http://schemas.microsoft.com/office/drawing/2014/main" val="3916079968"/>
+                    </a:ext>
+                  </a:extLst>
+                </a:gridCol>
+              </a:tblGrid>
+              <a:tr h="370840">
+                <a:tc>
+                  <a:txBody>
+                    <a:bodyPr/>
+                    <a:lstStyle/>
+                    <a:p>
+                      <a:r>
+                        <a:rPr lang="fr-FR" dirty="0"/>
+                        <a:t>Contrôle</a:t>
+                      </a:r>
+                    </a:p>
+                  </a:txBody>
+                  <a:tcPr anchor="ctr"/>
+                </a:tc>
+                <a:tc>
+                  <a:txBody>
+                    <a:bodyPr/>
+                    <a:lstStyle/>
+                    <a:p>
+                      <a:r>
+                        <a:rPr lang="fr-FR" dirty="0"/>
+                        <a:t>Que faire</a:t>
+                      </a:r>
+                    </a:p>
+                  </a:txBody>
+                  <a:tcPr anchor="ctr"/>
+                </a:tc>
+                <a:extLst>
+                  <a:ext uri="{0D108BD9-81ED-4DB2-BD59-A6C34878D82A}">
+                    <a16:rowId xmlns:a16="http://schemas.microsoft.com/office/drawing/2014/main" val="2896649042"/>
+                  </a:ext>
+                </a:extLst>
+              </a:tr>
+              <a:tr h="720770">
+                <a:tc>
+                  <a:txBody>
+                    <a:bodyPr/>
+                    <a:lstStyle/>
+                    <a:p>
+                      <a:r>
+                        <a:rPr lang="fr-FR" dirty="0"/>
+                        <a:t>L’application est connecté au serveur de compétition (icone verte             )</a:t>
+                      </a:r>
+                    </a:p>
+                  </a:txBody>
+                  <a:tcPr anchor="ctr"/>
+                </a:tc>
+                <a:tc>
+                  <a:txBody>
+                    <a:bodyPr/>
+                    <a:lstStyle/>
+                    <a:p>
+                      <a:r>
+                        <a:rPr lang="fr-FR" dirty="0"/>
+                        <a:t>Reconnectez l’application au serveur</a:t>
+                      </a:r>
+                    </a:p>
+                  </a:txBody>
+                  <a:tcPr anchor="ctr"/>
+                </a:tc>
+                <a:extLst>
+                  <a:ext uri="{0D108BD9-81ED-4DB2-BD59-A6C34878D82A}">
+                    <a16:rowId xmlns:a16="http://schemas.microsoft.com/office/drawing/2014/main" val="2586581298"/>
+                  </a:ext>
+                </a:extLst>
+              </a:tr>
+              <a:tr h="481847">
+                <a:tc>
+                  <a:txBody>
+                    <a:bodyPr/>
+                    <a:lstStyle/>
+                    <a:p>
+                      <a:r>
+                        <a:rPr lang="fr-FR" dirty="0"/>
+                        <a:t>La génération est démarrée</a:t>
+                      </a:r>
+                    </a:p>
+                  </a:txBody>
+                  <a:tcPr anchor="ctr"/>
+                </a:tc>
+                <a:tc>
+                  <a:txBody>
+                    <a:bodyPr/>
+                    <a:lstStyle/>
+                    <a:p>
+                      <a:r>
+                        <a:rPr lang="fr-FR" dirty="0"/>
+                        <a:t>Démarrez la génération</a:t>
+                      </a:r>
+                    </a:p>
+                  </a:txBody>
+                  <a:tcPr anchor="ctr"/>
+                </a:tc>
+                <a:extLst>
+                  <a:ext uri="{0D108BD9-81ED-4DB2-BD59-A6C34878D82A}">
+                    <a16:rowId xmlns:a16="http://schemas.microsoft.com/office/drawing/2014/main" val="2578065560"/>
+                  </a:ext>
+                </a:extLst>
+              </a:tr>
+              <a:tr h="370840">
+                <a:tc>
+                  <a:txBody>
+                    <a:bodyPr/>
+                    <a:lstStyle/>
+                    <a:p>
+                      <a:r>
+                        <a:rPr lang="fr-FR" dirty="0"/>
+                        <a:t>Absence de message d’erreur</a:t>
+                      </a:r>
+                    </a:p>
+                  </a:txBody>
+                  <a:tcPr anchor="ctr"/>
+                </a:tc>
+                <a:tc>
+                  <a:txBody>
+                    <a:bodyPr/>
+                    <a:lstStyle/>
+                    <a:p>
+                      <a:r>
+                        <a:rPr lang="fr-FR" dirty="0"/>
+                        <a:t>Fermez la fenêtre d’erreur. Si l’erreur persiste ou si l’application ne fonctionne pas correctement, relancez cette dernière</a:t>
+                      </a:r>
+                    </a:p>
+                  </a:txBody>
+                  <a:tcPr anchor="ctr"/>
+                </a:tc>
+                <a:extLst>
+                  <a:ext uri="{0D108BD9-81ED-4DB2-BD59-A6C34878D82A}">
+                    <a16:rowId xmlns:a16="http://schemas.microsoft.com/office/drawing/2014/main" val="2675461195"/>
+                  </a:ext>
+                </a:extLst>
+              </a:tr>
+              <a:tr h="370840">
+                <a:tc>
+                  <a:txBody>
+                    <a:bodyPr/>
+                    <a:lstStyle/>
+                    <a:p>
+                      <a:r>
+                        <a:rPr lang="fr-FR" dirty="0"/>
+                        <a:t>La fréquence de mise à jour est trop faible</a:t>
+                      </a:r>
+                    </a:p>
+                  </a:txBody>
+                  <a:tcPr anchor="ctr"/>
+                </a:tc>
+                <a:tc>
+                  <a:txBody>
+                    <a:bodyPr/>
+                    <a:lstStyle/>
+                    <a:p>
+                      <a:r>
+                        <a:rPr lang="fr-FR" dirty="0"/>
+                        <a:t>Arrêtez la génération, modifiez le délai de génération et redémarrez la génération.</a:t>
+                      </a:r>
+                    </a:p>
+                  </a:txBody>
+                  <a:tcPr anchor="ctr"/>
+                </a:tc>
+                <a:extLst>
+                  <a:ext uri="{0D108BD9-81ED-4DB2-BD59-A6C34878D82A}">
+                    <a16:rowId xmlns:a16="http://schemas.microsoft.com/office/drawing/2014/main" val="2306318331"/>
+                  </a:ext>
+                </a:extLst>
+              </a:tr>
+              <a:tr h="370840">
+                <a:tc>
+                  <a:txBody>
+                    <a:bodyPr/>
+                    <a:lstStyle/>
+                    <a:p>
+                      <a:r>
+                        <a:rPr lang="fr-FR" dirty="0"/>
+                        <a:t>Le répertoire de travail est inaccessible</a:t>
+                      </a:r>
+                    </a:p>
+                  </a:txBody>
+                  <a:tcPr anchor="ctr"/>
+                </a:tc>
+                <a:tc>
+                  <a:txBody>
+                    <a:bodyPr/>
+                    <a:lstStyle/>
+                    <a:p>
+                      <a:pPr marL="0" marR="0" lvl="0" indent="0" algn="l" defTabSz="914400" rtl="0" eaLnBrk="1" fontAlgn="auto" latinLnBrk="0" hangingPunct="1">
+                        <a:lnSpc>
+                          <a:spcPct val="100000"/>
+                        </a:lnSpc>
+                        <a:spcBef>
+                          <a:spcPts val="0"/>
+                        </a:spcBef>
+                        <a:spcAft>
+                          <a:spcPts val="0"/>
+                        </a:spcAft>
+                        <a:buClrTx/>
+                        <a:buSzTx/>
+                        <a:buFontTx/>
+                        <a:buNone/>
+                        <a:tabLst/>
+                        <a:defRPr/>
+                      </a:pPr>
+                      <a:r>
+                        <a:rPr lang="fr-FR" dirty="0"/>
+                        <a:t>Arrêtez la génération, modifiez le répertoire de travail et redémarrez la génération.</a:t>
+                      </a:r>
+                    </a:p>
+                  </a:txBody>
+                  <a:tcPr anchor="ctr"/>
+                </a:tc>
+                <a:extLst>
+                  <a:ext uri="{0D108BD9-81ED-4DB2-BD59-A6C34878D82A}">
+                    <a16:rowId xmlns:a16="http://schemas.microsoft.com/office/drawing/2014/main" val="1667609265"/>
+                  </a:ext>
+                </a:extLst>
+              </a:tr>
+            </a:tbl>
+          </a:graphicData>
+        </a:graphic>
+      </p:graphicFrame>
+      <p:pic>
+        <p:nvPicPr>
+          <p:cNvPr id="9" name="Image 8">
+            <a:extLst>
+              <a:ext uri="{FF2B5EF4-FFF2-40B4-BE49-F238E27FC236}">
+                <a16:creationId xmlns:a16="http://schemas.microsoft.com/office/drawing/2014/main" id="{A4B598AD-7E9B-2B25-9A4A-511376C52C7B}"/>
+              </a:ext>
+            </a:extLst>
+          </p:cNvPr>
+          <p:cNvPicPr>
+            <a:picLocks noChangeAspect="1"/>
+          </p:cNvPicPr>
+          <p:nvPr/>
+        </p:nvPicPr>
+        <p:blipFill>
+          <a:blip r:embed="rId2"/>
+          <a:stretch>
+            <a:fillRect/>
+          </a:stretch>
+        </p:blipFill>
+        <p:spPr>
+          <a:xfrm>
+            <a:off x="1504302" y="2726533"/>
+            <a:ext cx="592155" cy="361526"/>
+          </a:xfrm>
+          <a:prstGeom prst="rect">
+            <a:avLst/>
+          </a:prstGeom>
+        </p:spPr>
+      </p:pic>
+      <p:pic>
+        <p:nvPicPr>
+          <p:cNvPr id="14" name="Image 13">
+            <a:extLst>
+              <a:ext uri="{FF2B5EF4-FFF2-40B4-BE49-F238E27FC236}">
+                <a16:creationId xmlns:a16="http://schemas.microsoft.com/office/drawing/2014/main" id="{F0EEA465-103F-046F-E098-6AF471671979}"/>
+              </a:ext>
+            </a:extLst>
+          </p:cNvPr>
+          <p:cNvPicPr>
+            <a:picLocks noChangeAspect="1"/>
+          </p:cNvPicPr>
+          <p:nvPr/>
+        </p:nvPicPr>
+        <p:blipFill>
+          <a:blip r:embed="rId3"/>
+          <a:stretch>
+            <a:fillRect/>
+          </a:stretch>
+        </p:blipFill>
+        <p:spPr>
+          <a:xfrm>
+            <a:off x="3071812" y="3179148"/>
+            <a:ext cx="1161403" cy="354627"/>
+          </a:xfrm>
+          <a:prstGeom prst="rect">
+            <a:avLst/>
+          </a:prstGeom>
+        </p:spPr>
+      </p:pic>
     </p:spTree>
     <p:extLst>
       <p:ext uri="{BB962C8B-B14F-4D97-AF65-F5344CB8AC3E}">
@@ -27377,6 +27604,724 @@
       </p:grpSpPr>
       <p:sp>
         <p:nvSpPr>
+          <p:cNvPr id="2" name="Titre 1">
+            <a:extLst>
+              <a:ext uri="{FF2B5EF4-FFF2-40B4-BE49-F238E27FC236}">
+                <a16:creationId xmlns:a16="http://schemas.microsoft.com/office/drawing/2014/main" id="{EC51AA81-A5DF-3A18-38B6-020B45588EFC}"/>
+              </a:ext>
+            </a:extLst>
+          </p:cNvPr>
+          <p:cNvSpPr>
+            <a:spLocks noGrp="1"/>
+          </p:cNvSpPr>
+          <p:nvPr>
+            <p:ph type="title"/>
+          </p:nvPr>
+        </p:nvSpPr>
+        <p:spPr/>
+        <p:txBody>
+          <a:bodyPr/>
+          <a:lstStyle/>
+          <a:p>
+            <a:r>
+              <a:rPr lang="fr-FR" dirty="0"/>
+              <a:t>Eléments à contrôler – Publication locale</a:t>
+            </a:r>
+          </a:p>
+        </p:txBody>
+      </p:sp>
+      <p:sp>
+        <p:nvSpPr>
+          <p:cNvPr id="10" name="Espace réservé du texte 9">
+            <a:extLst>
+              <a:ext uri="{FF2B5EF4-FFF2-40B4-BE49-F238E27FC236}">
+                <a16:creationId xmlns:a16="http://schemas.microsoft.com/office/drawing/2014/main" id="{CF3C03EA-DDD4-445D-9A36-DC7D32FDA7A4}"/>
+              </a:ext>
+            </a:extLst>
+          </p:cNvPr>
+          <p:cNvSpPr>
+            <a:spLocks noGrp="1"/>
+          </p:cNvSpPr>
+          <p:nvPr>
+            <p:ph type="body" idx="1"/>
+          </p:nvPr>
+        </p:nvSpPr>
+        <p:spPr>
+          <a:xfrm>
+            <a:off x="270763" y="1580233"/>
+            <a:ext cx="11797412" cy="448592"/>
+          </a:xfrm>
+        </p:spPr>
+        <p:txBody>
+          <a:bodyPr/>
+          <a:lstStyle/>
+          <a:p>
+            <a:pPr marL="101598" indent="0">
+              <a:buNone/>
+            </a:pPr>
+            <a:r>
+              <a:rPr lang="fr-FR" sz="1800" dirty="0"/>
+              <a:t>Si vous constatez que le site n’est pas accessible localement, vérifiez les points suivants:</a:t>
+            </a:r>
+          </a:p>
+        </p:txBody>
+      </p:sp>
+      <p:sp>
+        <p:nvSpPr>
+          <p:cNvPr id="4" name="Espace réservé du texte 3">
+            <a:extLst>
+              <a:ext uri="{FF2B5EF4-FFF2-40B4-BE49-F238E27FC236}">
+                <a16:creationId xmlns:a16="http://schemas.microsoft.com/office/drawing/2014/main" id="{6BDCEFA8-59A6-33CC-D69F-6DDA6E4D9636}"/>
+              </a:ext>
+            </a:extLst>
+          </p:cNvPr>
+          <p:cNvSpPr>
+            <a:spLocks noGrp="1"/>
+          </p:cNvSpPr>
+          <p:nvPr>
+            <p:ph type="body" sz="quarter" idx="15"/>
+          </p:nvPr>
+        </p:nvSpPr>
+        <p:spPr/>
+        <p:txBody>
+          <a:bodyPr/>
+          <a:lstStyle/>
+          <a:p>
+            <a:r>
+              <a:rPr lang="fr-FR" dirty="0"/>
+              <a:t>Dépannage</a:t>
+            </a:r>
+          </a:p>
+        </p:txBody>
+      </p:sp>
+      <p:graphicFrame>
+        <p:nvGraphicFramePr>
+          <p:cNvPr id="7" name="Tableau 6">
+            <a:extLst>
+              <a:ext uri="{FF2B5EF4-FFF2-40B4-BE49-F238E27FC236}">
+                <a16:creationId xmlns:a16="http://schemas.microsoft.com/office/drawing/2014/main" id="{C142FFEE-659B-6571-73CA-6E3D3E5DB0D6}"/>
+              </a:ext>
+            </a:extLst>
+          </p:cNvPr>
+          <p:cNvGraphicFramePr>
+            <a:graphicFrameLocks noGrp="1"/>
+          </p:cNvGraphicFramePr>
+          <p:nvPr>
+            <p:extLst>
+              <p:ext uri="{D42A27DB-BD31-4B8C-83A1-F6EECF244321}">
+                <p14:modId xmlns:p14="http://schemas.microsoft.com/office/powerpoint/2010/main" val="2456733157"/>
+              </p:ext>
+            </p:extLst>
+          </p:nvPr>
+        </p:nvGraphicFramePr>
+        <p:xfrm>
+          <a:off x="270763" y="2017468"/>
+          <a:ext cx="11549762" cy="1946202"/>
+        </p:xfrm>
+        <a:graphic>
+          <a:graphicData uri="http://schemas.openxmlformats.org/drawingml/2006/table">
+            <a:tbl>
+              <a:tblPr firstRow="1" bandRow="1">
+                <a:tableStyleId>{5C22544A-7EE6-4342-B048-85BDC9FD1C3A}</a:tableStyleId>
+              </a:tblPr>
+              <a:tblGrid>
+                <a:gridCol w="5605364">
+                  <a:extLst>
+                    <a:ext uri="{9D8B030D-6E8A-4147-A177-3AD203B41FA5}">
+                      <a16:colId xmlns:a16="http://schemas.microsoft.com/office/drawing/2014/main" val="1181157168"/>
+                    </a:ext>
+                  </a:extLst>
+                </a:gridCol>
+                <a:gridCol w="5944398">
+                  <a:extLst>
+                    <a:ext uri="{9D8B030D-6E8A-4147-A177-3AD203B41FA5}">
+                      <a16:colId xmlns:a16="http://schemas.microsoft.com/office/drawing/2014/main" val="3916079968"/>
+                    </a:ext>
+                  </a:extLst>
+                </a:gridCol>
+              </a:tblGrid>
+              <a:tr h="370840">
+                <a:tc>
+                  <a:txBody>
+                    <a:bodyPr/>
+                    <a:lstStyle/>
+                    <a:p>
+                      <a:r>
+                        <a:rPr lang="fr-FR" dirty="0"/>
+                        <a:t>Contrôle</a:t>
+                      </a:r>
+                    </a:p>
+                  </a:txBody>
+                  <a:tcPr anchor="ctr"/>
+                </a:tc>
+                <a:tc>
+                  <a:txBody>
+                    <a:bodyPr/>
+                    <a:lstStyle/>
+                    <a:p>
+                      <a:r>
+                        <a:rPr lang="fr-FR" dirty="0"/>
+                        <a:t>Que faire</a:t>
+                      </a:r>
+                    </a:p>
+                  </a:txBody>
+                  <a:tcPr anchor="ctr"/>
+                </a:tc>
+                <a:extLst>
+                  <a:ext uri="{0D108BD9-81ED-4DB2-BD59-A6C34878D82A}">
+                    <a16:rowId xmlns:a16="http://schemas.microsoft.com/office/drawing/2014/main" val="2896649042"/>
+                  </a:ext>
+                </a:extLst>
+              </a:tr>
+              <a:tr h="564442">
+                <a:tc>
+                  <a:txBody>
+                    <a:bodyPr/>
+                    <a:lstStyle/>
+                    <a:p>
+                      <a:r>
+                        <a:rPr lang="fr-FR" dirty="0"/>
+                        <a:t>La publication locale est démarrée </a:t>
+                      </a:r>
+                    </a:p>
+                  </a:txBody>
+                  <a:tcPr anchor="ctr"/>
+                </a:tc>
+                <a:tc>
+                  <a:txBody>
+                    <a:bodyPr/>
+                    <a:lstStyle/>
+                    <a:p>
+                      <a:r>
+                        <a:rPr lang="fr-FR" dirty="0"/>
+                        <a:t>Démarrez la publication</a:t>
+                      </a:r>
+                    </a:p>
+                  </a:txBody>
+                  <a:tcPr anchor="ctr"/>
+                </a:tc>
+                <a:extLst>
+                  <a:ext uri="{0D108BD9-81ED-4DB2-BD59-A6C34878D82A}">
+                    <a16:rowId xmlns:a16="http://schemas.microsoft.com/office/drawing/2014/main" val="2586581298"/>
+                  </a:ext>
+                </a:extLst>
+              </a:tr>
+              <a:tr h="370840">
+                <a:tc>
+                  <a:txBody>
+                    <a:bodyPr/>
+                    <a:lstStyle/>
+                    <a:p>
+                      <a:r>
+                        <a:rPr lang="fr-FR" dirty="0"/>
+                        <a:t>La publication se fait sur la bonne interface réseau</a:t>
+                      </a:r>
+                    </a:p>
+                  </a:txBody>
+                  <a:tcPr anchor="ctr"/>
+                </a:tc>
+                <a:tc>
+                  <a:txBody>
+                    <a:bodyPr/>
+                    <a:lstStyle/>
+                    <a:p>
+                      <a:r>
+                        <a:rPr lang="fr-FR" dirty="0"/>
+                        <a:t>Arrêtez la publication locale, sélectionnez la bonne interface réseau et démarrez la publication locale</a:t>
+                      </a:r>
+                    </a:p>
+                  </a:txBody>
+                  <a:tcPr anchor="ctr"/>
+                </a:tc>
+                <a:extLst>
+                  <a:ext uri="{0D108BD9-81ED-4DB2-BD59-A6C34878D82A}">
+                    <a16:rowId xmlns:a16="http://schemas.microsoft.com/office/drawing/2014/main" val="4129515051"/>
+                  </a:ext>
+                </a:extLst>
+              </a:tr>
+              <a:tr h="370840">
+                <a:tc>
+                  <a:txBody>
+                    <a:bodyPr/>
+                    <a:lstStyle/>
+                    <a:p>
+                      <a:r>
+                        <a:rPr lang="fr-FR" dirty="0"/>
+                        <a:t>Le pare-feu Windows autorise la l’accès Web</a:t>
+                      </a:r>
+                    </a:p>
+                  </a:txBody>
+                  <a:tcPr anchor="ctr"/>
+                </a:tc>
+                <a:tc>
+                  <a:txBody>
+                    <a:bodyPr/>
+                    <a:lstStyle/>
+                    <a:p>
+                      <a:r>
+                        <a:rPr lang="fr-FR" dirty="0"/>
+                        <a:t>Modifiez la configuration du pare-feu Windows</a:t>
+                      </a:r>
+                    </a:p>
+                  </a:txBody>
+                  <a:tcPr anchor="ctr"/>
+                </a:tc>
+                <a:extLst>
+                  <a:ext uri="{0D108BD9-81ED-4DB2-BD59-A6C34878D82A}">
+                    <a16:rowId xmlns:a16="http://schemas.microsoft.com/office/drawing/2014/main" val="3823118335"/>
+                  </a:ext>
+                </a:extLst>
+              </a:tr>
+            </a:tbl>
+          </a:graphicData>
+        </a:graphic>
+      </p:graphicFrame>
+      <p:pic>
+        <p:nvPicPr>
+          <p:cNvPr id="5" name="Image 4">
+            <a:extLst>
+              <a:ext uri="{FF2B5EF4-FFF2-40B4-BE49-F238E27FC236}">
+                <a16:creationId xmlns:a16="http://schemas.microsoft.com/office/drawing/2014/main" id="{2531E53B-5E15-45CC-78E1-23AF9BBA270E}"/>
+              </a:ext>
+            </a:extLst>
+          </p:cNvPr>
+          <p:cNvPicPr>
+            <a:picLocks noChangeAspect="1"/>
+          </p:cNvPicPr>
+          <p:nvPr/>
+        </p:nvPicPr>
+        <p:blipFill>
+          <a:blip r:embed="rId2"/>
+          <a:stretch>
+            <a:fillRect/>
+          </a:stretch>
+        </p:blipFill>
+        <p:spPr>
+          <a:xfrm>
+            <a:off x="3633787" y="2466060"/>
+            <a:ext cx="1247775" cy="381000"/>
+          </a:xfrm>
+          <a:prstGeom prst="rect">
+            <a:avLst/>
+          </a:prstGeom>
+        </p:spPr>
+      </p:pic>
+    </p:spTree>
+    <p:extLst>
+      <p:ext uri="{BB962C8B-B14F-4D97-AF65-F5344CB8AC3E}">
+        <p14:creationId xmlns:p14="http://schemas.microsoft.com/office/powerpoint/2010/main" val="2100333250"/>
+      </p:ext>
+    </p:extLst>
+  </p:cSld>
+  <p:clrMapOvr>
+    <a:masterClrMapping/>
+  </p:clrMapOvr>
+</p:sld>
+</file>
+
+<file path=ppt/slides/slide25.xml><?xml version="1.0" encoding="utf-8"?>
+<p:sld xmlns:a="http://schemas.openxmlformats.org/drawingml/2006/main" xmlns:r="http://schemas.openxmlformats.org/officeDocument/2006/relationships" xmlns:p="http://schemas.openxmlformats.org/presentationml/2006/main">
+  <p:cSld>
+    <p:spTree>
+      <p:nvGrpSpPr>
+        <p:cNvPr id="1" name=""/>
+        <p:cNvGrpSpPr/>
+        <p:nvPr/>
+      </p:nvGrpSpPr>
+      <p:grpSpPr>
+        <a:xfrm>
+          <a:off x="0" y="0"/>
+          <a:ext cx="0" cy="0"/>
+          <a:chOff x="0" y="0"/>
+          <a:chExt cx="0" cy="0"/>
+        </a:xfrm>
+      </p:grpSpPr>
+      <p:sp>
+        <p:nvSpPr>
+          <p:cNvPr id="2" name="Titre 1">
+            <a:extLst>
+              <a:ext uri="{FF2B5EF4-FFF2-40B4-BE49-F238E27FC236}">
+                <a16:creationId xmlns:a16="http://schemas.microsoft.com/office/drawing/2014/main" id="{EC51AA81-A5DF-3A18-38B6-020B45588EFC}"/>
+              </a:ext>
+            </a:extLst>
+          </p:cNvPr>
+          <p:cNvSpPr>
+            <a:spLocks noGrp="1"/>
+          </p:cNvSpPr>
+          <p:nvPr>
+            <p:ph type="title"/>
+          </p:nvPr>
+        </p:nvSpPr>
+        <p:spPr/>
+        <p:txBody>
+          <a:bodyPr/>
+          <a:lstStyle/>
+          <a:p>
+            <a:r>
+              <a:rPr lang="fr-FR" dirty="0"/>
+              <a:t>Eléments à contrôler – Publication distante</a:t>
+            </a:r>
+          </a:p>
+        </p:txBody>
+      </p:sp>
+      <p:sp>
+        <p:nvSpPr>
+          <p:cNvPr id="10" name="Espace réservé du texte 9">
+            <a:extLst>
+              <a:ext uri="{FF2B5EF4-FFF2-40B4-BE49-F238E27FC236}">
+                <a16:creationId xmlns:a16="http://schemas.microsoft.com/office/drawing/2014/main" id="{CF3C03EA-DDD4-445D-9A36-DC7D32FDA7A4}"/>
+              </a:ext>
+            </a:extLst>
+          </p:cNvPr>
+          <p:cNvSpPr>
+            <a:spLocks noGrp="1"/>
+          </p:cNvSpPr>
+          <p:nvPr>
+            <p:ph type="body" idx="1"/>
+          </p:nvPr>
+        </p:nvSpPr>
+        <p:spPr>
+          <a:xfrm>
+            <a:off x="270763" y="1580233"/>
+            <a:ext cx="11797412" cy="448592"/>
+          </a:xfrm>
+        </p:spPr>
+        <p:txBody>
+          <a:bodyPr/>
+          <a:lstStyle/>
+          <a:p>
+            <a:pPr marL="101598" indent="0">
+              <a:buNone/>
+            </a:pPr>
+            <a:r>
+              <a:rPr lang="fr-FR" sz="1800" dirty="0"/>
+              <a:t>Si vous constatez que le site n’est pas accessible à distance, vérifiez les points suivants:</a:t>
+            </a:r>
+          </a:p>
+        </p:txBody>
+      </p:sp>
+      <p:sp>
+        <p:nvSpPr>
+          <p:cNvPr id="4" name="Espace réservé du texte 3">
+            <a:extLst>
+              <a:ext uri="{FF2B5EF4-FFF2-40B4-BE49-F238E27FC236}">
+                <a16:creationId xmlns:a16="http://schemas.microsoft.com/office/drawing/2014/main" id="{6BDCEFA8-59A6-33CC-D69F-6DDA6E4D9636}"/>
+              </a:ext>
+            </a:extLst>
+          </p:cNvPr>
+          <p:cNvSpPr>
+            <a:spLocks noGrp="1"/>
+          </p:cNvSpPr>
+          <p:nvPr>
+            <p:ph type="body" sz="quarter" idx="15"/>
+          </p:nvPr>
+        </p:nvSpPr>
+        <p:spPr/>
+        <p:txBody>
+          <a:bodyPr/>
+          <a:lstStyle/>
+          <a:p>
+            <a:r>
+              <a:rPr lang="fr-FR" dirty="0"/>
+              <a:t>Dépannage</a:t>
+            </a:r>
+          </a:p>
+        </p:txBody>
+      </p:sp>
+      <p:graphicFrame>
+        <p:nvGraphicFramePr>
+          <p:cNvPr id="7" name="Tableau 6">
+            <a:extLst>
+              <a:ext uri="{FF2B5EF4-FFF2-40B4-BE49-F238E27FC236}">
+                <a16:creationId xmlns:a16="http://schemas.microsoft.com/office/drawing/2014/main" id="{C142FFEE-659B-6571-73CA-6E3D3E5DB0D6}"/>
+              </a:ext>
+            </a:extLst>
+          </p:cNvPr>
+          <p:cNvGraphicFramePr>
+            <a:graphicFrameLocks noGrp="1"/>
+          </p:cNvGraphicFramePr>
+          <p:nvPr>
+            <p:extLst>
+              <p:ext uri="{D42A27DB-BD31-4B8C-83A1-F6EECF244321}">
+                <p14:modId xmlns:p14="http://schemas.microsoft.com/office/powerpoint/2010/main" val="874116875"/>
+              </p:ext>
+            </p:extLst>
+          </p:nvPr>
+        </p:nvGraphicFramePr>
+        <p:xfrm>
+          <a:off x="270763" y="2017468"/>
+          <a:ext cx="11549762" cy="2586282"/>
+        </p:xfrm>
+        <a:graphic>
+          <a:graphicData uri="http://schemas.openxmlformats.org/drawingml/2006/table">
+            <a:tbl>
+              <a:tblPr firstRow="1" bandRow="1">
+                <a:tableStyleId>{5C22544A-7EE6-4342-B048-85BDC9FD1C3A}</a:tableStyleId>
+              </a:tblPr>
+              <a:tblGrid>
+                <a:gridCol w="5605364">
+                  <a:extLst>
+                    <a:ext uri="{9D8B030D-6E8A-4147-A177-3AD203B41FA5}">
+                      <a16:colId xmlns:a16="http://schemas.microsoft.com/office/drawing/2014/main" val="1181157168"/>
+                    </a:ext>
+                  </a:extLst>
+                </a:gridCol>
+                <a:gridCol w="5944398">
+                  <a:extLst>
+                    <a:ext uri="{9D8B030D-6E8A-4147-A177-3AD203B41FA5}">
+                      <a16:colId xmlns:a16="http://schemas.microsoft.com/office/drawing/2014/main" val="3916079968"/>
+                    </a:ext>
+                  </a:extLst>
+                </a:gridCol>
+              </a:tblGrid>
+              <a:tr h="370840">
+                <a:tc>
+                  <a:txBody>
+                    <a:bodyPr/>
+                    <a:lstStyle/>
+                    <a:p>
+                      <a:r>
+                        <a:rPr lang="fr-FR" dirty="0"/>
+                        <a:t>Contrôle</a:t>
+                      </a:r>
+                    </a:p>
+                  </a:txBody>
+                  <a:tcPr anchor="ctr"/>
+                </a:tc>
+                <a:tc>
+                  <a:txBody>
+                    <a:bodyPr/>
+                    <a:lstStyle/>
+                    <a:p>
+                      <a:r>
+                        <a:rPr lang="fr-FR" dirty="0"/>
+                        <a:t>Que faire</a:t>
+                      </a:r>
+                    </a:p>
+                  </a:txBody>
+                  <a:tcPr anchor="ctr"/>
+                </a:tc>
+                <a:extLst>
+                  <a:ext uri="{0D108BD9-81ED-4DB2-BD59-A6C34878D82A}">
+                    <a16:rowId xmlns:a16="http://schemas.microsoft.com/office/drawing/2014/main" val="2896649042"/>
+                  </a:ext>
+                </a:extLst>
+              </a:tr>
+              <a:tr h="564442">
+                <a:tc>
+                  <a:txBody>
+                    <a:bodyPr/>
+                    <a:lstStyle/>
+                    <a:p>
+                      <a:r>
+                        <a:rPr lang="fr-FR" dirty="0"/>
+                        <a:t>La publication distante est démarrée </a:t>
+                      </a:r>
+                    </a:p>
+                  </a:txBody>
+                  <a:tcPr anchor="ctr"/>
+                </a:tc>
+                <a:tc>
+                  <a:txBody>
+                    <a:bodyPr/>
+                    <a:lstStyle/>
+                    <a:p>
+                      <a:r>
+                        <a:rPr lang="fr-FR" dirty="0"/>
+                        <a:t>Démarrez la publication</a:t>
+                      </a:r>
+                    </a:p>
+                  </a:txBody>
+                  <a:tcPr anchor="ctr"/>
+                </a:tc>
+                <a:extLst>
+                  <a:ext uri="{0D108BD9-81ED-4DB2-BD59-A6C34878D82A}">
+                    <a16:rowId xmlns:a16="http://schemas.microsoft.com/office/drawing/2014/main" val="2586581298"/>
+                  </a:ext>
+                </a:extLst>
+              </a:tr>
+              <a:tr h="370840">
+                <a:tc>
+                  <a:txBody>
+                    <a:bodyPr/>
+                    <a:lstStyle/>
+                    <a:p>
+                      <a:r>
+                        <a:rPr lang="fr-FR" dirty="0"/>
+                        <a:t>Les paramètres de connexion FTP sont valides (compte, mot de passe répertoire)</a:t>
+                      </a:r>
+                    </a:p>
+                  </a:txBody>
+                  <a:tcPr anchor="ctr"/>
+                </a:tc>
+                <a:tc>
+                  <a:txBody>
+                    <a:bodyPr/>
+                    <a:lstStyle/>
+                    <a:p>
+                      <a:r>
+                        <a:rPr lang="fr-FR" dirty="0"/>
+                        <a:t>Arrêtez la publication distante, configurer les bons paramètres et démarrez la publication distante</a:t>
+                      </a:r>
+                    </a:p>
+                  </a:txBody>
+                  <a:tcPr anchor="ctr"/>
+                </a:tc>
+                <a:extLst>
+                  <a:ext uri="{0D108BD9-81ED-4DB2-BD59-A6C34878D82A}">
+                    <a16:rowId xmlns:a16="http://schemas.microsoft.com/office/drawing/2014/main" val="4129515051"/>
+                  </a:ext>
+                </a:extLst>
+              </a:tr>
+              <a:tr h="370840">
+                <a:tc>
+                  <a:txBody>
+                    <a:bodyPr/>
+                    <a:lstStyle/>
+                    <a:p>
+                      <a:r>
+                        <a:rPr lang="fr-FR" dirty="0"/>
+                        <a:t>Le pare-feu Windows autorise la connexion FTP</a:t>
+                      </a:r>
+                    </a:p>
+                  </a:txBody>
+                  <a:tcPr anchor="ctr"/>
+                </a:tc>
+                <a:tc>
+                  <a:txBody>
+                    <a:bodyPr/>
+                    <a:lstStyle/>
+                    <a:p>
+                      <a:r>
+                        <a:rPr lang="fr-FR" dirty="0"/>
+                        <a:t>Modifiez la configuration du pare-feu Windows</a:t>
+                      </a:r>
+                    </a:p>
+                  </a:txBody>
+                  <a:tcPr anchor="ctr"/>
+                </a:tc>
+                <a:extLst>
+                  <a:ext uri="{0D108BD9-81ED-4DB2-BD59-A6C34878D82A}">
+                    <a16:rowId xmlns:a16="http://schemas.microsoft.com/office/drawing/2014/main" val="3823118335"/>
+                  </a:ext>
+                </a:extLst>
+              </a:tr>
+              <a:tr h="370840">
+                <a:tc>
+                  <a:txBody>
+                    <a:bodyPr/>
+                    <a:lstStyle/>
+                    <a:p>
+                      <a:r>
+                        <a:rPr lang="fr-FR" dirty="0"/>
+                        <a:t>Le mode FTP est approprié (Actif/Passif)</a:t>
+                      </a:r>
+                    </a:p>
+                  </a:txBody>
+                  <a:tcPr anchor="ctr"/>
+                </a:tc>
+                <a:tc>
+                  <a:txBody>
+                    <a:bodyPr/>
+                    <a:lstStyle/>
+                    <a:p>
+                      <a:pPr marL="0" marR="0" lvl="0" indent="0" algn="l" defTabSz="914400" rtl="0" eaLnBrk="1" fontAlgn="auto" latinLnBrk="0" hangingPunct="1">
+                        <a:lnSpc>
+                          <a:spcPct val="100000"/>
+                        </a:lnSpc>
+                        <a:spcBef>
+                          <a:spcPts val="0"/>
+                        </a:spcBef>
+                        <a:spcAft>
+                          <a:spcPts val="0"/>
+                        </a:spcAft>
+                        <a:buClrTx/>
+                        <a:buSzTx/>
+                        <a:buFontTx/>
+                        <a:buNone/>
+                        <a:tabLst/>
+                        <a:defRPr/>
+                      </a:pPr>
+                      <a:r>
+                        <a:rPr lang="fr-FR" dirty="0"/>
+                        <a:t>Arrêtez la publication distante, sélectionnez le mode adéquat et démarrez la publication distante</a:t>
+                      </a:r>
+                    </a:p>
+                  </a:txBody>
+                  <a:tcPr anchor="ctr"/>
+                </a:tc>
+                <a:extLst>
+                  <a:ext uri="{0D108BD9-81ED-4DB2-BD59-A6C34878D82A}">
+                    <a16:rowId xmlns:a16="http://schemas.microsoft.com/office/drawing/2014/main" val="1423062560"/>
+                  </a:ext>
+                </a:extLst>
+              </a:tr>
+            </a:tbl>
+          </a:graphicData>
+        </a:graphic>
+      </p:graphicFrame>
+      <p:pic>
+        <p:nvPicPr>
+          <p:cNvPr id="5" name="Image 4">
+            <a:extLst>
+              <a:ext uri="{FF2B5EF4-FFF2-40B4-BE49-F238E27FC236}">
+                <a16:creationId xmlns:a16="http://schemas.microsoft.com/office/drawing/2014/main" id="{2531E53B-5E15-45CC-78E1-23AF9BBA270E}"/>
+              </a:ext>
+            </a:extLst>
+          </p:cNvPr>
+          <p:cNvPicPr>
+            <a:picLocks noChangeAspect="1"/>
+          </p:cNvPicPr>
+          <p:nvPr/>
+        </p:nvPicPr>
+        <p:blipFill>
+          <a:blip r:embed="rId2"/>
+          <a:stretch>
+            <a:fillRect/>
+          </a:stretch>
+        </p:blipFill>
+        <p:spPr>
+          <a:xfrm>
+            <a:off x="3929062" y="2466060"/>
+            <a:ext cx="1247775" cy="381000"/>
+          </a:xfrm>
+          <a:prstGeom prst="rect">
+            <a:avLst/>
+          </a:prstGeom>
+        </p:spPr>
+      </p:pic>
+    </p:spTree>
+    <p:extLst>
+      <p:ext uri="{BB962C8B-B14F-4D97-AF65-F5344CB8AC3E}">
+        <p14:creationId xmlns:p14="http://schemas.microsoft.com/office/powerpoint/2010/main" val="2824300561"/>
+      </p:ext>
+    </p:extLst>
+  </p:cSld>
+  <p:clrMapOvr>
+    <a:masterClrMapping/>
+  </p:clrMapOvr>
+</p:sld>
+</file>
+
+<file path=ppt/slides/slide26.xml><?xml version="1.0" encoding="utf-8"?>
+<p:sld xmlns:a="http://schemas.openxmlformats.org/drawingml/2006/main" xmlns:r="http://schemas.openxmlformats.org/officeDocument/2006/relationships" xmlns:p="http://schemas.openxmlformats.org/presentationml/2006/main">
+  <p:cSld>
+    <p:spTree>
+      <p:nvGrpSpPr>
+        <p:cNvPr id="1" name=""/>
+        <p:cNvGrpSpPr/>
+        <p:nvPr/>
+      </p:nvGrpSpPr>
+      <p:grpSpPr>
+        <a:xfrm>
+          <a:off x="0" y="0"/>
+          <a:ext cx="0" cy="0"/>
+          <a:chOff x="0" y="0"/>
+          <a:chExt cx="0" cy="0"/>
+        </a:xfrm>
+      </p:grpSpPr>
+      <p:sp>
+        <p:nvSpPr>
           <p:cNvPr id="8" name="Titre 7">
             <a:extLst>
               <a:ext uri="{FF2B5EF4-FFF2-40B4-BE49-F238E27FC236}">
@@ -27441,7 +28386,7 @@
 </p:sld>
 </file>
 
-<file path=ppt/slides/slide25.xml><?xml version="1.0" encoding="utf-8"?>
+<file path=ppt/slides/slide27.xml><?xml version="1.0" encoding="utf-8"?>
 <p:sld xmlns:a="http://schemas.openxmlformats.org/drawingml/2006/main" xmlns:r="http://schemas.openxmlformats.org/officeDocument/2006/relationships" xmlns:p="http://schemas.openxmlformats.org/presentationml/2006/main">
   <p:cSld>
     <p:spTree>
@@ -28926,7 +29871,7 @@
 </p:sld>
 </file>
 
-<file path=ppt/slides/slide26.xml><?xml version="1.0" encoding="utf-8"?>
+<file path=ppt/slides/slide28.xml><?xml version="1.0" encoding="utf-8"?>
 <p:sld xmlns:a="http://schemas.openxmlformats.org/drawingml/2006/main" xmlns:r="http://schemas.openxmlformats.org/officeDocument/2006/relationships" xmlns:p="http://schemas.openxmlformats.org/presentationml/2006/main">
   <p:cSld>
     <p:spTree>
@@ -29001,7 +29946,7 @@
               <a:rPr lang="fr-FR" sz="1200" b="1" dirty="0">
                 <a:latin typeface="Barlow" panose="00000500000000000000" pitchFamily="2" charset="0"/>
               </a:rPr>
-              <a:t>v1.2.1.0 – xx/04/2024</a:t>
+              <a:t>v1.2.1.0 – 20/04/2024</a:t>
             </a:r>
           </a:p>
           <a:p>
@@ -29607,7 +30552,7 @@
 </p:sld>
 </file>
 
-<file path=ppt/slides/slide27.xml><?xml version="1.0" encoding="utf-8"?>
+<file path=ppt/slides/slide29.xml><?xml version="1.0" encoding="utf-8"?>
 <p:sld xmlns:a="http://schemas.openxmlformats.org/drawingml/2006/main" xmlns:r="http://schemas.openxmlformats.org/officeDocument/2006/relationships" xmlns:p="http://schemas.openxmlformats.org/presentationml/2006/main">
   <p:cSld>
     <p:spTree>
@@ -30262,7 +31207,123 @@
 </p:sld>
 </file>
 
-<file path=ppt/slides/slide28.xml><?xml version="1.0" encoding="utf-8"?>
+<file path=ppt/slides/slide3.xml><?xml version="1.0" encoding="utf-8"?>
+<p:sld xmlns:a="http://schemas.openxmlformats.org/drawingml/2006/main" xmlns:r="http://schemas.openxmlformats.org/officeDocument/2006/relationships" xmlns:p="http://schemas.openxmlformats.org/presentationml/2006/main">
+  <p:cSld>
+    <p:spTree>
+      <p:nvGrpSpPr>
+        <p:cNvPr id="1" name=""/>
+        <p:cNvGrpSpPr/>
+        <p:nvPr/>
+      </p:nvGrpSpPr>
+      <p:grpSpPr>
+        <a:xfrm>
+          <a:off x="0" y="0"/>
+          <a:ext cx="0" cy="0"/>
+          <a:chOff x="0" y="0"/>
+          <a:chExt cx="0" cy="0"/>
+        </a:xfrm>
+      </p:grpSpPr>
+      <p:sp>
+        <p:nvSpPr>
+          <p:cNvPr id="4" name="Titre 3">
+            <a:extLst>
+              <a:ext uri="{FF2B5EF4-FFF2-40B4-BE49-F238E27FC236}">
+                <a16:creationId xmlns:a16="http://schemas.microsoft.com/office/drawing/2014/main" id="{5AB25890-5D2B-8A4F-90E1-E25E94E888E5}"/>
+              </a:ext>
+            </a:extLst>
+          </p:cNvPr>
+          <p:cNvSpPr>
+            <a:spLocks noGrp="1"/>
+          </p:cNvSpPr>
+          <p:nvPr>
+            <p:ph type="title"/>
+          </p:nvPr>
+        </p:nvSpPr>
+        <p:spPr>
+          <a:prstGeom prst="rect">
+            <a:avLst/>
+          </a:prstGeom>
+        </p:spPr>
+        <p:txBody>
+          <a:bodyPr/>
+          <a:lstStyle/>
+          <a:p>
+            <a:r>
+              <a:rPr lang="fr-FR" dirty="0"/>
+              <a:t>Description générale</a:t>
+            </a:r>
+          </a:p>
+        </p:txBody>
+      </p:sp>
+      <p:sp>
+        <p:nvSpPr>
+          <p:cNvPr id="5" name="Espace réservé du contenu 4">
+            <a:extLst>
+              <a:ext uri="{FF2B5EF4-FFF2-40B4-BE49-F238E27FC236}">
+                <a16:creationId xmlns:a16="http://schemas.microsoft.com/office/drawing/2014/main" id="{24F509AC-E712-3C45-AAC9-0BA6E5C35D4B}"/>
+              </a:ext>
+            </a:extLst>
+          </p:cNvPr>
+          <p:cNvSpPr>
+            <a:spLocks noGrp="1"/>
+          </p:cNvSpPr>
+          <p:nvPr>
+            <p:ph sz="half" idx="1"/>
+          </p:nvPr>
+        </p:nvSpPr>
+        <p:spPr>
+          <a:prstGeom prst="rect">
+            <a:avLst/>
+          </a:prstGeom>
+        </p:spPr>
+        <p:txBody>
+          <a:bodyPr/>
+          <a:lstStyle/>
+          <a:p>
+            <a:r>
+              <a:rPr lang="fr-FR" b="0" dirty="0"/>
+              <a:t>Description du logiciel et des ses fonctionnalités</a:t>
+            </a:r>
+          </a:p>
+        </p:txBody>
+      </p:sp>
+      <p:sp>
+        <p:nvSpPr>
+          <p:cNvPr id="2" name="Espace réservé du texte 1"/>
+          <p:cNvSpPr>
+            <a:spLocks noGrp="1"/>
+          </p:cNvSpPr>
+          <p:nvPr>
+            <p:ph type="body" sz="quarter" idx="10"/>
+          </p:nvPr>
+        </p:nvSpPr>
+        <p:spPr/>
+        <p:txBody>
+          <a:bodyPr/>
+          <a:lstStyle/>
+          <a:p>
+            <a:r>
+              <a:rPr lang="fr-FR" dirty="0"/>
+              <a:t>1</a:t>
+            </a:r>
+          </a:p>
+        </p:txBody>
+      </p:sp>
+    </p:spTree>
+    <p:extLst>
+      <p:ext uri="{BB962C8B-B14F-4D97-AF65-F5344CB8AC3E}">
+        <p14:creationId xmlns:p14="http://schemas.microsoft.com/office/powerpoint/2010/main" val="3615854999"/>
+      </p:ext>
+    </p:extLst>
+  </p:cSld>
+  <p:clrMapOvr>
+    <a:masterClrMapping/>
+  </p:clrMapOvr>
+</p:sld>
+</file>
+
+<file path=ppt/slides/slide30.xml><?xml version="1.0" encoding="utf-8"?>
 <p:sld xmlns:a="http://schemas.openxmlformats.org/drawingml/2006/main" xmlns:r="http://schemas.openxmlformats.org/officeDocument/2006/relationships" xmlns:p="http://schemas.openxmlformats.org/presentationml/2006/main">
   <p:cSld>
     <p:spTree>
@@ -32205,7 +33266,7 @@
 </p:sld>
 </file>
 
-<file path=ppt/slides/slide29.xml><?xml version="1.0" encoding="utf-8"?>
+<file path=ppt/slides/slide31.xml><?xml version="1.0" encoding="utf-8"?>
 <p:sld xmlns:a="http://schemas.openxmlformats.org/drawingml/2006/main" xmlns:r="http://schemas.openxmlformats.org/officeDocument/2006/relationships" xmlns:p="http://schemas.openxmlformats.org/presentationml/2006/main">
   <p:cSld>
     <p:spTree>
@@ -32756,123 +33817,7 @@
 </p:sld>
 </file>
 
-<file path=ppt/slides/slide3.xml><?xml version="1.0" encoding="utf-8"?>
-<p:sld xmlns:a="http://schemas.openxmlformats.org/drawingml/2006/main" xmlns:r="http://schemas.openxmlformats.org/officeDocument/2006/relationships" xmlns:p="http://schemas.openxmlformats.org/presentationml/2006/main">
-  <p:cSld>
-    <p:spTree>
-      <p:nvGrpSpPr>
-        <p:cNvPr id="1" name=""/>
-        <p:cNvGrpSpPr/>
-        <p:nvPr/>
-      </p:nvGrpSpPr>
-      <p:grpSpPr>
-        <a:xfrm>
-          <a:off x="0" y="0"/>
-          <a:ext cx="0" cy="0"/>
-          <a:chOff x="0" y="0"/>
-          <a:chExt cx="0" cy="0"/>
-        </a:xfrm>
-      </p:grpSpPr>
-      <p:sp>
-        <p:nvSpPr>
-          <p:cNvPr id="4" name="Titre 3">
-            <a:extLst>
-              <a:ext uri="{FF2B5EF4-FFF2-40B4-BE49-F238E27FC236}">
-                <a16:creationId xmlns:a16="http://schemas.microsoft.com/office/drawing/2014/main" id="{5AB25890-5D2B-8A4F-90E1-E25E94E888E5}"/>
-              </a:ext>
-            </a:extLst>
-          </p:cNvPr>
-          <p:cNvSpPr>
-            <a:spLocks noGrp="1"/>
-          </p:cNvSpPr>
-          <p:nvPr>
-            <p:ph type="title"/>
-          </p:nvPr>
-        </p:nvSpPr>
-        <p:spPr>
-          <a:prstGeom prst="rect">
-            <a:avLst/>
-          </a:prstGeom>
-        </p:spPr>
-        <p:txBody>
-          <a:bodyPr/>
-          <a:lstStyle/>
-          <a:p>
-            <a:r>
-              <a:rPr lang="fr-FR" dirty="0"/>
-              <a:t>Description générale</a:t>
-            </a:r>
-          </a:p>
-        </p:txBody>
-      </p:sp>
-      <p:sp>
-        <p:nvSpPr>
-          <p:cNvPr id="5" name="Espace réservé du contenu 4">
-            <a:extLst>
-              <a:ext uri="{FF2B5EF4-FFF2-40B4-BE49-F238E27FC236}">
-                <a16:creationId xmlns:a16="http://schemas.microsoft.com/office/drawing/2014/main" id="{24F509AC-E712-3C45-AAC9-0BA6E5C35D4B}"/>
-              </a:ext>
-            </a:extLst>
-          </p:cNvPr>
-          <p:cNvSpPr>
-            <a:spLocks noGrp="1"/>
-          </p:cNvSpPr>
-          <p:nvPr>
-            <p:ph sz="half" idx="1"/>
-          </p:nvPr>
-        </p:nvSpPr>
-        <p:spPr>
-          <a:prstGeom prst="rect">
-            <a:avLst/>
-          </a:prstGeom>
-        </p:spPr>
-        <p:txBody>
-          <a:bodyPr/>
-          <a:lstStyle/>
-          <a:p>
-            <a:r>
-              <a:rPr lang="fr-FR" b="0" dirty="0"/>
-              <a:t>Description du logiciel et des ses fonctionnalités</a:t>
-            </a:r>
-          </a:p>
-        </p:txBody>
-      </p:sp>
-      <p:sp>
-        <p:nvSpPr>
-          <p:cNvPr id="2" name="Espace réservé du texte 1"/>
-          <p:cNvSpPr>
-            <a:spLocks noGrp="1"/>
-          </p:cNvSpPr>
-          <p:nvPr>
-            <p:ph type="body" sz="quarter" idx="10"/>
-          </p:nvPr>
-        </p:nvSpPr>
-        <p:spPr/>
-        <p:txBody>
-          <a:bodyPr/>
-          <a:lstStyle/>
-          <a:p>
-            <a:r>
-              <a:rPr lang="fr-FR" dirty="0"/>
-              <a:t>1</a:t>
-            </a:r>
-          </a:p>
-        </p:txBody>
-      </p:sp>
-    </p:spTree>
-    <p:extLst>
-      <p:ext uri="{BB962C8B-B14F-4D97-AF65-F5344CB8AC3E}">
-        <p14:creationId xmlns:p14="http://schemas.microsoft.com/office/powerpoint/2010/main" val="3615854999"/>
-      </p:ext>
-    </p:extLst>
-  </p:cSld>
-  <p:clrMapOvr>
-    <a:masterClrMapping/>
-  </p:clrMapOvr>
-</p:sld>
-</file>
-
-<file path=ppt/slides/slide30.xml><?xml version="1.0" encoding="utf-8"?>
+<file path=ppt/slides/slide32.xml><?xml version="1.0" encoding="utf-8"?>
 <p:sld xmlns:a="http://schemas.openxmlformats.org/drawingml/2006/main" xmlns:r="http://schemas.openxmlformats.org/officeDocument/2006/relationships" xmlns:p="http://schemas.openxmlformats.org/presentationml/2006/main">
   <p:cSld>
     <p:spTree>
@@ -33592,857 +34537,6 @@
 </p:sld>
 </file>
 
-<file path=ppt/slides/slide31.xml><?xml version="1.0" encoding="utf-8"?>
-<p:sld xmlns:a="http://schemas.openxmlformats.org/drawingml/2006/main" xmlns:r="http://schemas.openxmlformats.org/officeDocument/2006/relationships" xmlns:p="http://schemas.openxmlformats.org/presentationml/2006/main">
-  <p:cSld>
-    <p:spTree>
-      <p:nvGrpSpPr>
-        <p:cNvPr id="1" name=""/>
-        <p:cNvGrpSpPr/>
-        <p:nvPr/>
-      </p:nvGrpSpPr>
-      <p:grpSpPr>
-        <a:xfrm>
-          <a:off x="0" y="0"/>
-          <a:ext cx="0" cy="0"/>
-          <a:chOff x="0" y="0"/>
-          <a:chExt cx="0" cy="0"/>
-        </a:xfrm>
-      </p:grpSpPr>
-      <p:sp>
-        <p:nvSpPr>
-          <p:cNvPr id="40" name="Rectangle : coins arrondis 39">
-            <a:extLst>
-              <a:ext uri="{FF2B5EF4-FFF2-40B4-BE49-F238E27FC236}">
-                <a16:creationId xmlns:a16="http://schemas.microsoft.com/office/drawing/2014/main" id="{58A34438-3D1A-7ADA-6577-FC12D5E3BB3A}"/>
-              </a:ext>
-            </a:extLst>
-          </p:cNvPr>
-          <p:cNvSpPr/>
-          <p:nvPr/>
-        </p:nvSpPr>
-        <p:spPr>
-          <a:xfrm>
-            <a:off x="3231116" y="1647522"/>
-            <a:ext cx="5829064" cy="4808792"/>
-          </a:xfrm>
-          <a:prstGeom prst="roundRect">
-            <a:avLst>
-              <a:gd name="adj" fmla="val 1691"/>
-            </a:avLst>
-          </a:prstGeom>
-          <a:noFill/>
-        </p:spPr>
-        <p:style>
-          <a:lnRef idx="2">
-            <a:schemeClr val="accent1"/>
-          </a:lnRef>
-          <a:fillRef idx="1">
-            <a:schemeClr val="lt1"/>
-          </a:fillRef>
-          <a:effectRef idx="0">
-            <a:schemeClr val="accent1"/>
-          </a:effectRef>
-          <a:fontRef idx="minor">
-            <a:schemeClr val="dk1"/>
-          </a:fontRef>
-        </p:style>
-        <p:txBody>
-          <a:bodyPr rtlCol="0" anchor="ctr"/>
-          <a:lstStyle/>
-          <a:p>
-            <a:pPr algn="r"/>
-            <a:endParaRPr lang="fr-FR" dirty="0"/>
-          </a:p>
-        </p:txBody>
-      </p:sp>
-      <p:sp>
-        <p:nvSpPr>
-          <p:cNvPr id="2" name="Titre 1">
-            <a:extLst>
-              <a:ext uri="{FF2B5EF4-FFF2-40B4-BE49-F238E27FC236}">
-                <a16:creationId xmlns:a16="http://schemas.microsoft.com/office/drawing/2014/main" id="{2C198829-35EB-6A46-EBAA-6A582DAFE970}"/>
-              </a:ext>
-            </a:extLst>
-          </p:cNvPr>
-          <p:cNvSpPr>
-            <a:spLocks noGrp="1"/>
-          </p:cNvSpPr>
-          <p:nvPr>
-            <p:ph type="title"/>
-          </p:nvPr>
-        </p:nvSpPr>
-        <p:spPr/>
-        <p:txBody>
-          <a:bodyPr/>
-          <a:lstStyle/>
-          <a:p>
-            <a:r>
-              <a:rPr lang="fr-FR" dirty="0"/>
-              <a:t>Plan du Site utilisateur – Affectations</a:t>
-            </a:r>
-          </a:p>
-        </p:txBody>
-      </p:sp>
-      <p:sp>
-        <p:nvSpPr>
-          <p:cNvPr id="4" name="Espace réservé du texte 3">
-            <a:extLst>
-              <a:ext uri="{FF2B5EF4-FFF2-40B4-BE49-F238E27FC236}">
-                <a16:creationId xmlns:a16="http://schemas.microsoft.com/office/drawing/2014/main" id="{55EE5942-743C-7FE0-DDCC-8AF825345982}"/>
-              </a:ext>
-            </a:extLst>
-          </p:cNvPr>
-          <p:cNvSpPr>
-            <a:spLocks noGrp="1"/>
-          </p:cNvSpPr>
-          <p:nvPr>
-            <p:ph type="body" sz="quarter" idx="15"/>
-          </p:nvPr>
-        </p:nvSpPr>
-        <p:spPr/>
-        <p:txBody>
-          <a:bodyPr/>
-          <a:lstStyle/>
-          <a:p>
-            <a:r>
-              <a:rPr lang="fr-FR" dirty="0"/>
-              <a:t>Annexe</a:t>
-            </a:r>
-          </a:p>
-        </p:txBody>
-      </p:sp>
-      <p:sp>
-        <p:nvSpPr>
-          <p:cNvPr id="34" name="Rectangle : coins arrondis 33">
-            <a:extLst>
-              <a:ext uri="{FF2B5EF4-FFF2-40B4-BE49-F238E27FC236}">
-                <a16:creationId xmlns:a16="http://schemas.microsoft.com/office/drawing/2014/main" id="{2A9E8854-3740-AEB4-DA1E-41A230566829}"/>
-              </a:ext>
-            </a:extLst>
-          </p:cNvPr>
-          <p:cNvSpPr/>
-          <p:nvPr/>
-        </p:nvSpPr>
-        <p:spPr>
-          <a:xfrm>
-            <a:off x="3231114" y="1639838"/>
-            <a:ext cx="5829066" cy="402322"/>
-          </a:xfrm>
-          <a:prstGeom prst="roundRect">
-            <a:avLst/>
-          </a:prstGeom>
-        </p:spPr>
-        <p:style>
-          <a:lnRef idx="0">
-            <a:schemeClr val="accent1"/>
-          </a:lnRef>
-          <a:fillRef idx="3">
-            <a:schemeClr val="accent1"/>
-          </a:fillRef>
-          <a:effectRef idx="3">
-            <a:schemeClr val="accent1"/>
-          </a:effectRef>
-          <a:fontRef idx="minor">
-            <a:schemeClr val="lt1"/>
-          </a:fontRef>
-        </p:style>
-        <p:txBody>
-          <a:bodyPr rtlCol="0" anchor="ctr"/>
-          <a:lstStyle/>
-          <a:p>
-            <a:pPr algn="ctr"/>
-            <a:r>
-              <a:rPr lang="fr-FR" sz="1400" dirty="0"/>
-              <a:t>Affectations des tapis</a:t>
-            </a:r>
-          </a:p>
-        </p:txBody>
-      </p:sp>
-      <p:pic>
-        <p:nvPicPr>
-          <p:cNvPr id="5" name="Image 4">
-            <a:extLst>
-              <a:ext uri="{FF2B5EF4-FFF2-40B4-BE49-F238E27FC236}">
-                <a16:creationId xmlns:a16="http://schemas.microsoft.com/office/drawing/2014/main" id="{299E2910-1D4D-F715-AB09-C6B0203E31BC}"/>
-              </a:ext>
-            </a:extLst>
-          </p:cNvPr>
-          <p:cNvPicPr>
-            <a:picLocks noChangeAspect="1"/>
-          </p:cNvPicPr>
-          <p:nvPr/>
-        </p:nvPicPr>
-        <p:blipFill>
-          <a:blip r:embed="rId2"/>
-          <a:stretch>
-            <a:fillRect/>
-          </a:stretch>
-        </p:blipFill>
-        <p:spPr>
-          <a:xfrm>
-            <a:off x="3878697" y="2145295"/>
-            <a:ext cx="4533900" cy="4207884"/>
-          </a:xfrm>
-          <a:prstGeom prst="rect">
-            <a:avLst/>
-          </a:prstGeom>
-        </p:spPr>
-      </p:pic>
-    </p:spTree>
-    <p:extLst>
-      <p:ext uri="{BB962C8B-B14F-4D97-AF65-F5344CB8AC3E}">
-        <p14:creationId xmlns:p14="http://schemas.microsoft.com/office/powerpoint/2010/main" val="2055979273"/>
-      </p:ext>
-    </p:extLst>
-  </p:cSld>
-  <p:clrMapOvr>
-    <a:masterClrMapping/>
-  </p:clrMapOvr>
-</p:sld>
-</file>
-
-<file path=ppt/slides/slide32.xml><?xml version="1.0" encoding="utf-8"?>
-<p:sld xmlns:a="http://schemas.openxmlformats.org/drawingml/2006/main" xmlns:r="http://schemas.openxmlformats.org/officeDocument/2006/relationships" xmlns:p="http://schemas.openxmlformats.org/presentationml/2006/main">
-  <p:cSld>
-    <p:spTree>
-      <p:nvGrpSpPr>
-        <p:cNvPr id="1" name=""/>
-        <p:cNvGrpSpPr/>
-        <p:nvPr/>
-      </p:nvGrpSpPr>
-      <p:grpSpPr>
-        <a:xfrm>
-          <a:off x="0" y="0"/>
-          <a:ext cx="0" cy="0"/>
-          <a:chOff x="0" y="0"/>
-          <a:chExt cx="0" cy="0"/>
-        </a:xfrm>
-      </p:grpSpPr>
-      <p:sp>
-        <p:nvSpPr>
-          <p:cNvPr id="2" name="Titre 1">
-            <a:extLst>
-              <a:ext uri="{FF2B5EF4-FFF2-40B4-BE49-F238E27FC236}">
-                <a16:creationId xmlns:a16="http://schemas.microsoft.com/office/drawing/2014/main" id="{2C198829-35EB-6A46-EBAA-6A582DAFE970}"/>
-              </a:ext>
-            </a:extLst>
-          </p:cNvPr>
-          <p:cNvSpPr>
-            <a:spLocks noGrp="1"/>
-          </p:cNvSpPr>
-          <p:nvPr>
-            <p:ph type="title"/>
-          </p:nvPr>
-        </p:nvSpPr>
-        <p:spPr/>
-        <p:txBody>
-          <a:bodyPr/>
-          <a:lstStyle/>
-          <a:p>
-            <a:r>
-              <a:rPr lang="fr-FR" dirty="0"/>
-              <a:t>Plan du Site utilisateur – Avancements</a:t>
-            </a:r>
-          </a:p>
-        </p:txBody>
-      </p:sp>
-      <p:sp>
-        <p:nvSpPr>
-          <p:cNvPr id="4" name="Espace réservé du texte 3">
-            <a:extLst>
-              <a:ext uri="{FF2B5EF4-FFF2-40B4-BE49-F238E27FC236}">
-                <a16:creationId xmlns:a16="http://schemas.microsoft.com/office/drawing/2014/main" id="{55EE5942-743C-7FE0-DDCC-8AF825345982}"/>
-              </a:ext>
-            </a:extLst>
-          </p:cNvPr>
-          <p:cNvSpPr>
-            <a:spLocks noGrp="1"/>
-          </p:cNvSpPr>
-          <p:nvPr>
-            <p:ph type="body" sz="quarter" idx="15"/>
-          </p:nvPr>
-        </p:nvSpPr>
-        <p:spPr/>
-        <p:txBody>
-          <a:bodyPr/>
-          <a:lstStyle/>
-          <a:p>
-            <a:r>
-              <a:rPr lang="fr-FR" dirty="0"/>
-              <a:t>Annexe</a:t>
-            </a:r>
-          </a:p>
-        </p:txBody>
-      </p:sp>
-      <p:sp>
-        <p:nvSpPr>
-          <p:cNvPr id="3" name="Rectangle : coins arrondis 2">
-            <a:extLst>
-              <a:ext uri="{FF2B5EF4-FFF2-40B4-BE49-F238E27FC236}">
-                <a16:creationId xmlns:a16="http://schemas.microsoft.com/office/drawing/2014/main" id="{503174A0-941A-A415-3B71-EFB82484532B}"/>
-              </a:ext>
-            </a:extLst>
-          </p:cNvPr>
-          <p:cNvSpPr/>
-          <p:nvPr/>
-        </p:nvSpPr>
-        <p:spPr>
-          <a:xfrm>
-            <a:off x="221059" y="1972782"/>
-            <a:ext cx="3529729" cy="3861738"/>
-          </a:xfrm>
-          <a:prstGeom prst="roundRect">
-            <a:avLst>
-              <a:gd name="adj" fmla="val 1691"/>
-            </a:avLst>
-          </a:prstGeom>
-          <a:noFill/>
-        </p:spPr>
-        <p:style>
-          <a:lnRef idx="2">
-            <a:schemeClr val="accent1"/>
-          </a:lnRef>
-          <a:fillRef idx="1">
-            <a:schemeClr val="lt1"/>
-          </a:fillRef>
-          <a:effectRef idx="0">
-            <a:schemeClr val="accent1"/>
-          </a:effectRef>
-          <a:fontRef idx="minor">
-            <a:schemeClr val="dk1"/>
-          </a:fontRef>
-        </p:style>
-        <p:txBody>
-          <a:bodyPr rtlCol="0" anchor="ctr"/>
-          <a:lstStyle/>
-          <a:p>
-            <a:pPr algn="r"/>
-            <a:endParaRPr lang="fr-FR" dirty="0"/>
-          </a:p>
-        </p:txBody>
-      </p:sp>
-      <p:sp>
-        <p:nvSpPr>
-          <p:cNvPr id="6" name="Rectangle : coins arrondis 5">
-            <a:extLst>
-              <a:ext uri="{FF2B5EF4-FFF2-40B4-BE49-F238E27FC236}">
-                <a16:creationId xmlns:a16="http://schemas.microsoft.com/office/drawing/2014/main" id="{1FF9D910-74CE-77AC-4697-C5E04C287AF0}"/>
-              </a:ext>
-            </a:extLst>
-          </p:cNvPr>
-          <p:cNvSpPr/>
-          <p:nvPr/>
-        </p:nvSpPr>
-        <p:spPr>
-          <a:xfrm>
-            <a:off x="221057" y="1965098"/>
-            <a:ext cx="3529731" cy="402322"/>
-          </a:xfrm>
-          <a:prstGeom prst="roundRect">
-            <a:avLst/>
-          </a:prstGeom>
-        </p:spPr>
-        <p:style>
-          <a:lnRef idx="0">
-            <a:schemeClr val="accent1"/>
-          </a:lnRef>
-          <a:fillRef idx="3">
-            <a:schemeClr val="accent1"/>
-          </a:fillRef>
-          <a:effectRef idx="3">
-            <a:schemeClr val="accent1"/>
-          </a:effectRef>
-          <a:fontRef idx="minor">
-            <a:schemeClr val="lt1"/>
-          </a:fontRef>
-        </p:style>
-        <p:txBody>
-          <a:bodyPr rtlCol="0" anchor="ctr"/>
-          <a:lstStyle/>
-          <a:p>
-            <a:pPr algn="ctr"/>
-            <a:r>
-              <a:rPr lang="fr-FR" sz="1400" dirty="0"/>
-              <a:t>Avancements (choix de catégorie)</a:t>
-            </a:r>
-          </a:p>
-        </p:txBody>
-      </p:sp>
-      <p:sp>
-        <p:nvSpPr>
-          <p:cNvPr id="7" name="Rectangle : coins arrondis 6">
-            <a:extLst>
-              <a:ext uri="{FF2B5EF4-FFF2-40B4-BE49-F238E27FC236}">
-                <a16:creationId xmlns:a16="http://schemas.microsoft.com/office/drawing/2014/main" id="{1A86364E-4B4A-25F5-F6B9-3ED2D611FCB6}"/>
-              </a:ext>
-            </a:extLst>
-          </p:cNvPr>
-          <p:cNvSpPr/>
-          <p:nvPr/>
-        </p:nvSpPr>
-        <p:spPr>
-          <a:xfrm>
-            <a:off x="4046431" y="1534320"/>
-            <a:ext cx="2690096" cy="3526522"/>
-          </a:xfrm>
-          <a:prstGeom prst="roundRect">
-            <a:avLst>
-              <a:gd name="adj" fmla="val 1691"/>
-            </a:avLst>
-          </a:prstGeom>
-          <a:noFill/>
-        </p:spPr>
-        <p:style>
-          <a:lnRef idx="2">
-            <a:schemeClr val="accent1"/>
-          </a:lnRef>
-          <a:fillRef idx="1">
-            <a:schemeClr val="lt1"/>
-          </a:fillRef>
-          <a:effectRef idx="0">
-            <a:schemeClr val="accent1"/>
-          </a:effectRef>
-          <a:fontRef idx="minor">
-            <a:schemeClr val="dk1"/>
-          </a:fontRef>
-        </p:style>
-        <p:txBody>
-          <a:bodyPr rtlCol="0" anchor="ctr"/>
-          <a:lstStyle/>
-          <a:p>
-            <a:pPr algn="r"/>
-            <a:endParaRPr lang="fr-FR" dirty="0"/>
-          </a:p>
-        </p:txBody>
-      </p:sp>
-      <p:sp>
-        <p:nvSpPr>
-          <p:cNvPr id="8" name="Rectangle : coins arrondis 7">
-            <a:extLst>
-              <a:ext uri="{FF2B5EF4-FFF2-40B4-BE49-F238E27FC236}">
-                <a16:creationId xmlns:a16="http://schemas.microsoft.com/office/drawing/2014/main" id="{784D7F57-DCD9-FF19-1D50-01AEC1AFCAAE}"/>
-              </a:ext>
-            </a:extLst>
-          </p:cNvPr>
-          <p:cNvSpPr/>
-          <p:nvPr/>
-        </p:nvSpPr>
-        <p:spPr>
-          <a:xfrm>
-            <a:off x="4046429" y="1534320"/>
-            <a:ext cx="2690098" cy="402322"/>
-          </a:xfrm>
-          <a:prstGeom prst="roundRect">
-            <a:avLst/>
-          </a:prstGeom>
-        </p:spPr>
-        <p:style>
-          <a:lnRef idx="0">
-            <a:schemeClr val="accent1"/>
-          </a:lnRef>
-          <a:fillRef idx="3">
-            <a:schemeClr val="accent1"/>
-          </a:fillRef>
-          <a:effectRef idx="3">
-            <a:schemeClr val="accent1"/>
-          </a:effectRef>
-          <a:fontRef idx="minor">
-            <a:schemeClr val="lt1"/>
-          </a:fontRef>
-        </p:style>
-        <p:txBody>
-          <a:bodyPr rtlCol="0" anchor="ctr"/>
-          <a:lstStyle/>
-          <a:p>
-            <a:pPr algn="ctr"/>
-            <a:r>
-              <a:rPr lang="fr-FR" sz="1400" dirty="0"/>
-              <a:t>Tableau de catégorie</a:t>
-            </a:r>
-          </a:p>
-        </p:txBody>
-      </p:sp>
-      <p:pic>
-        <p:nvPicPr>
-          <p:cNvPr id="14" name="Image 13">
-            <a:extLst>
-              <a:ext uri="{FF2B5EF4-FFF2-40B4-BE49-F238E27FC236}">
-                <a16:creationId xmlns:a16="http://schemas.microsoft.com/office/drawing/2014/main" id="{569F78C2-1079-9B2D-317A-BEFB7F12F78D}"/>
-              </a:ext>
-            </a:extLst>
-          </p:cNvPr>
-          <p:cNvPicPr>
-            <a:picLocks noChangeAspect="1"/>
-          </p:cNvPicPr>
-          <p:nvPr/>
-        </p:nvPicPr>
-        <p:blipFill>
-          <a:blip r:embed="rId2"/>
-          <a:stretch>
-            <a:fillRect/>
-          </a:stretch>
-        </p:blipFill>
-        <p:spPr>
-          <a:xfrm>
-            <a:off x="571095" y="2515039"/>
-            <a:ext cx="2834168" cy="3194967"/>
-          </a:xfrm>
-          <a:prstGeom prst="rect">
-            <a:avLst/>
-          </a:prstGeom>
-        </p:spPr>
-      </p:pic>
-      <p:pic>
-        <p:nvPicPr>
-          <p:cNvPr id="15" name="Image 14">
-            <a:extLst>
-              <a:ext uri="{FF2B5EF4-FFF2-40B4-BE49-F238E27FC236}">
-                <a16:creationId xmlns:a16="http://schemas.microsoft.com/office/drawing/2014/main" id="{E087A879-379E-56AC-1AF7-F653744646ED}"/>
-              </a:ext>
-            </a:extLst>
-          </p:cNvPr>
-          <p:cNvPicPr>
-            <a:picLocks noChangeAspect="1"/>
-          </p:cNvPicPr>
-          <p:nvPr/>
-        </p:nvPicPr>
-        <p:blipFill>
-          <a:blip r:embed="rId3"/>
-          <a:stretch>
-            <a:fillRect/>
-          </a:stretch>
-        </p:blipFill>
-        <p:spPr>
-          <a:xfrm>
-            <a:off x="4226822" y="2083601"/>
-            <a:ext cx="2270163" cy="2826353"/>
-          </a:xfrm>
-          <a:prstGeom prst="rect">
-            <a:avLst/>
-          </a:prstGeom>
-        </p:spPr>
-      </p:pic>
-      <p:sp>
-        <p:nvSpPr>
-          <p:cNvPr id="16" name="Rectangle : coins arrondis 15">
-            <a:extLst>
-              <a:ext uri="{FF2B5EF4-FFF2-40B4-BE49-F238E27FC236}">
-                <a16:creationId xmlns:a16="http://schemas.microsoft.com/office/drawing/2014/main" id="{EFB40968-59E3-B5AA-6426-D47479177ACF}"/>
-              </a:ext>
-            </a:extLst>
-          </p:cNvPr>
-          <p:cNvSpPr/>
-          <p:nvPr/>
-        </p:nvSpPr>
-        <p:spPr>
-          <a:xfrm>
-            <a:off x="7032172" y="2720037"/>
-            <a:ext cx="4938769" cy="3526522"/>
-          </a:xfrm>
-          <a:prstGeom prst="roundRect">
-            <a:avLst>
-              <a:gd name="adj" fmla="val 1691"/>
-            </a:avLst>
-          </a:prstGeom>
-          <a:noFill/>
-        </p:spPr>
-        <p:style>
-          <a:lnRef idx="2">
-            <a:schemeClr val="accent1"/>
-          </a:lnRef>
-          <a:fillRef idx="1">
-            <a:schemeClr val="lt1"/>
-          </a:fillRef>
-          <a:effectRef idx="0">
-            <a:schemeClr val="accent1"/>
-          </a:effectRef>
-          <a:fontRef idx="minor">
-            <a:schemeClr val="dk1"/>
-          </a:fontRef>
-        </p:style>
-        <p:txBody>
-          <a:bodyPr rtlCol="0" anchor="ctr"/>
-          <a:lstStyle/>
-          <a:p>
-            <a:pPr algn="r"/>
-            <a:endParaRPr lang="fr-FR" dirty="0"/>
-          </a:p>
-        </p:txBody>
-      </p:sp>
-      <p:sp>
-        <p:nvSpPr>
-          <p:cNvPr id="17" name="Rectangle : coins arrondis 16">
-            <a:extLst>
-              <a:ext uri="{FF2B5EF4-FFF2-40B4-BE49-F238E27FC236}">
-                <a16:creationId xmlns:a16="http://schemas.microsoft.com/office/drawing/2014/main" id="{27C9924D-127A-4599-64CD-4C4545D933E9}"/>
-              </a:ext>
-            </a:extLst>
-          </p:cNvPr>
-          <p:cNvSpPr/>
-          <p:nvPr/>
-        </p:nvSpPr>
-        <p:spPr>
-          <a:xfrm>
-            <a:off x="7032170" y="2720037"/>
-            <a:ext cx="4938769" cy="402322"/>
-          </a:xfrm>
-          <a:prstGeom prst="roundRect">
-            <a:avLst/>
-          </a:prstGeom>
-        </p:spPr>
-        <p:style>
-          <a:lnRef idx="0">
-            <a:schemeClr val="accent1"/>
-          </a:lnRef>
-          <a:fillRef idx="3">
-            <a:schemeClr val="accent1"/>
-          </a:fillRef>
-          <a:effectRef idx="3">
-            <a:schemeClr val="accent1"/>
-          </a:effectRef>
-          <a:fontRef idx="minor">
-            <a:schemeClr val="lt1"/>
-          </a:fontRef>
-        </p:style>
-        <p:txBody>
-          <a:bodyPr rtlCol="0" anchor="ctr"/>
-          <a:lstStyle/>
-          <a:p>
-            <a:pPr algn="ctr"/>
-            <a:r>
-              <a:rPr lang="fr-FR" sz="1400" dirty="0"/>
-              <a:t>Poule de catégorie</a:t>
-            </a:r>
-          </a:p>
-        </p:txBody>
-      </p:sp>
-      <p:pic>
-        <p:nvPicPr>
-          <p:cNvPr id="18" name="Image 17">
-            <a:extLst>
-              <a:ext uri="{FF2B5EF4-FFF2-40B4-BE49-F238E27FC236}">
-                <a16:creationId xmlns:a16="http://schemas.microsoft.com/office/drawing/2014/main" id="{B16364DA-96FA-F0CD-AE6C-E157B021F957}"/>
-              </a:ext>
-            </a:extLst>
-          </p:cNvPr>
-          <p:cNvPicPr>
-            <a:picLocks noChangeAspect="1"/>
-          </p:cNvPicPr>
-          <p:nvPr/>
-        </p:nvPicPr>
-        <p:blipFill>
-          <a:blip r:embed="rId4"/>
-          <a:stretch>
-            <a:fillRect/>
-          </a:stretch>
-        </p:blipFill>
-        <p:spPr>
-          <a:xfrm>
-            <a:off x="7204249" y="3288701"/>
-            <a:ext cx="2660296" cy="1978623"/>
-          </a:xfrm>
-          <a:prstGeom prst="rect">
-            <a:avLst/>
-          </a:prstGeom>
-        </p:spPr>
-      </p:pic>
-      <p:pic>
-        <p:nvPicPr>
-          <p:cNvPr id="19" name="Image 18">
-            <a:extLst>
-              <a:ext uri="{FF2B5EF4-FFF2-40B4-BE49-F238E27FC236}">
-                <a16:creationId xmlns:a16="http://schemas.microsoft.com/office/drawing/2014/main" id="{0C7124AE-7EA4-DB9F-D8BC-2C87D82F528E}"/>
-              </a:ext>
-            </a:extLst>
-          </p:cNvPr>
-          <p:cNvPicPr>
-            <a:picLocks noChangeAspect="1"/>
-          </p:cNvPicPr>
-          <p:nvPr/>
-        </p:nvPicPr>
-        <p:blipFill>
-          <a:blip r:embed="rId5"/>
-          <a:stretch>
-            <a:fillRect/>
-          </a:stretch>
-        </p:blipFill>
-        <p:spPr>
-          <a:xfrm>
-            <a:off x="9116679" y="4055692"/>
-            <a:ext cx="2656626" cy="2010299"/>
-          </a:xfrm>
-          <a:prstGeom prst="rect">
-            <a:avLst/>
-          </a:prstGeom>
-        </p:spPr>
-      </p:pic>
-      <p:cxnSp>
-        <p:nvCxnSpPr>
-          <p:cNvPr id="11" name="Connecteur : en angle 10">
-            <a:extLst>
-              <a:ext uri="{FF2B5EF4-FFF2-40B4-BE49-F238E27FC236}">
-                <a16:creationId xmlns:a16="http://schemas.microsoft.com/office/drawing/2014/main" id="{F5813451-B99C-85D9-890B-7BD6D792A98D}"/>
-              </a:ext>
-            </a:extLst>
-          </p:cNvPr>
-          <p:cNvCxnSpPr>
-            <a:cxnSpLocks/>
-            <a:endCxn id="15" idx="1"/>
-          </p:cNvCxnSpPr>
-          <p:nvPr/>
-        </p:nvCxnSpPr>
-        <p:spPr>
-          <a:xfrm flipV="1">
-            <a:off x="2916791" y="3496778"/>
-            <a:ext cx="1310031" cy="1237147"/>
-          </a:xfrm>
-          <a:prstGeom prst="curvedConnector3">
-            <a:avLst>
-              <a:gd name="adj1" fmla="val 50000"/>
-            </a:avLst>
-          </a:prstGeom>
-          <a:ln>
-            <a:headEnd type="diamond" w="med" len="med"/>
-            <a:tailEnd type="triangle" w="med" len="med"/>
-          </a:ln>
-        </p:spPr>
-        <p:style>
-          <a:lnRef idx="1">
-            <a:schemeClr val="accent1"/>
-          </a:lnRef>
-          <a:fillRef idx="0">
-            <a:schemeClr val="accent1"/>
-          </a:fillRef>
-          <a:effectRef idx="0">
-            <a:schemeClr val="accent1"/>
-          </a:effectRef>
-          <a:fontRef idx="minor">
-            <a:schemeClr val="tx1"/>
-          </a:fontRef>
-        </p:style>
-      </p:cxnSp>
-      <p:cxnSp>
-        <p:nvCxnSpPr>
-          <p:cNvPr id="22" name="Connecteur : en angle 10">
-            <a:extLst>
-              <a:ext uri="{FF2B5EF4-FFF2-40B4-BE49-F238E27FC236}">
-                <a16:creationId xmlns:a16="http://schemas.microsoft.com/office/drawing/2014/main" id="{49F7FAC1-9236-3A9E-5C30-67587362A919}"/>
-              </a:ext>
-            </a:extLst>
-          </p:cNvPr>
-          <p:cNvCxnSpPr>
-            <a:cxnSpLocks/>
-            <a:endCxn id="18" idx="2"/>
-          </p:cNvCxnSpPr>
-          <p:nvPr/>
-        </p:nvCxnSpPr>
-        <p:spPr>
-          <a:xfrm>
-            <a:off x="2916791" y="4909954"/>
-            <a:ext cx="5617606" cy="357370"/>
-          </a:xfrm>
-          <a:prstGeom prst="curvedConnector4">
-            <a:avLst>
-              <a:gd name="adj1" fmla="val 20527"/>
-              <a:gd name="adj2" fmla="val 163967"/>
-            </a:avLst>
-          </a:prstGeom>
-          <a:ln>
-            <a:headEnd type="diamond" w="med" len="med"/>
-            <a:tailEnd type="triangle" w="med" len="med"/>
-          </a:ln>
-        </p:spPr>
-        <p:style>
-          <a:lnRef idx="1">
-            <a:schemeClr val="accent1"/>
-          </a:lnRef>
-          <a:fillRef idx="0">
-            <a:schemeClr val="accent1"/>
-          </a:fillRef>
-          <a:effectRef idx="0">
-            <a:schemeClr val="accent1"/>
-          </a:effectRef>
-          <a:fontRef idx="minor">
-            <a:schemeClr val="tx1"/>
-          </a:fontRef>
-        </p:style>
-      </p:cxnSp>
-      <p:sp>
-        <p:nvSpPr>
-          <p:cNvPr id="26" name="Légende : encadrée à une bordure 25">
-            <a:extLst>
-              <a:ext uri="{FF2B5EF4-FFF2-40B4-BE49-F238E27FC236}">
-                <a16:creationId xmlns:a16="http://schemas.microsoft.com/office/drawing/2014/main" id="{6D3D5DAC-84E4-A2D1-6D7D-E05FD8DFE120}"/>
-              </a:ext>
-            </a:extLst>
-          </p:cNvPr>
-          <p:cNvSpPr/>
-          <p:nvPr/>
-        </p:nvSpPr>
-        <p:spPr>
-          <a:xfrm flipH="1">
-            <a:off x="7032170" y="2188659"/>
-            <a:ext cx="1806691" cy="331600"/>
-          </a:xfrm>
-          <a:prstGeom prst="accentBorderCallout1">
-            <a:avLst>
-              <a:gd name="adj1" fmla="val 18750"/>
-              <a:gd name="adj2" fmla="val -8333"/>
-              <a:gd name="adj3" fmla="val 535974"/>
-              <a:gd name="adj4" fmla="val -72045"/>
-            </a:avLst>
-          </a:prstGeom>
-          <a:solidFill>
-            <a:schemeClr val="accent6">
-              <a:alpha val="50000"/>
-            </a:schemeClr>
-          </a:solidFill>
-          <a:ln>
-            <a:solidFill>
-              <a:schemeClr val="accent6"/>
-            </a:solidFill>
-          </a:ln>
-        </p:spPr>
-        <p:style>
-          <a:lnRef idx="0">
-            <a:scrgbClr r="0" g="0" b="0"/>
-          </a:lnRef>
-          <a:fillRef idx="0">
-            <a:scrgbClr r="0" g="0" b="0"/>
-          </a:fillRef>
-          <a:effectRef idx="0">
-            <a:scrgbClr r="0" g="0" b="0"/>
-          </a:effectRef>
-          <a:fontRef idx="minor">
-            <a:schemeClr val="lt1"/>
-          </a:fontRef>
-        </p:style>
-        <p:txBody>
-          <a:bodyPr rtlCol="0" anchor="ctr"/>
-          <a:lstStyle/>
-          <a:p>
-            <a:pPr algn="ctr"/>
-            <a:r>
-              <a:rPr lang="fr-FR" sz="1050" dirty="0"/>
-              <a:t>Selon la disposition configuré</a:t>
-            </a:r>
-          </a:p>
-        </p:txBody>
-      </p:sp>
-    </p:spTree>
-    <p:extLst>
-      <p:ext uri="{BB962C8B-B14F-4D97-AF65-F5344CB8AC3E}">
-        <p14:creationId xmlns:p14="http://schemas.microsoft.com/office/powerpoint/2010/main" val="1262413790"/>
-      </p:ext>
-    </p:extLst>
-  </p:cSld>
-  <p:clrMapOvr>
-    <a:masterClrMapping/>
-  </p:clrMapOvr>
-</p:sld>
-</file>
-
 <file path=ppt/slides/slide33.xml><?xml version="1.0" encoding="utf-8"?>
 <p:sld xmlns:a="http://schemas.openxmlformats.org/drawingml/2006/main" xmlns:r="http://schemas.openxmlformats.org/officeDocument/2006/relationships" xmlns:p="http://schemas.openxmlformats.org/presentationml/2006/main">
   <p:cSld>
@@ -34462,66 +34556,10 @@
       </p:grpSpPr>
       <p:sp>
         <p:nvSpPr>
-          <p:cNvPr id="2" name="Titre 1">
-            <a:extLst>
-              <a:ext uri="{FF2B5EF4-FFF2-40B4-BE49-F238E27FC236}">
-                <a16:creationId xmlns:a16="http://schemas.microsoft.com/office/drawing/2014/main" id="{2C198829-35EB-6A46-EBAA-6A582DAFE970}"/>
-              </a:ext>
-            </a:extLst>
-          </p:cNvPr>
-          <p:cNvSpPr>
-            <a:spLocks noGrp="1"/>
-          </p:cNvSpPr>
-          <p:nvPr>
-            <p:ph type="title"/>
-          </p:nvPr>
-        </p:nvSpPr>
-        <p:spPr/>
-        <p:txBody>
-          <a:bodyPr/>
-          <a:lstStyle/>
-          <a:p>
-            <a:r>
-              <a:rPr lang="fr-FR" dirty="0"/>
-              <a:t>Plan du Site utilisateur – Classements</a:t>
-            </a:r>
-          </a:p>
-        </p:txBody>
-      </p:sp>
-      <p:sp>
-        <p:nvSpPr>
-          <p:cNvPr id="4" name="Espace réservé du texte 3">
-            <a:extLst>
-              <a:ext uri="{FF2B5EF4-FFF2-40B4-BE49-F238E27FC236}">
-                <a16:creationId xmlns:a16="http://schemas.microsoft.com/office/drawing/2014/main" id="{55EE5942-743C-7FE0-DDCC-8AF825345982}"/>
-              </a:ext>
-            </a:extLst>
-          </p:cNvPr>
-          <p:cNvSpPr>
-            <a:spLocks noGrp="1"/>
-          </p:cNvSpPr>
-          <p:nvPr>
-            <p:ph type="body" sz="quarter" idx="15"/>
-          </p:nvPr>
-        </p:nvSpPr>
-        <p:spPr/>
-        <p:txBody>
-          <a:bodyPr/>
-          <a:lstStyle/>
-          <a:p>
-            <a:r>
-              <a:rPr lang="fr-FR" dirty="0"/>
-              <a:t>Annexe</a:t>
-            </a:r>
-          </a:p>
-        </p:txBody>
-      </p:sp>
-      <p:sp>
-        <p:nvSpPr>
-          <p:cNvPr id="3" name="Rectangle : coins arrondis 2">
-            <a:extLst>
-              <a:ext uri="{FF2B5EF4-FFF2-40B4-BE49-F238E27FC236}">
-                <a16:creationId xmlns:a16="http://schemas.microsoft.com/office/drawing/2014/main" id="{503174A0-941A-A415-3B71-EFB82484532B}"/>
+          <p:cNvPr id="40" name="Rectangle : coins arrondis 39">
+            <a:extLst>
+              <a:ext uri="{FF2B5EF4-FFF2-40B4-BE49-F238E27FC236}">
+                <a16:creationId xmlns:a16="http://schemas.microsoft.com/office/drawing/2014/main" id="{58A34438-3D1A-7ADA-6577-FC12D5E3BB3A}"/>
               </a:ext>
             </a:extLst>
           </p:cNvPr>
@@ -34530,8 +34568,8 @@
         </p:nvSpPr>
         <p:spPr>
           <a:xfrm>
-            <a:off x="1240592" y="1972782"/>
-            <a:ext cx="3529729" cy="3861738"/>
+            <a:off x="3231116" y="1647522"/>
+            <a:ext cx="5829064" cy="4808792"/>
           </a:xfrm>
           <a:prstGeom prst="roundRect">
             <a:avLst>
@@ -34565,10 +34603,66 @@
       </p:sp>
       <p:sp>
         <p:nvSpPr>
-          <p:cNvPr id="6" name="Rectangle : coins arrondis 5">
-            <a:extLst>
-              <a:ext uri="{FF2B5EF4-FFF2-40B4-BE49-F238E27FC236}">
-                <a16:creationId xmlns:a16="http://schemas.microsoft.com/office/drawing/2014/main" id="{1FF9D910-74CE-77AC-4697-C5E04C287AF0}"/>
+          <p:cNvPr id="2" name="Titre 1">
+            <a:extLst>
+              <a:ext uri="{FF2B5EF4-FFF2-40B4-BE49-F238E27FC236}">
+                <a16:creationId xmlns:a16="http://schemas.microsoft.com/office/drawing/2014/main" id="{2C198829-35EB-6A46-EBAA-6A582DAFE970}"/>
+              </a:ext>
+            </a:extLst>
+          </p:cNvPr>
+          <p:cNvSpPr>
+            <a:spLocks noGrp="1"/>
+          </p:cNvSpPr>
+          <p:nvPr>
+            <p:ph type="title"/>
+          </p:nvPr>
+        </p:nvSpPr>
+        <p:spPr/>
+        <p:txBody>
+          <a:bodyPr/>
+          <a:lstStyle/>
+          <a:p>
+            <a:r>
+              <a:rPr lang="fr-FR" dirty="0"/>
+              <a:t>Plan du Site utilisateur – Affectations</a:t>
+            </a:r>
+          </a:p>
+        </p:txBody>
+      </p:sp>
+      <p:sp>
+        <p:nvSpPr>
+          <p:cNvPr id="4" name="Espace réservé du texte 3">
+            <a:extLst>
+              <a:ext uri="{FF2B5EF4-FFF2-40B4-BE49-F238E27FC236}">
+                <a16:creationId xmlns:a16="http://schemas.microsoft.com/office/drawing/2014/main" id="{55EE5942-743C-7FE0-DDCC-8AF825345982}"/>
+              </a:ext>
+            </a:extLst>
+          </p:cNvPr>
+          <p:cNvSpPr>
+            <a:spLocks noGrp="1"/>
+          </p:cNvSpPr>
+          <p:nvPr>
+            <p:ph type="body" sz="quarter" idx="15"/>
+          </p:nvPr>
+        </p:nvSpPr>
+        <p:spPr/>
+        <p:txBody>
+          <a:bodyPr/>
+          <a:lstStyle/>
+          <a:p>
+            <a:r>
+              <a:rPr lang="fr-FR" dirty="0"/>
+              <a:t>Annexe</a:t>
+            </a:r>
+          </a:p>
+        </p:txBody>
+      </p:sp>
+      <p:sp>
+        <p:nvSpPr>
+          <p:cNvPr id="34" name="Rectangle : coins arrondis 33">
+            <a:extLst>
+              <a:ext uri="{FF2B5EF4-FFF2-40B4-BE49-F238E27FC236}">
+                <a16:creationId xmlns:a16="http://schemas.microsoft.com/office/drawing/2014/main" id="{2A9E8854-3740-AEB4-DA1E-41A230566829}"/>
               </a:ext>
             </a:extLst>
           </p:cNvPr>
@@ -34577,8 +34671,8 @@
         </p:nvSpPr>
         <p:spPr>
           <a:xfrm>
-            <a:off x="1240590" y="1965098"/>
-            <a:ext cx="3529731" cy="402322"/>
+            <a:off x="3231114" y="1639838"/>
+            <a:ext cx="5829066" cy="402322"/>
           </a:xfrm>
           <a:prstGeom prst="roundRect">
             <a:avLst/>
@@ -34605,111 +34699,17 @@
             <a:pPr algn="ctr"/>
             <a:r>
               <a:rPr lang="fr-FR" sz="1400" dirty="0"/>
-              <a:t>Classements (choix de catégorie)</a:t>
-            </a:r>
-          </a:p>
-        </p:txBody>
-      </p:sp>
-      <p:sp>
-        <p:nvSpPr>
-          <p:cNvPr id="7" name="Rectangle : coins arrondis 6">
-            <a:extLst>
-              <a:ext uri="{FF2B5EF4-FFF2-40B4-BE49-F238E27FC236}">
-                <a16:creationId xmlns:a16="http://schemas.microsoft.com/office/drawing/2014/main" id="{1A86364E-4B4A-25F5-F6B9-3ED2D611FCB6}"/>
-              </a:ext>
-            </a:extLst>
-          </p:cNvPr>
-          <p:cNvSpPr/>
-          <p:nvPr/>
-        </p:nvSpPr>
-        <p:spPr>
-          <a:xfrm>
-            <a:off x="6427681" y="1965098"/>
-            <a:ext cx="3678344" cy="3526522"/>
-          </a:xfrm>
-          <a:prstGeom prst="roundRect">
-            <a:avLst>
-              <a:gd name="adj" fmla="val 1691"/>
-            </a:avLst>
-          </a:prstGeom>
-          <a:noFill/>
-        </p:spPr>
-        <p:style>
-          <a:lnRef idx="2">
-            <a:schemeClr val="accent1"/>
-          </a:lnRef>
-          <a:fillRef idx="1">
-            <a:schemeClr val="lt1"/>
-          </a:fillRef>
-          <a:effectRef idx="0">
-            <a:schemeClr val="accent1"/>
-          </a:effectRef>
-          <a:fontRef idx="minor">
-            <a:schemeClr val="dk1"/>
-          </a:fontRef>
-        </p:style>
-        <p:txBody>
-          <a:bodyPr rtlCol="0" anchor="ctr"/>
-          <a:lstStyle/>
-          <a:p>
-            <a:pPr algn="r"/>
-            <a:endParaRPr lang="fr-FR" dirty="0"/>
-          </a:p>
-        </p:txBody>
-      </p:sp>
-      <p:sp>
-        <p:nvSpPr>
-          <p:cNvPr id="8" name="Rectangle : coins arrondis 7">
-            <a:extLst>
-              <a:ext uri="{FF2B5EF4-FFF2-40B4-BE49-F238E27FC236}">
-                <a16:creationId xmlns:a16="http://schemas.microsoft.com/office/drawing/2014/main" id="{784D7F57-DCD9-FF19-1D50-01AEC1AFCAAE}"/>
-              </a:ext>
-            </a:extLst>
-          </p:cNvPr>
-          <p:cNvSpPr/>
-          <p:nvPr/>
-        </p:nvSpPr>
-        <p:spPr>
-          <a:xfrm>
-            <a:off x="6427679" y="1965098"/>
-            <a:ext cx="3678346" cy="402322"/>
-          </a:xfrm>
-          <a:prstGeom prst="roundRect">
-            <a:avLst/>
-          </a:prstGeom>
-        </p:spPr>
-        <p:style>
-          <a:lnRef idx="0">
-            <a:schemeClr val="accent1"/>
-          </a:lnRef>
-          <a:fillRef idx="3">
-            <a:schemeClr val="accent1"/>
-          </a:fillRef>
-          <a:effectRef idx="3">
-            <a:schemeClr val="accent1"/>
-          </a:effectRef>
-          <a:fontRef idx="minor">
-            <a:schemeClr val="lt1"/>
-          </a:fontRef>
-        </p:style>
-        <p:txBody>
-          <a:bodyPr rtlCol="0" anchor="ctr"/>
-          <a:lstStyle/>
-          <a:p>
-            <a:pPr algn="ctr"/>
-            <a:r>
-              <a:rPr lang="fr-FR" sz="1400" dirty="0"/>
-              <a:t>Tableau de classement de la catégorie</a:t>
+              <a:t>Affectations des tapis</a:t>
             </a:r>
           </a:p>
         </p:txBody>
       </p:sp>
       <p:pic>
         <p:nvPicPr>
-          <p:cNvPr id="14" name="Image 13">
-            <a:extLst>
-              <a:ext uri="{FF2B5EF4-FFF2-40B4-BE49-F238E27FC236}">
-                <a16:creationId xmlns:a16="http://schemas.microsoft.com/office/drawing/2014/main" id="{569F78C2-1079-9B2D-317A-BEFB7F12F78D}"/>
+          <p:cNvPr id="5" name="Image 4">
+            <a:extLst>
+              <a:ext uri="{FF2B5EF4-FFF2-40B4-BE49-F238E27FC236}">
+                <a16:creationId xmlns:a16="http://schemas.microsoft.com/office/drawing/2014/main" id="{299E2910-1D4D-F715-AB09-C6B0203E31BC}"/>
               </a:ext>
             </a:extLst>
           </p:cNvPr>
@@ -34726,82 +34726,8 @@
         </p:blipFill>
         <p:spPr>
           <a:xfrm>
-            <a:off x="1590628" y="2515039"/>
-            <a:ext cx="2834168" cy="3194967"/>
-          </a:xfrm>
-          <a:prstGeom prst="rect">
-            <a:avLst/>
-          </a:prstGeom>
-        </p:spPr>
-      </p:pic>
-      <p:cxnSp>
-        <p:nvCxnSpPr>
-          <p:cNvPr id="11" name="Connecteur : en angle 10">
-            <a:extLst>
-              <a:ext uri="{FF2B5EF4-FFF2-40B4-BE49-F238E27FC236}">
-                <a16:creationId xmlns:a16="http://schemas.microsoft.com/office/drawing/2014/main" id="{F5813451-B99C-85D9-890B-7BD6D792A98D}"/>
-              </a:ext>
-            </a:extLst>
-          </p:cNvPr>
-          <p:cNvCxnSpPr>
-            <a:cxnSpLocks/>
-          </p:cNvCxnSpPr>
-          <p:nvPr/>
-        </p:nvCxnSpPr>
-        <p:spPr>
-          <a:xfrm flipV="1">
-            <a:off x="3936324" y="3276600"/>
-            <a:ext cx="3135075" cy="1457325"/>
-          </a:xfrm>
-          <a:prstGeom prst="curvedConnector3">
-            <a:avLst>
-              <a:gd name="adj1" fmla="val 50000"/>
-            </a:avLst>
-          </a:prstGeom>
-          <a:ln>
-            <a:headEnd type="diamond" w="med" len="med"/>
-            <a:tailEnd type="triangle" w="med" len="med"/>
-          </a:ln>
-        </p:spPr>
-        <p:style>
-          <a:lnRef idx="1">
-            <a:schemeClr val="accent1"/>
-          </a:lnRef>
-          <a:fillRef idx="0">
-            <a:schemeClr val="accent1"/>
-          </a:fillRef>
-          <a:effectRef idx="0">
-            <a:schemeClr val="accent1"/>
-          </a:effectRef>
-          <a:fontRef idx="minor">
-            <a:schemeClr val="tx1"/>
-          </a:fontRef>
-        </p:style>
-      </p:cxnSp>
-      <p:pic>
-        <p:nvPicPr>
-          <p:cNvPr id="5" name="Image 4">
-            <a:extLst>
-              <a:ext uri="{FF2B5EF4-FFF2-40B4-BE49-F238E27FC236}">
-                <a16:creationId xmlns:a16="http://schemas.microsoft.com/office/drawing/2014/main" id="{8B2F415D-8326-8A03-AE1D-86DD1719AD63}"/>
-              </a:ext>
-            </a:extLst>
-          </p:cNvPr>
-          <p:cNvPicPr>
-            <a:picLocks noChangeAspect="1"/>
-          </p:cNvPicPr>
-          <p:nvPr/>
-        </p:nvPicPr>
-        <p:blipFill>
-          <a:blip r:embed="rId3"/>
-          <a:stretch>
-            <a:fillRect/>
-          </a:stretch>
-        </p:blipFill>
-        <p:spPr>
-          <a:xfrm>
-            <a:off x="7071399" y="2602235"/>
-            <a:ext cx="2390905" cy="2724520"/>
+            <a:off x="3878697" y="2145295"/>
+            <a:ext cx="4533900" cy="4207884"/>
           </a:xfrm>
           <a:prstGeom prst="rect">
             <a:avLst/>
@@ -34811,7 +34737,7 @@
     </p:spTree>
     <p:extLst>
       <p:ext uri="{BB962C8B-B14F-4D97-AF65-F5344CB8AC3E}">
-        <p14:creationId xmlns:p14="http://schemas.microsoft.com/office/powerpoint/2010/main" val="1290928888"/>
+        <p14:creationId xmlns:p14="http://schemas.microsoft.com/office/powerpoint/2010/main" val="2055979273"/>
       </p:ext>
     </p:extLst>
   </p:cSld>
@@ -34840,10 +34766,10 @@
       </p:grpSpPr>
       <p:sp>
         <p:nvSpPr>
-          <p:cNvPr id="4" name="Espace réservé du texte 3">
-            <a:extLst>
-              <a:ext uri="{FF2B5EF4-FFF2-40B4-BE49-F238E27FC236}">
-                <a16:creationId xmlns:a16="http://schemas.microsoft.com/office/drawing/2014/main" id="{B34A2E28-8332-4A52-825F-FE0C7BBC4CC4}"/>
+          <p:cNvPr id="2" name="Titre 1">
+            <a:extLst>
+              <a:ext uri="{FF2B5EF4-FFF2-40B4-BE49-F238E27FC236}">
+                <a16:creationId xmlns:a16="http://schemas.microsoft.com/office/drawing/2014/main" id="{2C198829-35EB-6A46-EBAA-6A582DAFE970}"/>
               </a:ext>
             </a:extLst>
           </p:cNvPr>
@@ -34851,7 +34777,7 @@
             <a:spLocks noGrp="1"/>
           </p:cNvSpPr>
           <p:nvPr>
-            <p:ph type="body" sz="quarter" idx="10"/>
+            <p:ph type="title"/>
           </p:nvPr>
         </p:nvSpPr>
         <p:spPr/>
@@ -34859,35 +34785,1004 @@
           <a:bodyPr/>
           <a:lstStyle/>
           <a:p>
+            <a:r>
+              <a:rPr lang="fr-FR" dirty="0"/>
+              <a:t>Plan du Site utilisateur – Avancements</a:t>
+            </a:r>
+          </a:p>
+        </p:txBody>
+      </p:sp>
+      <p:sp>
+        <p:nvSpPr>
+          <p:cNvPr id="4" name="Espace réservé du texte 3">
+            <a:extLst>
+              <a:ext uri="{FF2B5EF4-FFF2-40B4-BE49-F238E27FC236}">
+                <a16:creationId xmlns:a16="http://schemas.microsoft.com/office/drawing/2014/main" id="{55EE5942-743C-7FE0-DDCC-8AF825345982}"/>
+              </a:ext>
+            </a:extLst>
+          </p:cNvPr>
+          <p:cNvSpPr>
+            <a:spLocks noGrp="1"/>
+          </p:cNvSpPr>
+          <p:nvPr>
+            <p:ph type="body" sz="quarter" idx="15"/>
+          </p:nvPr>
+        </p:nvSpPr>
+        <p:spPr/>
+        <p:txBody>
+          <a:bodyPr/>
+          <a:lstStyle/>
+          <a:p>
+            <a:r>
+              <a:rPr lang="fr-FR" dirty="0"/>
+              <a:t>Annexe</a:t>
+            </a:r>
+          </a:p>
+        </p:txBody>
+      </p:sp>
+      <p:sp>
+        <p:nvSpPr>
+          <p:cNvPr id="3" name="Rectangle : coins arrondis 2">
+            <a:extLst>
+              <a:ext uri="{FF2B5EF4-FFF2-40B4-BE49-F238E27FC236}">
+                <a16:creationId xmlns:a16="http://schemas.microsoft.com/office/drawing/2014/main" id="{503174A0-941A-A415-3B71-EFB82484532B}"/>
+              </a:ext>
+            </a:extLst>
+          </p:cNvPr>
+          <p:cNvSpPr/>
+          <p:nvPr/>
+        </p:nvSpPr>
+        <p:spPr>
+          <a:xfrm>
+            <a:off x="221059" y="1972782"/>
+            <a:ext cx="3529729" cy="3861738"/>
+          </a:xfrm>
+          <a:prstGeom prst="roundRect">
+            <a:avLst>
+              <a:gd name="adj" fmla="val 1691"/>
+            </a:avLst>
+          </a:prstGeom>
+          <a:noFill/>
+        </p:spPr>
+        <p:style>
+          <a:lnRef idx="2">
+            <a:schemeClr val="accent1"/>
+          </a:lnRef>
+          <a:fillRef idx="1">
+            <a:schemeClr val="lt1"/>
+          </a:fillRef>
+          <a:effectRef idx="0">
+            <a:schemeClr val="accent1"/>
+          </a:effectRef>
+          <a:fontRef idx="minor">
+            <a:schemeClr val="dk1"/>
+          </a:fontRef>
+        </p:style>
+        <p:txBody>
+          <a:bodyPr rtlCol="0" anchor="ctr"/>
+          <a:lstStyle/>
+          <a:p>
+            <a:pPr algn="r"/>
+            <a:endParaRPr lang="fr-FR" dirty="0"/>
+          </a:p>
+        </p:txBody>
+      </p:sp>
+      <p:sp>
+        <p:nvSpPr>
+          <p:cNvPr id="6" name="Rectangle : coins arrondis 5">
+            <a:extLst>
+              <a:ext uri="{FF2B5EF4-FFF2-40B4-BE49-F238E27FC236}">
+                <a16:creationId xmlns:a16="http://schemas.microsoft.com/office/drawing/2014/main" id="{1FF9D910-74CE-77AC-4697-C5E04C287AF0}"/>
+              </a:ext>
+            </a:extLst>
+          </p:cNvPr>
+          <p:cNvSpPr/>
+          <p:nvPr/>
+        </p:nvSpPr>
+        <p:spPr>
+          <a:xfrm>
+            <a:off x="221057" y="1965098"/>
+            <a:ext cx="3529731" cy="402322"/>
+          </a:xfrm>
+          <a:prstGeom prst="roundRect">
+            <a:avLst/>
+          </a:prstGeom>
+        </p:spPr>
+        <p:style>
+          <a:lnRef idx="0">
+            <a:schemeClr val="accent1"/>
+          </a:lnRef>
+          <a:fillRef idx="3">
+            <a:schemeClr val="accent1"/>
+          </a:fillRef>
+          <a:effectRef idx="3">
+            <a:schemeClr val="accent1"/>
+          </a:effectRef>
+          <a:fontRef idx="minor">
+            <a:schemeClr val="lt1"/>
+          </a:fontRef>
+        </p:style>
+        <p:txBody>
+          <a:bodyPr rtlCol="0" anchor="ctr"/>
+          <a:lstStyle/>
+          <a:p>
             <a:pPr algn="ctr"/>
             <a:r>
-              <a:rPr lang="fr-FR" sz="1300" b="1" dirty="0"/>
-              <a:t>CONTACT</a:t>
-            </a:r>
-          </a:p>
+              <a:rPr lang="fr-FR" sz="1400" dirty="0"/>
+              <a:t>Avancements (choix de catégorie)</a:t>
+            </a:r>
+          </a:p>
+        </p:txBody>
+      </p:sp>
+      <p:sp>
+        <p:nvSpPr>
+          <p:cNvPr id="7" name="Rectangle : coins arrondis 6">
+            <a:extLst>
+              <a:ext uri="{FF2B5EF4-FFF2-40B4-BE49-F238E27FC236}">
+                <a16:creationId xmlns:a16="http://schemas.microsoft.com/office/drawing/2014/main" id="{1A86364E-4B4A-25F5-F6B9-3ED2D611FCB6}"/>
+              </a:ext>
+            </a:extLst>
+          </p:cNvPr>
+          <p:cNvSpPr/>
+          <p:nvPr/>
+        </p:nvSpPr>
+        <p:spPr>
+          <a:xfrm>
+            <a:off x="4046431" y="1534320"/>
+            <a:ext cx="2690096" cy="3526522"/>
+          </a:xfrm>
+          <a:prstGeom prst="roundRect">
+            <a:avLst>
+              <a:gd name="adj" fmla="val 1691"/>
+            </a:avLst>
+          </a:prstGeom>
+          <a:noFill/>
+        </p:spPr>
+        <p:style>
+          <a:lnRef idx="2">
+            <a:schemeClr val="accent1"/>
+          </a:lnRef>
+          <a:fillRef idx="1">
+            <a:schemeClr val="lt1"/>
+          </a:fillRef>
+          <a:effectRef idx="0">
+            <a:schemeClr val="accent1"/>
+          </a:effectRef>
+          <a:fontRef idx="minor">
+            <a:schemeClr val="dk1"/>
+          </a:fontRef>
+        </p:style>
+        <p:txBody>
+          <a:bodyPr rtlCol="0" anchor="ctr"/>
+          <a:lstStyle/>
+          <a:p>
+            <a:pPr algn="r"/>
+            <a:endParaRPr lang="fr-FR" dirty="0"/>
+          </a:p>
+        </p:txBody>
+      </p:sp>
+      <p:sp>
+        <p:nvSpPr>
+          <p:cNvPr id="8" name="Rectangle : coins arrondis 7">
+            <a:extLst>
+              <a:ext uri="{FF2B5EF4-FFF2-40B4-BE49-F238E27FC236}">
+                <a16:creationId xmlns:a16="http://schemas.microsoft.com/office/drawing/2014/main" id="{784D7F57-DCD9-FF19-1D50-01AEC1AFCAAE}"/>
+              </a:ext>
+            </a:extLst>
+          </p:cNvPr>
+          <p:cNvSpPr/>
+          <p:nvPr/>
+        </p:nvSpPr>
+        <p:spPr>
+          <a:xfrm>
+            <a:off x="4046429" y="1534320"/>
+            <a:ext cx="2690098" cy="402322"/>
+          </a:xfrm>
+          <a:prstGeom prst="roundRect">
+            <a:avLst/>
+          </a:prstGeom>
+        </p:spPr>
+        <p:style>
+          <a:lnRef idx="0">
+            <a:schemeClr val="accent1"/>
+          </a:lnRef>
+          <a:fillRef idx="3">
+            <a:schemeClr val="accent1"/>
+          </a:fillRef>
+          <a:effectRef idx="3">
+            <a:schemeClr val="accent1"/>
+          </a:effectRef>
+          <a:fontRef idx="minor">
+            <a:schemeClr val="lt1"/>
+          </a:fontRef>
+        </p:style>
+        <p:txBody>
+          <a:bodyPr rtlCol="0" anchor="ctr"/>
+          <a:lstStyle/>
           <a:p>
             <a:pPr algn="ctr"/>
             <a:r>
+              <a:rPr lang="fr-FR" sz="1400" dirty="0"/>
+              <a:t>Tableau de catégorie</a:t>
+            </a:r>
+          </a:p>
+        </p:txBody>
+      </p:sp>
+      <p:pic>
+        <p:nvPicPr>
+          <p:cNvPr id="14" name="Image 13">
+            <a:extLst>
+              <a:ext uri="{FF2B5EF4-FFF2-40B4-BE49-F238E27FC236}">
+                <a16:creationId xmlns:a16="http://schemas.microsoft.com/office/drawing/2014/main" id="{569F78C2-1079-9B2D-317A-BEFB7F12F78D}"/>
+              </a:ext>
+            </a:extLst>
+          </p:cNvPr>
+          <p:cNvPicPr>
+            <a:picLocks noChangeAspect="1"/>
+          </p:cNvPicPr>
+          <p:nvPr/>
+        </p:nvPicPr>
+        <p:blipFill>
+          <a:blip r:embed="rId2"/>
+          <a:stretch>
+            <a:fillRect/>
+          </a:stretch>
+        </p:blipFill>
+        <p:spPr>
+          <a:xfrm>
+            <a:off x="571095" y="2515039"/>
+            <a:ext cx="2834168" cy="3194967"/>
+          </a:xfrm>
+          <a:prstGeom prst="rect">
+            <a:avLst/>
+          </a:prstGeom>
+        </p:spPr>
+      </p:pic>
+      <p:pic>
+        <p:nvPicPr>
+          <p:cNvPr id="15" name="Image 14">
+            <a:extLst>
+              <a:ext uri="{FF2B5EF4-FFF2-40B4-BE49-F238E27FC236}">
+                <a16:creationId xmlns:a16="http://schemas.microsoft.com/office/drawing/2014/main" id="{E087A879-379E-56AC-1AF7-F653744646ED}"/>
+              </a:ext>
+            </a:extLst>
+          </p:cNvPr>
+          <p:cNvPicPr>
+            <a:picLocks noChangeAspect="1"/>
+          </p:cNvPicPr>
+          <p:nvPr/>
+        </p:nvPicPr>
+        <p:blipFill>
+          <a:blip r:embed="rId3"/>
+          <a:stretch>
+            <a:fillRect/>
+          </a:stretch>
+        </p:blipFill>
+        <p:spPr>
+          <a:xfrm>
+            <a:off x="4226822" y="2083601"/>
+            <a:ext cx="2270163" cy="2826353"/>
+          </a:xfrm>
+          <a:prstGeom prst="rect">
+            <a:avLst/>
+          </a:prstGeom>
+        </p:spPr>
+      </p:pic>
+      <p:sp>
+        <p:nvSpPr>
+          <p:cNvPr id="16" name="Rectangle : coins arrondis 15">
+            <a:extLst>
+              <a:ext uri="{FF2B5EF4-FFF2-40B4-BE49-F238E27FC236}">
+                <a16:creationId xmlns:a16="http://schemas.microsoft.com/office/drawing/2014/main" id="{EFB40968-59E3-B5AA-6426-D47479177ACF}"/>
+              </a:ext>
+            </a:extLst>
+          </p:cNvPr>
+          <p:cNvSpPr/>
+          <p:nvPr/>
+        </p:nvSpPr>
+        <p:spPr>
+          <a:xfrm>
+            <a:off x="7032172" y="2720037"/>
+            <a:ext cx="4938769" cy="3526522"/>
+          </a:xfrm>
+          <a:prstGeom prst="roundRect">
+            <a:avLst>
+              <a:gd name="adj" fmla="val 1691"/>
+            </a:avLst>
+          </a:prstGeom>
+          <a:noFill/>
+        </p:spPr>
+        <p:style>
+          <a:lnRef idx="2">
+            <a:schemeClr val="accent1"/>
+          </a:lnRef>
+          <a:fillRef idx="1">
+            <a:schemeClr val="lt1"/>
+          </a:fillRef>
+          <a:effectRef idx="0">
+            <a:schemeClr val="accent1"/>
+          </a:effectRef>
+          <a:fontRef idx="minor">
+            <a:schemeClr val="dk1"/>
+          </a:fontRef>
+        </p:style>
+        <p:txBody>
+          <a:bodyPr rtlCol="0" anchor="ctr"/>
+          <a:lstStyle/>
+          <a:p>
+            <a:pPr algn="r"/>
+            <a:endParaRPr lang="fr-FR" dirty="0"/>
+          </a:p>
+        </p:txBody>
+      </p:sp>
+      <p:sp>
+        <p:nvSpPr>
+          <p:cNvPr id="17" name="Rectangle : coins arrondis 16">
+            <a:extLst>
+              <a:ext uri="{FF2B5EF4-FFF2-40B4-BE49-F238E27FC236}">
+                <a16:creationId xmlns:a16="http://schemas.microsoft.com/office/drawing/2014/main" id="{27C9924D-127A-4599-64CD-4C4545D933E9}"/>
+              </a:ext>
+            </a:extLst>
+          </p:cNvPr>
+          <p:cNvSpPr/>
+          <p:nvPr/>
+        </p:nvSpPr>
+        <p:spPr>
+          <a:xfrm>
+            <a:off x="7032170" y="2720037"/>
+            <a:ext cx="4938769" cy="402322"/>
+          </a:xfrm>
+          <a:prstGeom prst="roundRect">
+            <a:avLst/>
+          </a:prstGeom>
+        </p:spPr>
+        <p:style>
+          <a:lnRef idx="0">
+            <a:schemeClr val="accent1"/>
+          </a:lnRef>
+          <a:fillRef idx="3">
+            <a:schemeClr val="accent1"/>
+          </a:fillRef>
+          <a:effectRef idx="3">
+            <a:schemeClr val="accent1"/>
+          </a:effectRef>
+          <a:fontRef idx="minor">
+            <a:schemeClr val="lt1"/>
+          </a:fontRef>
+        </p:style>
+        <p:txBody>
+          <a:bodyPr rtlCol="0" anchor="ctr"/>
+          <a:lstStyle/>
+          <a:p>
+            <a:pPr algn="ctr"/>
+            <a:r>
+              <a:rPr lang="fr-FR" sz="1400" dirty="0"/>
+              <a:t>Poule de catégorie</a:t>
+            </a:r>
+          </a:p>
+        </p:txBody>
+      </p:sp>
+      <p:pic>
+        <p:nvPicPr>
+          <p:cNvPr id="18" name="Image 17">
+            <a:extLst>
+              <a:ext uri="{FF2B5EF4-FFF2-40B4-BE49-F238E27FC236}">
+                <a16:creationId xmlns:a16="http://schemas.microsoft.com/office/drawing/2014/main" id="{B16364DA-96FA-F0CD-AE6C-E157B021F957}"/>
+              </a:ext>
+            </a:extLst>
+          </p:cNvPr>
+          <p:cNvPicPr>
+            <a:picLocks noChangeAspect="1"/>
+          </p:cNvPicPr>
+          <p:nvPr/>
+        </p:nvPicPr>
+        <p:blipFill>
+          <a:blip r:embed="rId4"/>
+          <a:stretch>
+            <a:fillRect/>
+          </a:stretch>
+        </p:blipFill>
+        <p:spPr>
+          <a:xfrm>
+            <a:off x="7204249" y="3288701"/>
+            <a:ext cx="2660296" cy="1978623"/>
+          </a:xfrm>
+          <a:prstGeom prst="rect">
+            <a:avLst/>
+          </a:prstGeom>
+        </p:spPr>
+      </p:pic>
+      <p:pic>
+        <p:nvPicPr>
+          <p:cNvPr id="19" name="Image 18">
+            <a:extLst>
+              <a:ext uri="{FF2B5EF4-FFF2-40B4-BE49-F238E27FC236}">
+                <a16:creationId xmlns:a16="http://schemas.microsoft.com/office/drawing/2014/main" id="{0C7124AE-7EA4-DB9F-D8BC-2C87D82F528E}"/>
+              </a:ext>
+            </a:extLst>
+          </p:cNvPr>
+          <p:cNvPicPr>
+            <a:picLocks noChangeAspect="1"/>
+          </p:cNvPicPr>
+          <p:nvPr/>
+        </p:nvPicPr>
+        <p:blipFill>
+          <a:blip r:embed="rId5"/>
+          <a:stretch>
+            <a:fillRect/>
+          </a:stretch>
+        </p:blipFill>
+        <p:spPr>
+          <a:xfrm>
+            <a:off x="9116679" y="4055692"/>
+            <a:ext cx="2656626" cy="2010299"/>
+          </a:xfrm>
+          <a:prstGeom prst="rect">
+            <a:avLst/>
+          </a:prstGeom>
+        </p:spPr>
+      </p:pic>
+      <p:cxnSp>
+        <p:nvCxnSpPr>
+          <p:cNvPr id="11" name="Connecteur : en angle 10">
+            <a:extLst>
+              <a:ext uri="{FF2B5EF4-FFF2-40B4-BE49-F238E27FC236}">
+                <a16:creationId xmlns:a16="http://schemas.microsoft.com/office/drawing/2014/main" id="{F5813451-B99C-85D9-890B-7BD6D792A98D}"/>
+              </a:ext>
+            </a:extLst>
+          </p:cNvPr>
+          <p:cNvCxnSpPr>
+            <a:cxnSpLocks/>
+            <a:endCxn id="15" idx="1"/>
+          </p:cNvCxnSpPr>
+          <p:nvPr/>
+        </p:nvCxnSpPr>
+        <p:spPr>
+          <a:xfrm flipV="1">
+            <a:off x="2916791" y="3496778"/>
+            <a:ext cx="1310031" cy="1237147"/>
+          </a:xfrm>
+          <a:prstGeom prst="curvedConnector3">
+            <a:avLst>
+              <a:gd name="adj1" fmla="val 50000"/>
+            </a:avLst>
+          </a:prstGeom>
+          <a:ln>
+            <a:headEnd type="diamond" w="med" len="med"/>
+            <a:tailEnd type="triangle" w="med" len="med"/>
+          </a:ln>
+        </p:spPr>
+        <p:style>
+          <a:lnRef idx="1">
+            <a:schemeClr val="accent1"/>
+          </a:lnRef>
+          <a:fillRef idx="0">
+            <a:schemeClr val="accent1"/>
+          </a:fillRef>
+          <a:effectRef idx="0">
+            <a:schemeClr val="accent1"/>
+          </a:effectRef>
+          <a:fontRef idx="minor">
+            <a:schemeClr val="tx1"/>
+          </a:fontRef>
+        </p:style>
+      </p:cxnSp>
+      <p:cxnSp>
+        <p:nvCxnSpPr>
+          <p:cNvPr id="22" name="Connecteur : en angle 10">
+            <a:extLst>
+              <a:ext uri="{FF2B5EF4-FFF2-40B4-BE49-F238E27FC236}">
+                <a16:creationId xmlns:a16="http://schemas.microsoft.com/office/drawing/2014/main" id="{49F7FAC1-9236-3A9E-5C30-67587362A919}"/>
+              </a:ext>
+            </a:extLst>
+          </p:cNvPr>
+          <p:cNvCxnSpPr>
+            <a:cxnSpLocks/>
+            <a:endCxn id="18" idx="2"/>
+          </p:cNvCxnSpPr>
+          <p:nvPr/>
+        </p:nvCxnSpPr>
+        <p:spPr>
+          <a:xfrm>
+            <a:off x="2916791" y="4909954"/>
+            <a:ext cx="5617606" cy="357370"/>
+          </a:xfrm>
+          <a:prstGeom prst="curvedConnector4">
+            <a:avLst>
+              <a:gd name="adj1" fmla="val 20527"/>
+              <a:gd name="adj2" fmla="val 163967"/>
+            </a:avLst>
+          </a:prstGeom>
+          <a:ln>
+            <a:headEnd type="diamond" w="med" len="med"/>
+            <a:tailEnd type="triangle" w="med" len="med"/>
+          </a:ln>
+        </p:spPr>
+        <p:style>
+          <a:lnRef idx="1">
+            <a:schemeClr val="accent1"/>
+          </a:lnRef>
+          <a:fillRef idx="0">
+            <a:schemeClr val="accent1"/>
+          </a:fillRef>
+          <a:effectRef idx="0">
+            <a:schemeClr val="accent1"/>
+          </a:effectRef>
+          <a:fontRef idx="minor">
+            <a:schemeClr val="tx1"/>
+          </a:fontRef>
+        </p:style>
+      </p:cxnSp>
+      <p:sp>
+        <p:nvSpPr>
+          <p:cNvPr id="26" name="Légende : encadrée à une bordure 25">
+            <a:extLst>
+              <a:ext uri="{FF2B5EF4-FFF2-40B4-BE49-F238E27FC236}">
+                <a16:creationId xmlns:a16="http://schemas.microsoft.com/office/drawing/2014/main" id="{6D3D5DAC-84E4-A2D1-6D7D-E05FD8DFE120}"/>
+              </a:ext>
+            </a:extLst>
+          </p:cNvPr>
+          <p:cNvSpPr/>
+          <p:nvPr/>
+        </p:nvSpPr>
+        <p:spPr>
+          <a:xfrm flipH="1">
+            <a:off x="7032170" y="2188659"/>
+            <a:ext cx="1806691" cy="331600"/>
+          </a:xfrm>
+          <a:prstGeom prst="accentBorderCallout1">
+            <a:avLst>
+              <a:gd name="adj1" fmla="val 18750"/>
+              <a:gd name="adj2" fmla="val -8333"/>
+              <a:gd name="adj3" fmla="val 535974"/>
+              <a:gd name="adj4" fmla="val -72045"/>
+            </a:avLst>
+          </a:prstGeom>
+          <a:solidFill>
+            <a:schemeClr val="accent6">
+              <a:alpha val="50000"/>
+            </a:schemeClr>
+          </a:solidFill>
+          <a:ln>
+            <a:solidFill>
+              <a:schemeClr val="accent6"/>
+            </a:solidFill>
+          </a:ln>
+        </p:spPr>
+        <p:style>
+          <a:lnRef idx="0">
+            <a:scrgbClr r="0" g="0" b="0"/>
+          </a:lnRef>
+          <a:fillRef idx="0">
+            <a:scrgbClr r="0" g="0" b="0"/>
+          </a:fillRef>
+          <a:effectRef idx="0">
+            <a:scrgbClr r="0" g="0" b="0"/>
+          </a:effectRef>
+          <a:fontRef idx="minor">
+            <a:schemeClr val="lt1"/>
+          </a:fontRef>
+        </p:style>
+        <p:txBody>
+          <a:bodyPr rtlCol="0" anchor="ctr"/>
+          <a:lstStyle/>
+          <a:p>
+            <a:pPr algn="ctr"/>
+            <a:r>
+              <a:rPr lang="fr-FR" sz="1050" dirty="0"/>
+              <a:t>Selon la disposition configuré</a:t>
+            </a:r>
+          </a:p>
+        </p:txBody>
+      </p:sp>
+    </p:spTree>
+    <p:extLst>
+      <p:ext uri="{BB962C8B-B14F-4D97-AF65-F5344CB8AC3E}">
+        <p14:creationId xmlns:p14="http://schemas.microsoft.com/office/powerpoint/2010/main" val="1262413790"/>
+      </p:ext>
+    </p:extLst>
+  </p:cSld>
+  <p:clrMapOvr>
+    <a:masterClrMapping/>
+  </p:clrMapOvr>
+</p:sld>
+</file>
+
+<file path=ppt/slides/slide35.xml><?xml version="1.0" encoding="utf-8"?>
+<p:sld xmlns:a="http://schemas.openxmlformats.org/drawingml/2006/main" xmlns:r="http://schemas.openxmlformats.org/officeDocument/2006/relationships" xmlns:p="http://schemas.openxmlformats.org/presentationml/2006/main">
+  <p:cSld>
+    <p:spTree>
+      <p:nvGrpSpPr>
+        <p:cNvPr id="1" name=""/>
+        <p:cNvGrpSpPr/>
+        <p:nvPr/>
+      </p:nvGrpSpPr>
+      <p:grpSpPr>
+        <a:xfrm>
+          <a:off x="0" y="0"/>
+          <a:ext cx="0" cy="0"/>
+          <a:chOff x="0" y="0"/>
+          <a:chExt cx="0" cy="0"/>
+        </a:xfrm>
+      </p:grpSpPr>
+      <p:sp>
+        <p:nvSpPr>
+          <p:cNvPr id="2" name="Titre 1">
+            <a:extLst>
+              <a:ext uri="{FF2B5EF4-FFF2-40B4-BE49-F238E27FC236}">
+                <a16:creationId xmlns:a16="http://schemas.microsoft.com/office/drawing/2014/main" id="{2C198829-35EB-6A46-EBAA-6A582DAFE970}"/>
+              </a:ext>
+            </a:extLst>
+          </p:cNvPr>
+          <p:cNvSpPr>
+            <a:spLocks noGrp="1"/>
+          </p:cNvSpPr>
+          <p:nvPr>
+            <p:ph type="title"/>
+          </p:nvPr>
+        </p:nvSpPr>
+        <p:spPr/>
+        <p:txBody>
+          <a:bodyPr/>
+          <a:lstStyle/>
+          <a:p>
+            <a:r>
               <a:rPr lang="fr-FR" dirty="0"/>
-              <a:t>Daniel GARRIVIER</a:t>
-            </a:r>
-          </a:p>
+              <a:t>Plan du Site utilisateur – Classements</a:t>
+            </a:r>
+          </a:p>
+        </p:txBody>
+      </p:sp>
+      <p:sp>
+        <p:nvSpPr>
+          <p:cNvPr id="4" name="Espace réservé du texte 3">
+            <a:extLst>
+              <a:ext uri="{FF2B5EF4-FFF2-40B4-BE49-F238E27FC236}">
+                <a16:creationId xmlns:a16="http://schemas.microsoft.com/office/drawing/2014/main" id="{55EE5942-743C-7FE0-DDCC-8AF825345982}"/>
+              </a:ext>
+            </a:extLst>
+          </p:cNvPr>
+          <p:cNvSpPr>
+            <a:spLocks noGrp="1"/>
+          </p:cNvSpPr>
+          <p:nvPr>
+            <p:ph type="body" sz="quarter" idx="15"/>
+          </p:nvPr>
+        </p:nvSpPr>
+        <p:spPr/>
+        <p:txBody>
+          <a:bodyPr/>
+          <a:lstStyle/>
+          <a:p>
+            <a:r>
+              <a:rPr lang="fr-FR" dirty="0"/>
+              <a:t>Annexe</a:t>
+            </a:r>
+          </a:p>
+        </p:txBody>
+      </p:sp>
+      <p:sp>
+        <p:nvSpPr>
+          <p:cNvPr id="3" name="Rectangle : coins arrondis 2">
+            <a:extLst>
+              <a:ext uri="{FF2B5EF4-FFF2-40B4-BE49-F238E27FC236}">
+                <a16:creationId xmlns:a16="http://schemas.microsoft.com/office/drawing/2014/main" id="{503174A0-941A-A415-3B71-EFB82484532B}"/>
+              </a:ext>
+            </a:extLst>
+          </p:cNvPr>
+          <p:cNvSpPr/>
+          <p:nvPr/>
+        </p:nvSpPr>
+        <p:spPr>
+          <a:xfrm>
+            <a:off x="1240592" y="1972782"/>
+            <a:ext cx="3529729" cy="3861738"/>
+          </a:xfrm>
+          <a:prstGeom prst="roundRect">
+            <a:avLst>
+              <a:gd name="adj" fmla="val 1691"/>
+            </a:avLst>
+          </a:prstGeom>
+          <a:noFill/>
+        </p:spPr>
+        <p:style>
+          <a:lnRef idx="2">
+            <a:schemeClr val="accent1"/>
+          </a:lnRef>
+          <a:fillRef idx="1">
+            <a:schemeClr val="lt1"/>
+          </a:fillRef>
+          <a:effectRef idx="0">
+            <a:schemeClr val="accent1"/>
+          </a:effectRef>
+          <a:fontRef idx="minor">
+            <a:schemeClr val="dk1"/>
+          </a:fontRef>
+        </p:style>
+        <p:txBody>
+          <a:bodyPr rtlCol="0" anchor="ctr"/>
+          <a:lstStyle/>
+          <a:p>
+            <a:pPr algn="r"/>
+            <a:endParaRPr lang="fr-FR" dirty="0"/>
+          </a:p>
+        </p:txBody>
+      </p:sp>
+      <p:sp>
+        <p:nvSpPr>
+          <p:cNvPr id="6" name="Rectangle : coins arrondis 5">
+            <a:extLst>
+              <a:ext uri="{FF2B5EF4-FFF2-40B4-BE49-F238E27FC236}">
+                <a16:creationId xmlns:a16="http://schemas.microsoft.com/office/drawing/2014/main" id="{1FF9D910-74CE-77AC-4697-C5E04C287AF0}"/>
+              </a:ext>
+            </a:extLst>
+          </p:cNvPr>
+          <p:cNvSpPr/>
+          <p:nvPr/>
+        </p:nvSpPr>
+        <p:spPr>
+          <a:xfrm>
+            <a:off x="1240590" y="1965098"/>
+            <a:ext cx="3529731" cy="402322"/>
+          </a:xfrm>
+          <a:prstGeom prst="roundRect">
+            <a:avLst/>
+          </a:prstGeom>
+        </p:spPr>
+        <p:style>
+          <a:lnRef idx="0">
+            <a:schemeClr val="accent1"/>
+          </a:lnRef>
+          <a:fillRef idx="3">
+            <a:schemeClr val="accent1"/>
+          </a:fillRef>
+          <a:effectRef idx="3">
+            <a:schemeClr val="accent1"/>
+          </a:effectRef>
+          <a:fontRef idx="minor">
+            <a:schemeClr val="lt1"/>
+          </a:fontRef>
+        </p:style>
+        <p:txBody>
+          <a:bodyPr rtlCol="0" anchor="ctr"/>
+          <a:lstStyle/>
           <a:p>
             <a:pPr algn="ctr"/>
             <a:r>
-              <a:rPr lang="fr-FR" dirty="0"/>
-              <a:t>ext.daniel.garrivier@ffjudo.com</a:t>
-            </a:r>
-          </a:p>
+              <a:rPr lang="fr-FR" sz="1400" dirty="0"/>
+              <a:t>Classements (choix de catégorie)</a:t>
+            </a:r>
+          </a:p>
+        </p:txBody>
+      </p:sp>
+      <p:sp>
+        <p:nvSpPr>
+          <p:cNvPr id="7" name="Rectangle : coins arrondis 6">
+            <a:extLst>
+              <a:ext uri="{FF2B5EF4-FFF2-40B4-BE49-F238E27FC236}">
+                <a16:creationId xmlns:a16="http://schemas.microsoft.com/office/drawing/2014/main" id="{1A86364E-4B4A-25F5-F6B9-3ED2D611FCB6}"/>
+              </a:ext>
+            </a:extLst>
+          </p:cNvPr>
+          <p:cNvSpPr/>
+          <p:nvPr/>
+        </p:nvSpPr>
+        <p:spPr>
+          <a:xfrm>
+            <a:off x="6427681" y="1965098"/>
+            <a:ext cx="3678344" cy="3526522"/>
+          </a:xfrm>
+          <a:prstGeom prst="roundRect">
+            <a:avLst>
+              <a:gd name="adj" fmla="val 1691"/>
+            </a:avLst>
+          </a:prstGeom>
+          <a:noFill/>
+        </p:spPr>
+        <p:style>
+          <a:lnRef idx="2">
+            <a:schemeClr val="accent1"/>
+          </a:lnRef>
+          <a:fillRef idx="1">
+            <a:schemeClr val="lt1"/>
+          </a:fillRef>
+          <a:effectRef idx="0">
+            <a:schemeClr val="accent1"/>
+          </a:effectRef>
+          <a:fontRef idx="minor">
+            <a:schemeClr val="dk1"/>
+          </a:fontRef>
+        </p:style>
+        <p:txBody>
+          <a:bodyPr rtlCol="0" anchor="ctr"/>
+          <a:lstStyle/>
+          <a:p>
+            <a:pPr algn="r"/>
+            <a:endParaRPr lang="fr-FR" dirty="0"/>
+          </a:p>
+        </p:txBody>
+      </p:sp>
+      <p:sp>
+        <p:nvSpPr>
+          <p:cNvPr id="8" name="Rectangle : coins arrondis 7">
+            <a:extLst>
+              <a:ext uri="{FF2B5EF4-FFF2-40B4-BE49-F238E27FC236}">
+                <a16:creationId xmlns:a16="http://schemas.microsoft.com/office/drawing/2014/main" id="{784D7F57-DCD9-FF19-1D50-01AEC1AFCAAE}"/>
+              </a:ext>
+            </a:extLst>
+          </p:cNvPr>
+          <p:cNvSpPr/>
+          <p:nvPr/>
+        </p:nvSpPr>
+        <p:spPr>
+          <a:xfrm>
+            <a:off x="6427679" y="1965098"/>
+            <a:ext cx="3678346" cy="402322"/>
+          </a:xfrm>
+          <a:prstGeom prst="roundRect">
+            <a:avLst/>
+          </a:prstGeom>
+        </p:spPr>
+        <p:style>
+          <a:lnRef idx="0">
+            <a:schemeClr val="accent1"/>
+          </a:lnRef>
+          <a:fillRef idx="3">
+            <a:schemeClr val="accent1"/>
+          </a:fillRef>
+          <a:effectRef idx="3">
+            <a:schemeClr val="accent1"/>
+          </a:effectRef>
+          <a:fontRef idx="minor">
+            <a:schemeClr val="lt1"/>
+          </a:fontRef>
+        </p:style>
+        <p:txBody>
+          <a:bodyPr rtlCol="0" anchor="ctr"/>
+          <a:lstStyle/>
           <a:p>
             <a:pPr algn="ctr"/>
             <a:r>
-              <a:rPr lang="fr-FR" dirty="0"/>
-              <a:t>-- -- -- -- --</a:t>
-            </a:r>
-          </a:p>
-        </p:txBody>
-      </p:sp>
+              <a:rPr lang="fr-FR" sz="1400" dirty="0"/>
+              <a:t>Tableau de classement de la catégorie</a:t>
+            </a:r>
+          </a:p>
+        </p:txBody>
+      </p:sp>
+      <p:pic>
+        <p:nvPicPr>
+          <p:cNvPr id="14" name="Image 13">
+            <a:extLst>
+              <a:ext uri="{FF2B5EF4-FFF2-40B4-BE49-F238E27FC236}">
+                <a16:creationId xmlns:a16="http://schemas.microsoft.com/office/drawing/2014/main" id="{569F78C2-1079-9B2D-317A-BEFB7F12F78D}"/>
+              </a:ext>
+            </a:extLst>
+          </p:cNvPr>
+          <p:cNvPicPr>
+            <a:picLocks noChangeAspect="1"/>
+          </p:cNvPicPr>
+          <p:nvPr/>
+        </p:nvPicPr>
+        <p:blipFill>
+          <a:blip r:embed="rId2"/>
+          <a:stretch>
+            <a:fillRect/>
+          </a:stretch>
+        </p:blipFill>
+        <p:spPr>
+          <a:xfrm>
+            <a:off x="1590628" y="2515039"/>
+            <a:ext cx="2834168" cy="3194967"/>
+          </a:xfrm>
+          <a:prstGeom prst="rect">
+            <a:avLst/>
+          </a:prstGeom>
+        </p:spPr>
+      </p:pic>
+      <p:cxnSp>
+        <p:nvCxnSpPr>
+          <p:cNvPr id="11" name="Connecteur : en angle 10">
+            <a:extLst>
+              <a:ext uri="{FF2B5EF4-FFF2-40B4-BE49-F238E27FC236}">
+                <a16:creationId xmlns:a16="http://schemas.microsoft.com/office/drawing/2014/main" id="{F5813451-B99C-85D9-890B-7BD6D792A98D}"/>
+              </a:ext>
+            </a:extLst>
+          </p:cNvPr>
+          <p:cNvCxnSpPr>
+            <a:cxnSpLocks/>
+          </p:cNvCxnSpPr>
+          <p:nvPr/>
+        </p:nvCxnSpPr>
+        <p:spPr>
+          <a:xfrm flipV="1">
+            <a:off x="3936324" y="3276600"/>
+            <a:ext cx="3135075" cy="1457325"/>
+          </a:xfrm>
+          <a:prstGeom prst="curvedConnector3">
+            <a:avLst>
+              <a:gd name="adj1" fmla="val 50000"/>
+            </a:avLst>
+          </a:prstGeom>
+          <a:ln>
+            <a:headEnd type="diamond" w="med" len="med"/>
+            <a:tailEnd type="triangle" w="med" len="med"/>
+          </a:ln>
+        </p:spPr>
+        <p:style>
+          <a:lnRef idx="1">
+            <a:schemeClr val="accent1"/>
+          </a:lnRef>
+          <a:fillRef idx="0">
+            <a:schemeClr val="accent1"/>
+          </a:fillRef>
+          <a:effectRef idx="0">
+            <a:schemeClr val="accent1"/>
+          </a:effectRef>
+          <a:fontRef idx="minor">
+            <a:schemeClr val="tx1"/>
+          </a:fontRef>
+        </p:style>
+      </p:cxnSp>
+      <p:pic>
+        <p:nvPicPr>
+          <p:cNvPr id="5" name="Image 4">
+            <a:extLst>
+              <a:ext uri="{FF2B5EF4-FFF2-40B4-BE49-F238E27FC236}">
+                <a16:creationId xmlns:a16="http://schemas.microsoft.com/office/drawing/2014/main" id="{8B2F415D-8326-8A03-AE1D-86DD1719AD63}"/>
+              </a:ext>
+            </a:extLst>
+          </p:cNvPr>
+          <p:cNvPicPr>
+            <a:picLocks noChangeAspect="1"/>
+          </p:cNvPicPr>
+          <p:nvPr/>
+        </p:nvPicPr>
+        <p:blipFill>
+          <a:blip r:embed="rId3"/>
+          <a:stretch>
+            <a:fillRect/>
+          </a:stretch>
+        </p:blipFill>
+        <p:spPr>
+          <a:xfrm>
+            <a:off x="7071399" y="2602235"/>
+            <a:ext cx="2390905" cy="2724520"/>
+          </a:xfrm>
+          <a:prstGeom prst="rect">
+            <a:avLst/>
+          </a:prstGeom>
+        </p:spPr>
+      </p:pic>
+    </p:spTree>
+    <p:extLst>
+      <p:ext uri="{BB962C8B-B14F-4D97-AF65-F5344CB8AC3E}">
+        <p14:creationId xmlns:p14="http://schemas.microsoft.com/office/powerpoint/2010/main" val="1290928888"/>
+      </p:ext>
+    </p:extLst>
+  </p:cSld>
+  <p:clrMapOvr>
+    <a:masterClrMapping/>
+  </p:clrMapOvr>
+</p:sld>
+</file>
+
+<file path=ppt/slides/slide36.xml><?xml version="1.0" encoding="utf-8"?>
+<p:sld xmlns:a="http://schemas.openxmlformats.org/drawingml/2006/main" xmlns:r="http://schemas.openxmlformats.org/officeDocument/2006/relationships" xmlns:p="http://schemas.openxmlformats.org/presentationml/2006/main">
+  <p:cSld>
+    <p:spTree>
+      <p:nvGrpSpPr>
+        <p:cNvPr id="1" name=""/>
+        <p:cNvGrpSpPr/>
+        <p:nvPr/>
+      </p:nvGrpSpPr>
+      <p:grpSpPr>
+        <a:xfrm>
+          <a:off x="0" y="0"/>
+          <a:ext cx="0" cy="0"/>
+          <a:chOff x="0" y="0"/>
+          <a:chExt cx="0" cy="0"/>
+        </a:xfrm>
+      </p:grpSpPr>
     </p:spTree>
     <p:extLst>
       <p:ext uri="{BB962C8B-B14F-4D97-AF65-F5344CB8AC3E}">
@@ -35028,7 +35923,7 @@
           <a:p>
             <a:r>
               <a:rPr lang="fr-FR" sz="1600" i="1" dirty="0"/>
-              <a:t>La publication sur Internet nécessite de disposer d’un compte auprès d’un fournisseur d’accès comme Free, Orange, etc.</a:t>
+              <a:t>La publication sur Internet nécessite de disposer d’un compte auprès d’un hébergeur comme Free, Orange, etc.</a:t>
             </a:r>
           </a:p>
           <a:p>
@@ -35677,7 +36572,7 @@
               <a:rPr lang="fr-FR" sz="1800" dirty="0">
                 <a:latin typeface="Barlow" panose="00000500000000000000" pitchFamily="2" charset="0"/>
               </a:rPr>
-              <a:t> » copie par FTP sur le site du fournisseur distant la dernière version généré du site de suivi. La 1</a:t>
+              <a:t> » copie par FTP sur le site de l’hébergeur distant la dernière version généré du site de suivi. La 1</a:t>
             </a:r>
             <a:r>
               <a:rPr lang="fr-FR" sz="1800" baseline="30000" dirty="0">
@@ -35705,7 +36600,7 @@
             </a:r>
             <a:r>
               <a:rPr lang="fr-FR" sz="1800" i="1" dirty="0"/>
-              <a:t>: En cas de publication distante, l’accès des utilisateurs se fait via l’adresse distante du fournisseur internet. Il n’y a pas de lien direct avec </a:t>
+              <a:t>: En cas de publication distante, l’accès des utilisateurs se fait via l’adresse distante de l’hébergeur. Il n’y a pas de lien direct avec </a:t>
             </a:r>
             <a:r>
               <a:rPr lang="fr-FR" sz="1800" i="1" dirty="0">
@@ -39476,15 +40371,6 @@
 </file>
 
 <file path=customXml/item1.xml><?xml version="1.0" encoding="utf-8"?>
-<?mso-contentType ?>
-<FormTemplates xmlns="http://schemas.microsoft.com/sharepoint/v3/contenttype/forms">
-  <Display>DocumentLibraryForm</Display>
-  <Edit>DocumentLibraryForm</Edit>
-  <New>DocumentLibraryForm</New>
-</FormTemplates>
-</file>
-
-<file path=customXml/item2.xml><?xml version="1.0" encoding="utf-8"?>
 <ct:contentTypeSchema xmlns:ct="http://schemas.microsoft.com/office/2006/metadata/contentType" xmlns:ma="http://schemas.microsoft.com/office/2006/metadata/properties/metaAttributes" ct:_="" ma:_="" ma:contentTypeName="Document" ma:contentTypeID="0x01010094D69007D53E474D873D1C4BCA1E8F18" ma:contentTypeVersion="15" ma:contentTypeDescription="Crée un document." ma:contentTypeScope="" ma:versionID="b94b5753296409f7397b66632584fdb0">
   <xsd:schema xmlns:xsd="http://www.w3.org/2001/XMLSchema" xmlns:xs="http://www.w3.org/2001/XMLSchema" xmlns:p="http://schemas.microsoft.com/office/2006/metadata/properties" xmlns:ns2="f9bf1094-3609-4046-a6fd-76c9c0caa714" xmlns:ns3="5d7a3535-6ccc-4381-989f-ae061031b78e" targetNamespace="http://schemas.microsoft.com/office/2006/metadata/properties" ma:root="true" ma:fieldsID="fee6db9217be9a70816f6107f4b0cedb" ns2:_="" ns3:_="">
     <xsd:import namespace="f9bf1094-3609-4046-a6fd-76c9c0caa714"/>
@@ -39713,6 +40599,15 @@
 </ct:contentTypeSchema>
 </file>
 
+<file path=customXml/item2.xml><?xml version="1.0" encoding="utf-8"?>
+<?mso-contentType ?>
+<FormTemplates xmlns="http://schemas.microsoft.com/sharepoint/v3/contenttype/forms">
+  <Display>DocumentLibraryForm</Display>
+  <Edit>DocumentLibraryForm</Edit>
+  <New>DocumentLibraryForm</New>
+</FormTemplates>
+</file>
+
 <file path=customXml/item3.xml><?xml version="1.0" encoding="utf-8"?>
 <p:properties xmlns:p="http://schemas.microsoft.com/office/2006/metadata/properties" xmlns:xsi="http://www.w3.org/2001/XMLSchema-instance" xmlns:pc="http://schemas.microsoft.com/office/infopath/2007/PartnerControls">
   <documentManagement>
@@ -39725,14 +40620,6 @@
 </file>
 
 <file path=customXml/itemProps1.xml><?xml version="1.0" encoding="utf-8"?>
-<ds:datastoreItem xmlns:ds="http://schemas.openxmlformats.org/officeDocument/2006/customXml" ds:itemID="{37867E26-7D2E-4C08-8937-A5EDA2DC982A}">
-  <ds:schemaRefs>
-    <ds:schemaRef ds:uri="http://schemas.microsoft.com/sharepoint/v3/contenttype/forms"/>
-  </ds:schemaRefs>
-</ds:datastoreItem>
-</file>
-
-<file path=customXml/itemProps2.xml><?xml version="1.0" encoding="utf-8"?>
 <ds:datastoreItem xmlns:ds="http://schemas.openxmlformats.org/officeDocument/2006/customXml" ds:itemID="{A23C0DE2-5723-4EBE-BB67-CD0D7BAFEF27}">
   <ds:schemaRefs>
     <ds:schemaRef ds:uri="http://schemas.microsoft.com/office/2006/metadata/contentType"/>
@@ -39747,6 +40634,14 @@
     <ds:schemaRef ds:uri="http://purl.org/dc/elements/1.1/"/>
     <ds:schemaRef ds:uri="http://purl.org/dc/terms/"/>
     <ds:schemaRef ds:uri="http://schemas.microsoft.com/internal/obd"/>
+  </ds:schemaRefs>
+</ds:datastoreItem>
+</file>
+
+<file path=customXml/itemProps2.xml><?xml version="1.0" encoding="utf-8"?>
+<ds:datastoreItem xmlns:ds="http://schemas.openxmlformats.org/officeDocument/2006/customXml" ds:itemID="{37867E26-7D2E-4C08-8937-A5EDA2DC982A}">
+  <ds:schemaRefs>
+    <ds:schemaRef ds:uri="http://schemas.microsoft.com/sharepoint/v3/contenttype/forms"/>
   </ds:schemaRefs>
 </ds:datastoreItem>
 </file>

</xml_diff>

<commit_message>
Correction de la numerotation des versions test en beta Mise a jour du manuel avec les nouvelles IHMs Correction du bouton de sélection du répertoire de travail qui avait disparu Test de la valeur null sur SiteDistantSelectionne
</commit_message>
<xml_diff>
--- a/AppPublication/Documentation/PublicationSuiviCompetition - Manuel d'utilisation.pptx
+++ b/AppPublication/Documentation/PublicationSuiviCompetition - Manuel d'utilisation.pptx
@@ -269,7 +269,7 @@
           <a:p>
             <a:fld id="{2FC9C06B-3A03-409A-B425-472FC6ED632E}" type="datetimeFigureOut">
               <a:rPr lang="fr-FR" smtClean="0"/>
-              <a:t>26/11/2024</a:t>
+              <a:t>17/12/2024</a:t>
             </a:fld>
             <a:endParaRPr lang="fr-FR"/>
           </a:p>
@@ -446,7 +446,7 @@
           <a:p>
             <a:fld id="{1BF3F09E-A5E2-4FD2-AA48-324D4F0E8F41}" type="datetimeFigureOut">
               <a:rPr lang="fr"/>
-              <a:t>26/11/2024</a:t>
+              <a:t>17/12/2024</a:t>
             </a:fld>
             <a:endParaRPr lang="en-US"/>
           </a:p>
@@ -17650,6 +17650,36 @@
           <a:chExt cx="0" cy="0"/>
         </a:xfrm>
       </p:grpSpPr>
+      <p:pic>
+        <p:nvPicPr>
+          <p:cNvPr id="13" name="Image 12">
+            <a:extLst>
+              <a:ext uri="{FF2B5EF4-FFF2-40B4-BE49-F238E27FC236}">
+                <a16:creationId xmlns:a16="http://schemas.microsoft.com/office/drawing/2014/main" id="{9BD9996D-6346-8651-5495-DF81C701F0E2}"/>
+              </a:ext>
+            </a:extLst>
+          </p:cNvPr>
+          <p:cNvPicPr>
+            <a:picLocks noChangeAspect="1"/>
+          </p:cNvPicPr>
+          <p:nvPr/>
+        </p:nvPicPr>
+        <p:blipFill>
+          <a:blip r:embed="rId2"/>
+          <a:stretch>
+            <a:fillRect/>
+          </a:stretch>
+        </p:blipFill>
+        <p:spPr>
+          <a:xfrm>
+            <a:off x="4289024" y="2028084"/>
+            <a:ext cx="3731995" cy="2890311"/>
+          </a:xfrm>
+          <a:prstGeom prst="rect">
+            <a:avLst/>
+          </a:prstGeom>
+        </p:spPr>
+      </p:pic>
       <p:sp>
         <p:nvSpPr>
           <p:cNvPr id="2" name="Titre 1">
@@ -17706,35 +17736,6 @@
           </a:p>
         </p:txBody>
       </p:sp>
-      <p:pic>
-        <p:nvPicPr>
-          <p:cNvPr id="8" name="Image 7">
-            <a:extLst>
-              <a:ext uri="{FF2B5EF4-FFF2-40B4-BE49-F238E27FC236}">
-                <a16:creationId xmlns:a16="http://schemas.microsoft.com/office/drawing/2014/main" id="{BD73F828-99E4-A271-AFA1-9ABFDCBF9076}"/>
-              </a:ext>
-            </a:extLst>
-          </p:cNvPr>
-          <p:cNvPicPr>
-            <a:picLocks noChangeAspect="1"/>
-          </p:cNvPicPr>
-          <p:nvPr/>
-        </p:nvPicPr>
-        <p:blipFill rotWithShape="1">
-          <a:blip r:embed="rId2"/>
-          <a:srcRect l="765" t="24306" r="50118" b="2133"/>
-          <a:stretch/>
-        </p:blipFill>
-        <p:spPr>
-          <a:xfrm>
-            <a:off x="4236719" y="2014758"/>
-            <a:ext cx="3949065" cy="3507105"/>
-          </a:xfrm>
-          <a:prstGeom prst="rect">
-            <a:avLst/>
-          </a:prstGeom>
-        </p:spPr>
-      </p:pic>
       <p:sp>
         <p:nvSpPr>
           <p:cNvPr id="3" name="Rectangle 2">
@@ -17967,7 +17968,7 @@
         </p:nvSpPr>
         <p:spPr>
           <a:xfrm>
-            <a:off x="5581032" y="5223107"/>
+            <a:off x="5495306" y="4638622"/>
             <a:ext cx="634031" cy="227575"/>
           </a:xfrm>
           <a:prstGeom prst="rect">
@@ -18019,7 +18020,7 @@
         </p:nvSpPr>
         <p:spPr>
           <a:xfrm>
-            <a:off x="6333507" y="5225489"/>
+            <a:off x="6249310" y="4638622"/>
             <a:ext cx="557831" cy="227575"/>
           </a:xfrm>
           <a:prstGeom prst="rect">
@@ -18175,8 +18176,8 @@
         </p:nvSpPr>
         <p:spPr>
           <a:xfrm>
-            <a:off x="5404820" y="2776023"/>
-            <a:ext cx="2693811" cy="156506"/>
+            <a:off x="5404821" y="2776023"/>
+            <a:ext cx="2246810" cy="135660"/>
           </a:xfrm>
           <a:prstGeom prst="rect">
             <a:avLst/>
@@ -18279,15 +18280,15 @@
         </p:nvSpPr>
         <p:spPr>
           <a:xfrm flipH="1">
-            <a:off x="2076450" y="5936580"/>
+            <a:off x="1861943" y="5456052"/>
             <a:ext cx="2981324" cy="436361"/>
           </a:xfrm>
           <a:prstGeom prst="accentBorderCallout1">
             <a:avLst>
               <a:gd name="adj1" fmla="val 18750"/>
               <a:gd name="adj2" fmla="val -8333"/>
-              <a:gd name="adj3" fmla="val -108235"/>
-              <a:gd name="adj4" fmla="val -33552"/>
+              <a:gd name="adj3" fmla="val -129981"/>
+              <a:gd name="adj4" fmla="val -27186"/>
             </a:avLst>
           </a:prstGeom>
           <a:ln>
@@ -18336,15 +18337,15 @@
         </p:nvSpPr>
         <p:spPr>
           <a:xfrm>
-            <a:off x="7549502" y="5936579"/>
+            <a:off x="7271464" y="5456052"/>
             <a:ext cx="3093099" cy="436362"/>
           </a:xfrm>
           <a:prstGeom prst="accentBorderCallout1">
             <a:avLst>
               <a:gd name="adj1" fmla="val 18750"/>
               <a:gd name="adj2" fmla="val -8333"/>
-              <a:gd name="adj3" fmla="val -102559"/>
-              <a:gd name="adj4" fmla="val -34696"/>
+              <a:gd name="adj3" fmla="val -138143"/>
+              <a:gd name="adj4" fmla="val -23819"/>
             </a:avLst>
           </a:prstGeom>
           <a:ln>
@@ -18507,15 +18508,15 @@
         </p:nvSpPr>
         <p:spPr>
           <a:xfrm>
-            <a:off x="8600315" y="2543784"/>
+            <a:off x="8600315" y="2186324"/>
             <a:ext cx="2042286" cy="528400"/>
           </a:xfrm>
           <a:prstGeom prst="accentBorderCallout1">
             <a:avLst>
               <a:gd name="adj1" fmla="val 18750"/>
               <a:gd name="adj2" fmla="val -8333"/>
-              <a:gd name="adj3" fmla="val 66748"/>
-              <a:gd name="adj4" fmla="val -20726"/>
+              <a:gd name="adj3" fmla="val 112460"/>
+              <a:gd name="adj4" fmla="val -70991"/>
             </a:avLst>
           </a:prstGeom>
           <a:ln>
@@ -18603,6 +18604,115 @@
             <a:r>
               <a:rPr lang="fr-FR" sz="1400" dirty="0"/>
               <a:t>QR Code du site web local</a:t>
+            </a:r>
+          </a:p>
+        </p:txBody>
+      </p:sp>
+      <p:sp>
+        <p:nvSpPr>
+          <p:cNvPr id="15" name="Rectangle 14">
+            <a:extLst>
+              <a:ext uri="{FF2B5EF4-FFF2-40B4-BE49-F238E27FC236}">
+                <a16:creationId xmlns:a16="http://schemas.microsoft.com/office/drawing/2014/main" id="{C8F1B060-4900-4652-32FA-78E0AEE6216F}"/>
+              </a:ext>
+            </a:extLst>
+          </p:cNvPr>
+          <p:cNvSpPr/>
+          <p:nvPr/>
+        </p:nvSpPr>
+        <p:spPr>
+          <a:xfrm>
+            <a:off x="7760578" y="2743908"/>
+            <a:ext cx="217311" cy="227575"/>
+          </a:xfrm>
+          <a:prstGeom prst="rect">
+            <a:avLst/>
+          </a:prstGeom>
+          <a:noFill/>
+          <a:ln w="28575">
+            <a:solidFill>
+              <a:srgbClr val="FFC000"/>
+            </a:solidFill>
+          </a:ln>
+        </p:spPr>
+        <p:style>
+          <a:lnRef idx="2">
+            <a:schemeClr val="accent1">
+              <a:shade val="15000"/>
+            </a:schemeClr>
+          </a:lnRef>
+          <a:fillRef idx="1">
+            <a:schemeClr val="accent1"/>
+          </a:fillRef>
+          <a:effectRef idx="0">
+            <a:schemeClr val="accent1"/>
+          </a:effectRef>
+          <a:fontRef idx="minor">
+            <a:schemeClr val="lt1"/>
+          </a:fontRef>
+        </p:style>
+        <p:txBody>
+          <a:bodyPr rtlCol="0" anchor="ctr"/>
+          <a:lstStyle/>
+          <a:p>
+            <a:pPr algn="ctr"/>
+            <a:endParaRPr lang="fr-FR"/>
+          </a:p>
+        </p:txBody>
+      </p:sp>
+      <p:sp>
+        <p:nvSpPr>
+          <p:cNvPr id="16" name="Légende : encadrée à une bordure 15">
+            <a:extLst>
+              <a:ext uri="{FF2B5EF4-FFF2-40B4-BE49-F238E27FC236}">
+                <a16:creationId xmlns:a16="http://schemas.microsoft.com/office/drawing/2014/main" id="{D34F33BE-3310-E160-BF33-7A046348D898}"/>
+              </a:ext>
+            </a:extLst>
+          </p:cNvPr>
+          <p:cNvSpPr/>
+          <p:nvPr/>
+        </p:nvSpPr>
+        <p:spPr>
+          <a:xfrm>
+            <a:off x="8602478" y="2937259"/>
+            <a:ext cx="3374424" cy="283867"/>
+          </a:xfrm>
+          <a:prstGeom prst="accentBorderCallout1">
+            <a:avLst>
+              <a:gd name="adj1" fmla="val 18750"/>
+              <a:gd name="adj2" fmla="val -8333"/>
+              <a:gd name="adj3" fmla="val 6183"/>
+              <a:gd name="adj4" fmla="val -17743"/>
+            </a:avLst>
+          </a:prstGeom>
+          <a:ln>
+            <a:solidFill>
+              <a:schemeClr val="accent4"/>
+            </a:solidFill>
+          </a:ln>
+        </p:spPr>
+        <p:style>
+          <a:lnRef idx="0">
+            <a:schemeClr val="accent4"/>
+          </a:lnRef>
+          <a:fillRef idx="3">
+            <a:schemeClr val="accent4"/>
+          </a:fillRef>
+          <a:effectRef idx="3">
+            <a:schemeClr val="accent4"/>
+          </a:effectRef>
+          <a:fontRef idx="minor">
+            <a:schemeClr val="lt1"/>
+          </a:fontRef>
+        </p:style>
+        <p:txBody>
+          <a:bodyPr rtlCol="0" anchor="ctr"/>
+          <a:lstStyle/>
+          <a:p>
+            <a:pPr algn="ctr"/>
+            <a:r>
+              <a:rPr lang="fr-FR" sz="1400" dirty="0"/>
+              <a:t>Copie l’URL complète dans le presse-papier</a:t>
             </a:r>
           </a:p>
         </p:txBody>
@@ -18639,10 +18749,10 @@
       </p:grpSpPr>
       <p:pic>
         <p:nvPicPr>
-          <p:cNvPr id="9" name="Image 8">
-            <a:extLst>
-              <a:ext uri="{FF2B5EF4-FFF2-40B4-BE49-F238E27FC236}">
-                <a16:creationId xmlns:a16="http://schemas.microsoft.com/office/drawing/2014/main" id="{546F8956-578C-AC80-2634-1CC846CB9833}"/>
+          <p:cNvPr id="10" name="Image 9">
+            <a:extLst>
+              <a:ext uri="{FF2B5EF4-FFF2-40B4-BE49-F238E27FC236}">
+                <a16:creationId xmlns:a16="http://schemas.microsoft.com/office/drawing/2014/main" id="{14546F8F-057C-C343-5073-768EBC066B12}"/>
               </a:ext>
             </a:extLst>
           </p:cNvPr>
@@ -18659,8 +18769,8 @@
         </p:blipFill>
         <p:spPr>
           <a:xfrm>
-            <a:off x="3971554" y="2081433"/>
-            <a:ext cx="3757661" cy="2804148"/>
+            <a:off x="4002578" y="2148999"/>
+            <a:ext cx="3631710" cy="2732564"/>
           </a:xfrm>
           <a:prstGeom prst="rect">
             <a:avLst/>
@@ -18864,7 +18974,7 @@
         </p:nvSpPr>
         <p:spPr>
           <a:xfrm>
-            <a:off x="8457594" y="3107796"/>
+            <a:off x="8408079" y="3107796"/>
             <a:ext cx="3553585" cy="318133"/>
           </a:xfrm>
           <a:prstGeom prst="accentBorderCallout1">
@@ -19181,15 +19291,15 @@
         </p:nvSpPr>
         <p:spPr>
           <a:xfrm>
-            <a:off x="8414125" y="2031015"/>
+            <a:off x="8229545" y="1663219"/>
             <a:ext cx="3093177" cy="283867"/>
           </a:xfrm>
           <a:prstGeom prst="accentBorderCallout1">
             <a:avLst>
               <a:gd name="adj1" fmla="val 18750"/>
               <a:gd name="adj2" fmla="val -8333"/>
-              <a:gd name="adj3" fmla="val 223337"/>
-              <a:gd name="adj4" fmla="val -100369"/>
+              <a:gd name="adj3" fmla="val 320582"/>
+              <a:gd name="adj4" fmla="val -95907"/>
             </a:avLst>
           </a:prstGeom>
           <a:ln>
@@ -19291,7 +19401,7 @@
         <p:spPr>
           <a:xfrm>
             <a:off x="5084689" y="2818558"/>
-            <a:ext cx="2551027" cy="156506"/>
+            <a:ext cx="2224796" cy="155246"/>
           </a:xfrm>
           <a:prstGeom prst="rect">
             <a:avLst/>
@@ -19342,15 +19452,15 @@
         </p:nvSpPr>
         <p:spPr>
           <a:xfrm>
-            <a:off x="8442157" y="2663312"/>
+            <a:off x="8408079" y="2148999"/>
             <a:ext cx="2667954" cy="310492"/>
           </a:xfrm>
           <a:prstGeom prst="accentBorderCallout1">
             <a:avLst>
               <a:gd name="adj1" fmla="val 18750"/>
               <a:gd name="adj2" fmla="val -8333"/>
-              <a:gd name="adj3" fmla="val 78705"/>
-              <a:gd name="adj4" fmla="val -28638"/>
+              <a:gd name="adj3" fmla="val 206507"/>
+              <a:gd name="adj4" fmla="val -48038"/>
             </a:avLst>
           </a:prstGeom>
           <a:ln>
@@ -20265,6 +20375,115 @@
             <a:r>
               <a:rPr lang="fr-FR" sz="1400" dirty="0"/>
               <a:t>Entité sélectionnée pour le niveau de publication</a:t>
+            </a:r>
+          </a:p>
+        </p:txBody>
+      </p:sp>
+      <p:sp>
+        <p:nvSpPr>
+          <p:cNvPr id="15" name="Rectangle 14">
+            <a:extLst>
+              <a:ext uri="{FF2B5EF4-FFF2-40B4-BE49-F238E27FC236}">
+                <a16:creationId xmlns:a16="http://schemas.microsoft.com/office/drawing/2014/main" id="{8CBD5103-C6D2-EEA2-AC3E-90D826D11C05}"/>
+              </a:ext>
+            </a:extLst>
+          </p:cNvPr>
+          <p:cNvSpPr/>
+          <p:nvPr/>
+        </p:nvSpPr>
+        <p:spPr>
+          <a:xfrm>
+            <a:off x="7363231" y="2810974"/>
+            <a:ext cx="217311" cy="227575"/>
+          </a:xfrm>
+          <a:prstGeom prst="rect">
+            <a:avLst/>
+          </a:prstGeom>
+          <a:noFill/>
+          <a:ln w="28575">
+            <a:solidFill>
+              <a:srgbClr val="FFC000"/>
+            </a:solidFill>
+          </a:ln>
+        </p:spPr>
+        <p:style>
+          <a:lnRef idx="2">
+            <a:schemeClr val="accent1">
+              <a:shade val="15000"/>
+            </a:schemeClr>
+          </a:lnRef>
+          <a:fillRef idx="1">
+            <a:schemeClr val="accent1"/>
+          </a:fillRef>
+          <a:effectRef idx="0">
+            <a:schemeClr val="accent1"/>
+          </a:effectRef>
+          <a:fontRef idx="minor">
+            <a:schemeClr val="lt1"/>
+          </a:fontRef>
+        </p:style>
+        <p:txBody>
+          <a:bodyPr rtlCol="0" anchor="ctr"/>
+          <a:lstStyle/>
+          <a:p>
+            <a:pPr algn="ctr"/>
+            <a:endParaRPr lang="fr-FR"/>
+          </a:p>
+        </p:txBody>
+      </p:sp>
+      <p:sp>
+        <p:nvSpPr>
+          <p:cNvPr id="16" name="Légende : encadrée à une bordure 15">
+            <a:extLst>
+              <a:ext uri="{FF2B5EF4-FFF2-40B4-BE49-F238E27FC236}">
+                <a16:creationId xmlns:a16="http://schemas.microsoft.com/office/drawing/2014/main" id="{ABD65DE1-1A88-2F00-870A-C23EE9620DC1}"/>
+              </a:ext>
+            </a:extLst>
+          </p:cNvPr>
+          <p:cNvSpPr/>
+          <p:nvPr/>
+        </p:nvSpPr>
+        <p:spPr>
+          <a:xfrm>
+            <a:off x="8411102" y="2647713"/>
+            <a:ext cx="3374424" cy="283867"/>
+          </a:xfrm>
+          <a:prstGeom prst="accentBorderCallout1">
+            <a:avLst>
+              <a:gd name="adj1" fmla="val 18750"/>
+              <a:gd name="adj2" fmla="val -8333"/>
+              <a:gd name="adj3" fmla="val 90069"/>
+              <a:gd name="adj4" fmla="val -24800"/>
+            </a:avLst>
+          </a:prstGeom>
+          <a:ln>
+            <a:solidFill>
+              <a:schemeClr val="accent4"/>
+            </a:solidFill>
+          </a:ln>
+        </p:spPr>
+        <p:style>
+          <a:lnRef idx="0">
+            <a:schemeClr val="accent4"/>
+          </a:lnRef>
+          <a:fillRef idx="3">
+            <a:schemeClr val="accent4"/>
+          </a:fillRef>
+          <a:effectRef idx="3">
+            <a:schemeClr val="accent4"/>
+          </a:effectRef>
+          <a:fontRef idx="minor">
+            <a:schemeClr val="lt1"/>
+          </a:fontRef>
+        </p:style>
+        <p:txBody>
+          <a:bodyPr rtlCol="0" anchor="ctr"/>
+          <a:lstStyle/>
+          <a:p>
+            <a:pPr algn="ctr"/>
+            <a:r>
+              <a:rPr lang="fr-FR" sz="1400" dirty="0"/>
+              <a:t>Copie l’URL complète dans le presse-papier</a:t>
             </a:r>
           </a:p>
         </p:txBody>
@@ -20301,10 +20520,10 @@
       </p:grpSpPr>
       <p:pic>
         <p:nvPicPr>
-          <p:cNvPr id="10" name="Image 9">
-            <a:extLst>
-              <a:ext uri="{FF2B5EF4-FFF2-40B4-BE49-F238E27FC236}">
-                <a16:creationId xmlns:a16="http://schemas.microsoft.com/office/drawing/2014/main" id="{C61C8023-99D1-2101-F255-77237306A496}"/>
+          <p:cNvPr id="9" name="Image 8">
+            <a:extLst>
+              <a:ext uri="{FF2B5EF4-FFF2-40B4-BE49-F238E27FC236}">
+                <a16:creationId xmlns:a16="http://schemas.microsoft.com/office/drawing/2014/main" id="{11821224-780E-100C-5A9F-C4484A51D2E0}"/>
               </a:ext>
             </a:extLst>
           </p:cNvPr>
@@ -20321,8 +20540,8 @@
         </p:blipFill>
         <p:spPr>
           <a:xfrm>
-            <a:off x="3932898" y="1710744"/>
-            <a:ext cx="4070065" cy="3496274"/>
+            <a:off x="4015886" y="1731456"/>
+            <a:ext cx="3734882" cy="3429516"/>
           </a:xfrm>
           <a:prstGeom prst="rect">
             <a:avLst/>
@@ -20518,7 +20737,7 @@
         </p:nvSpPr>
         <p:spPr>
           <a:xfrm>
-            <a:off x="8442157" y="2741552"/>
+            <a:off x="8408079" y="2848749"/>
             <a:ext cx="3553585" cy="318133"/>
           </a:xfrm>
           <a:prstGeom prst="accentBorderCallout1">
@@ -20783,7 +21002,7 @@
         </p:nvSpPr>
         <p:spPr>
           <a:xfrm>
-            <a:off x="5093670" y="2213207"/>
+            <a:off x="5134214" y="2242657"/>
             <a:ext cx="217311" cy="227575"/>
           </a:xfrm>
           <a:prstGeom prst="rect">
@@ -20892,7 +21111,7 @@
         </p:nvSpPr>
         <p:spPr>
           <a:xfrm>
-            <a:off x="4225450" y="2251536"/>
+            <a:off x="4295655" y="2308519"/>
             <a:ext cx="816450" cy="758836"/>
           </a:xfrm>
           <a:prstGeom prst="rect">
@@ -20944,8 +21163,8 @@
         </p:nvSpPr>
         <p:spPr>
           <a:xfrm>
-            <a:off x="5114688" y="2476682"/>
-            <a:ext cx="2800587" cy="156506"/>
+            <a:off x="5114689" y="2476681"/>
+            <a:ext cx="2314812" cy="201763"/>
           </a:xfrm>
           <a:prstGeom prst="rect">
             <a:avLst/>
@@ -20996,15 +21215,15 @@
         </p:nvSpPr>
         <p:spPr>
           <a:xfrm>
-            <a:off x="8442157" y="2301362"/>
+            <a:off x="8426297" y="2060394"/>
             <a:ext cx="2667954" cy="310492"/>
           </a:xfrm>
           <a:prstGeom prst="accentBorderCallout1">
             <a:avLst>
               <a:gd name="adj1" fmla="val 18750"/>
               <a:gd name="adj2" fmla="val -8333"/>
-              <a:gd name="adj3" fmla="val 81773"/>
-              <a:gd name="adj4" fmla="val -17928"/>
+              <a:gd name="adj3" fmla="val 126766"/>
+              <a:gd name="adj4" fmla="val -49107"/>
             </a:avLst>
           </a:prstGeom>
           <a:ln>
@@ -21167,7 +21386,7 @@
         </p:nvSpPr>
         <p:spPr>
           <a:xfrm>
-            <a:off x="6363633" y="4917168"/>
+            <a:off x="6274029" y="4887794"/>
             <a:ext cx="590124" cy="227575"/>
           </a:xfrm>
           <a:prstGeom prst="rect">
@@ -21219,7 +21438,7 @@
         </p:nvSpPr>
         <p:spPr>
           <a:xfrm>
-            <a:off x="4944640" y="4919681"/>
+            <a:off x="4906723" y="4894145"/>
             <a:ext cx="634031" cy="227575"/>
           </a:xfrm>
           <a:prstGeom prst="rect">
@@ -21271,7 +21490,7 @@
         </p:nvSpPr>
         <p:spPr>
           <a:xfrm>
-            <a:off x="5761185" y="4919681"/>
+            <a:off x="5680727" y="4887795"/>
             <a:ext cx="535556" cy="227575"/>
           </a:xfrm>
           <a:prstGeom prst="rect">
@@ -21380,8 +21599,8 @@
         </p:nvSpPr>
         <p:spPr>
           <a:xfrm>
-            <a:off x="6984748" y="6012222"/>
-            <a:ext cx="3816602" cy="436362"/>
+            <a:off x="6984747" y="6012222"/>
+            <a:ext cx="4125363" cy="436362"/>
           </a:xfrm>
           <a:prstGeom prst="accentBorderCallout1">
             <a:avLst>
@@ -21418,7 +21637,7 @@
             <a:pPr algn="ctr"/>
             <a:r>
               <a:rPr lang="fr-FR" sz="1400" dirty="0"/>
-              <a:t>Supprimer TOUT le contenu du répertoire racine sur le site distant (uniquement si arrêtée)</a:t>
+              <a:t>Supprimer TOUT le contenu du répertoire de la compétition sur le site distant (uniquement si arrêtée)</a:t>
             </a:r>
           </a:p>
         </p:txBody>
@@ -21867,8 +22086,8 @@
             <a:avLst>
               <a:gd name="adj1" fmla="val 18750"/>
               <a:gd name="adj2" fmla="val -8333"/>
-              <a:gd name="adj3" fmla="val 84104"/>
-              <a:gd name="adj4" fmla="val -59668"/>
+              <a:gd name="adj3" fmla="val 23566"/>
+              <a:gd name="adj4" fmla="val -60881"/>
             </a:avLst>
           </a:prstGeom>
           <a:ln>
@@ -21924,7 +22143,7 @@
             <a:avLst>
               <a:gd name="adj1" fmla="val 18750"/>
               <a:gd name="adj2" fmla="val -8333"/>
-              <a:gd name="adj3" fmla="val 25057"/>
+              <a:gd name="adj3" fmla="val -30359"/>
               <a:gd name="adj4" fmla="val -60477"/>
             </a:avLst>
           </a:prstGeom>
@@ -22209,8 +22428,8 @@
             <a:avLst>
               <a:gd name="adj1" fmla="val 18750"/>
               <a:gd name="adj2" fmla="val -8333"/>
-              <a:gd name="adj3" fmla="val -41442"/>
-              <a:gd name="adj4" fmla="val -59264"/>
+              <a:gd name="adj3" fmla="val -85774"/>
+              <a:gd name="adj4" fmla="val -60477"/>
             </a:avLst>
           </a:prstGeom>
           <a:ln>
@@ -22351,6 +22570,115 @@
           <a:p>
             <a:pPr algn="ctr"/>
             <a:endParaRPr lang="fr-FR"/>
+          </a:p>
+        </p:txBody>
+      </p:sp>
+      <p:sp>
+        <p:nvSpPr>
+          <p:cNvPr id="13" name="Rectangle 12">
+            <a:extLst>
+              <a:ext uri="{FF2B5EF4-FFF2-40B4-BE49-F238E27FC236}">
+                <a16:creationId xmlns:a16="http://schemas.microsoft.com/office/drawing/2014/main" id="{39B16C27-E2EB-3457-DFC6-2BE7B6BB888E}"/>
+              </a:ext>
+            </a:extLst>
+          </p:cNvPr>
+          <p:cNvSpPr/>
+          <p:nvPr/>
+        </p:nvSpPr>
+        <p:spPr>
+          <a:xfrm>
+            <a:off x="7478179" y="2469511"/>
+            <a:ext cx="217311" cy="227575"/>
+          </a:xfrm>
+          <a:prstGeom prst="rect">
+            <a:avLst/>
+          </a:prstGeom>
+          <a:noFill/>
+          <a:ln w="28575">
+            <a:solidFill>
+              <a:srgbClr val="FFC000"/>
+            </a:solidFill>
+          </a:ln>
+        </p:spPr>
+        <p:style>
+          <a:lnRef idx="2">
+            <a:schemeClr val="accent1">
+              <a:shade val="15000"/>
+            </a:schemeClr>
+          </a:lnRef>
+          <a:fillRef idx="1">
+            <a:schemeClr val="accent1"/>
+          </a:fillRef>
+          <a:effectRef idx="0">
+            <a:schemeClr val="accent1"/>
+          </a:effectRef>
+          <a:fontRef idx="minor">
+            <a:schemeClr val="lt1"/>
+          </a:fontRef>
+        </p:style>
+        <p:txBody>
+          <a:bodyPr rtlCol="0" anchor="ctr"/>
+          <a:lstStyle/>
+          <a:p>
+            <a:pPr algn="ctr"/>
+            <a:endParaRPr lang="fr-FR"/>
+          </a:p>
+        </p:txBody>
+      </p:sp>
+      <p:sp>
+        <p:nvSpPr>
+          <p:cNvPr id="15" name="Légende : encadrée à une bordure 14">
+            <a:extLst>
+              <a:ext uri="{FF2B5EF4-FFF2-40B4-BE49-F238E27FC236}">
+                <a16:creationId xmlns:a16="http://schemas.microsoft.com/office/drawing/2014/main" id="{485DAB41-D0C3-1559-125A-95D225F35F08}"/>
+              </a:ext>
+            </a:extLst>
+          </p:cNvPr>
+          <p:cNvSpPr/>
+          <p:nvPr/>
+        </p:nvSpPr>
+        <p:spPr>
+          <a:xfrm>
+            <a:off x="8413896" y="2458085"/>
+            <a:ext cx="3374424" cy="283867"/>
+          </a:xfrm>
+          <a:prstGeom prst="accentBorderCallout1">
+            <a:avLst>
+              <a:gd name="adj1" fmla="val 18750"/>
+              <a:gd name="adj2" fmla="val -8333"/>
+              <a:gd name="adj3" fmla="val 58751"/>
+              <a:gd name="adj4" fmla="val -21225"/>
+            </a:avLst>
+          </a:prstGeom>
+          <a:ln>
+            <a:solidFill>
+              <a:schemeClr val="accent4"/>
+            </a:solidFill>
+          </a:ln>
+        </p:spPr>
+        <p:style>
+          <a:lnRef idx="0">
+            <a:schemeClr val="accent4"/>
+          </a:lnRef>
+          <a:fillRef idx="3">
+            <a:schemeClr val="accent4"/>
+          </a:fillRef>
+          <a:effectRef idx="3">
+            <a:schemeClr val="accent4"/>
+          </a:effectRef>
+          <a:fontRef idx="minor">
+            <a:schemeClr val="lt1"/>
+          </a:fontRef>
+        </p:style>
+        <p:txBody>
+          <a:bodyPr rtlCol="0" anchor="ctr"/>
+          <a:lstStyle/>
+          <a:p>
+            <a:pPr algn="ctr"/>
+            <a:r>
+              <a:rPr lang="fr-FR" sz="1400" dirty="0"/>
+              <a:t>Copie l’URL complète dans le presse-papier</a:t>
+            </a:r>
           </a:p>
         </p:txBody>
       </p:sp>
@@ -23328,68 +23656,12 @@
           <a:chExt cx="0" cy="0"/>
         </a:xfrm>
       </p:grpSpPr>
-      <p:sp>
-        <p:nvSpPr>
-          <p:cNvPr id="2" name="Titre 1">
-            <a:extLst>
-              <a:ext uri="{FF2B5EF4-FFF2-40B4-BE49-F238E27FC236}">
-                <a16:creationId xmlns:a16="http://schemas.microsoft.com/office/drawing/2014/main" id="{EC51AA81-A5DF-3A18-38B6-020B45588EFC}"/>
-              </a:ext>
-            </a:extLst>
-          </p:cNvPr>
-          <p:cNvSpPr>
-            <a:spLocks noGrp="1"/>
-          </p:cNvSpPr>
-          <p:nvPr>
-            <p:ph type="title"/>
-          </p:nvPr>
-        </p:nvSpPr>
-        <p:spPr/>
-        <p:txBody>
-          <a:bodyPr/>
-          <a:lstStyle/>
-          <a:p>
-            <a:r>
-              <a:rPr lang="fr-FR" dirty="0"/>
-              <a:t>Ecran de Configuration</a:t>
-            </a:r>
-          </a:p>
-        </p:txBody>
-      </p:sp>
-      <p:sp>
-        <p:nvSpPr>
-          <p:cNvPr id="4" name="Espace réservé du texte 3">
-            <a:extLst>
-              <a:ext uri="{FF2B5EF4-FFF2-40B4-BE49-F238E27FC236}">
-                <a16:creationId xmlns:a16="http://schemas.microsoft.com/office/drawing/2014/main" id="{6BDCEFA8-59A6-33CC-D69F-6DDA6E4D9636}"/>
-              </a:ext>
-            </a:extLst>
-          </p:cNvPr>
-          <p:cNvSpPr>
-            <a:spLocks noGrp="1"/>
-          </p:cNvSpPr>
-          <p:nvPr>
-            <p:ph type="body" sz="quarter" idx="15"/>
-          </p:nvPr>
-        </p:nvSpPr>
-        <p:spPr/>
-        <p:txBody>
-          <a:bodyPr/>
-          <a:lstStyle/>
-          <a:p>
-            <a:r>
-              <a:rPr lang="fr-FR" dirty="0"/>
-              <a:t>Ecrans &amp; fonctionnalités</a:t>
-            </a:r>
-          </a:p>
-        </p:txBody>
-      </p:sp>
       <p:pic>
         <p:nvPicPr>
-          <p:cNvPr id="5" name="Image 4">
-            <a:extLst>
-              <a:ext uri="{FF2B5EF4-FFF2-40B4-BE49-F238E27FC236}">
-                <a16:creationId xmlns:a16="http://schemas.microsoft.com/office/drawing/2014/main" id="{84CC962D-3DBE-400A-60DA-11F73D3CE8A8}"/>
+          <p:cNvPr id="17" name="Image 16">
+            <a:extLst>
+              <a:ext uri="{FF2B5EF4-FFF2-40B4-BE49-F238E27FC236}">
+                <a16:creationId xmlns:a16="http://schemas.microsoft.com/office/drawing/2014/main" id="{27DD014A-692F-B398-DD35-CD366E991A3A}"/>
               </a:ext>
             </a:extLst>
           </p:cNvPr>
@@ -23406,8 +23678,8 @@
         </p:blipFill>
         <p:spPr>
           <a:xfrm>
-            <a:off x="3574496" y="1982866"/>
-            <a:ext cx="7772400" cy="3743325"/>
+            <a:off x="3557997" y="1885601"/>
+            <a:ext cx="7773485" cy="4086795"/>
           </a:xfrm>
           <a:prstGeom prst="rect">
             <a:avLst/>
@@ -23416,6 +23688,62 @@
       </p:pic>
       <p:sp>
         <p:nvSpPr>
+          <p:cNvPr id="2" name="Titre 1">
+            <a:extLst>
+              <a:ext uri="{FF2B5EF4-FFF2-40B4-BE49-F238E27FC236}">
+                <a16:creationId xmlns:a16="http://schemas.microsoft.com/office/drawing/2014/main" id="{EC51AA81-A5DF-3A18-38B6-020B45588EFC}"/>
+              </a:ext>
+            </a:extLst>
+          </p:cNvPr>
+          <p:cNvSpPr>
+            <a:spLocks noGrp="1"/>
+          </p:cNvSpPr>
+          <p:nvPr>
+            <p:ph type="title"/>
+          </p:nvPr>
+        </p:nvSpPr>
+        <p:spPr/>
+        <p:txBody>
+          <a:bodyPr/>
+          <a:lstStyle/>
+          <a:p>
+            <a:r>
+              <a:rPr lang="fr-FR" dirty="0"/>
+              <a:t>Ecran de Configuration</a:t>
+            </a:r>
+          </a:p>
+        </p:txBody>
+      </p:sp>
+      <p:sp>
+        <p:nvSpPr>
+          <p:cNvPr id="4" name="Espace réservé du texte 3">
+            <a:extLst>
+              <a:ext uri="{FF2B5EF4-FFF2-40B4-BE49-F238E27FC236}">
+                <a16:creationId xmlns:a16="http://schemas.microsoft.com/office/drawing/2014/main" id="{6BDCEFA8-59A6-33CC-D69F-6DDA6E4D9636}"/>
+              </a:ext>
+            </a:extLst>
+          </p:cNvPr>
+          <p:cNvSpPr>
+            <a:spLocks noGrp="1"/>
+          </p:cNvSpPr>
+          <p:nvPr>
+            <p:ph type="body" sz="quarter" idx="15"/>
+          </p:nvPr>
+        </p:nvSpPr>
+        <p:spPr/>
+        <p:txBody>
+          <a:bodyPr/>
+          <a:lstStyle/>
+          <a:p>
+            <a:r>
+              <a:rPr lang="fr-FR" dirty="0"/>
+              <a:t>Ecrans &amp; fonctionnalités</a:t>
+            </a:r>
+          </a:p>
+        </p:txBody>
+      </p:sp>
+      <p:sp>
+        <p:nvSpPr>
           <p:cNvPr id="9" name="Rectangle 8">
             <a:extLst>
               <a:ext uri="{FF2B5EF4-FFF2-40B4-BE49-F238E27FC236}">
@@ -23429,7 +23757,7 @@
         <p:spPr>
           <a:xfrm>
             <a:off x="3727005" y="2307014"/>
-            <a:ext cx="3933055" cy="2908798"/>
+            <a:ext cx="3933055" cy="3179386"/>
           </a:xfrm>
           <a:prstGeom prst="rect">
             <a:avLst/>
@@ -23480,8 +23808,8 @@
         </p:nvSpPr>
         <p:spPr>
           <a:xfrm>
-            <a:off x="7744905" y="2307014"/>
-            <a:ext cx="3470491" cy="2908798"/>
+            <a:off x="7744905" y="2307013"/>
+            <a:ext cx="3470491" cy="3179385"/>
           </a:xfrm>
           <a:prstGeom prst="rect">
             <a:avLst/>
@@ -23700,6 +24028,58 @@
               <a:rPr lang="fr-FR" sz="1800" i="1" dirty="0"/>
               <a:t>: Cet écran n’est accessible que si la génération est arrêtée.</a:t>
             </a:r>
+          </a:p>
+        </p:txBody>
+      </p:sp>
+      <p:sp>
+        <p:nvSpPr>
+          <p:cNvPr id="7" name="Rectangle 6">
+            <a:extLst>
+              <a:ext uri="{FF2B5EF4-FFF2-40B4-BE49-F238E27FC236}">
+                <a16:creationId xmlns:a16="http://schemas.microsoft.com/office/drawing/2014/main" id="{08E3E894-E2E1-764A-1C38-F1E84EE162F2}"/>
+              </a:ext>
+            </a:extLst>
+          </p:cNvPr>
+          <p:cNvSpPr/>
+          <p:nvPr/>
+        </p:nvSpPr>
+        <p:spPr>
+          <a:xfrm>
+            <a:off x="5927715" y="1916081"/>
+            <a:ext cx="3464690" cy="204362"/>
+          </a:xfrm>
+          <a:prstGeom prst="rect">
+            <a:avLst/>
+          </a:prstGeom>
+          <a:solidFill>
+            <a:srgbClr val="ECF6F9"/>
+          </a:solidFill>
+          <a:ln>
+            <a:noFill/>
+          </a:ln>
+        </p:spPr>
+        <p:style>
+          <a:lnRef idx="2">
+            <a:schemeClr val="accent1">
+              <a:shade val="15000"/>
+            </a:schemeClr>
+          </a:lnRef>
+          <a:fillRef idx="1">
+            <a:schemeClr val="accent1"/>
+          </a:fillRef>
+          <a:effectRef idx="0">
+            <a:schemeClr val="accent1"/>
+          </a:effectRef>
+          <a:fontRef idx="minor">
+            <a:schemeClr val="lt1"/>
+          </a:fontRef>
+        </p:style>
+        <p:txBody>
+          <a:bodyPr rtlCol="0" anchor="ctr"/>
+          <a:lstStyle/>
+          <a:p>
+            <a:pPr algn="ctr"/>
+            <a:endParaRPr lang="fr-FR"/>
           </a:p>
         </p:txBody>
       </p:sp>
@@ -23845,19 +24225,19 @@
           </a:prstGeom>
           <a:ln>
             <a:solidFill>
-              <a:schemeClr val="accent1"/>
+              <a:schemeClr val="accent4"/>
             </a:solidFill>
           </a:ln>
         </p:spPr>
         <p:style>
           <a:lnRef idx="0">
-            <a:schemeClr val="accent5"/>
+            <a:schemeClr val="accent4"/>
           </a:lnRef>
           <a:fillRef idx="3">
-            <a:schemeClr val="accent5"/>
+            <a:schemeClr val="accent4"/>
           </a:fillRef>
           <a:effectRef idx="3">
-            <a:schemeClr val="accent5"/>
+            <a:schemeClr val="accent4"/>
           </a:effectRef>
           <a:fontRef idx="minor">
             <a:schemeClr val="lt1"/>
@@ -23954,19 +24334,19 @@
           </a:prstGeom>
           <a:ln>
             <a:solidFill>
-              <a:schemeClr val="accent1"/>
+              <a:schemeClr val="accent4"/>
             </a:solidFill>
           </a:ln>
         </p:spPr>
         <p:style>
           <a:lnRef idx="0">
-            <a:schemeClr val="accent5"/>
+            <a:schemeClr val="accent4"/>
           </a:lnRef>
           <a:fillRef idx="3">
-            <a:schemeClr val="accent5"/>
+            <a:schemeClr val="accent4"/>
           </a:fillRef>
           <a:effectRef idx="3">
-            <a:schemeClr val="accent5"/>
+            <a:schemeClr val="accent4"/>
           </a:effectRef>
           <a:fontRef idx="minor">
             <a:schemeClr val="lt1"/>
@@ -24011,19 +24391,19 @@
           </a:prstGeom>
           <a:ln>
             <a:solidFill>
-              <a:schemeClr val="accent1"/>
+              <a:schemeClr val="accent4"/>
             </a:solidFill>
           </a:ln>
         </p:spPr>
         <p:style>
           <a:lnRef idx="0">
-            <a:schemeClr val="accent5"/>
+            <a:schemeClr val="accent4"/>
           </a:lnRef>
           <a:fillRef idx="3">
-            <a:schemeClr val="accent5"/>
+            <a:schemeClr val="accent4"/>
           </a:fillRef>
           <a:effectRef idx="3">
-            <a:schemeClr val="accent5"/>
+            <a:schemeClr val="accent4"/>
           </a:effectRef>
           <a:fontRef idx="minor">
             <a:schemeClr val="lt1"/>
@@ -24068,19 +24448,19 @@
           </a:prstGeom>
           <a:ln>
             <a:solidFill>
-              <a:schemeClr val="accent1"/>
+              <a:schemeClr val="accent4"/>
             </a:solidFill>
           </a:ln>
         </p:spPr>
         <p:style>
           <a:lnRef idx="0">
-            <a:schemeClr val="accent5"/>
+            <a:schemeClr val="accent4"/>
           </a:lnRef>
           <a:fillRef idx="3">
-            <a:schemeClr val="accent5"/>
+            <a:schemeClr val="accent4"/>
           </a:fillRef>
           <a:effectRef idx="3">
-            <a:schemeClr val="accent5"/>
+            <a:schemeClr val="accent4"/>
           </a:effectRef>
           <a:fontRef idx="minor">
             <a:schemeClr val="lt1"/>
@@ -24437,19 +24817,19 @@
           </a:prstGeom>
           <a:ln>
             <a:solidFill>
-              <a:schemeClr val="accent1"/>
+              <a:schemeClr val="accent4"/>
             </a:solidFill>
           </a:ln>
         </p:spPr>
         <p:style>
           <a:lnRef idx="0">
-            <a:schemeClr val="accent5"/>
+            <a:schemeClr val="accent4"/>
           </a:lnRef>
           <a:fillRef idx="3">
-            <a:schemeClr val="accent5"/>
+            <a:schemeClr val="accent4"/>
           </a:fillRef>
           <a:effectRef idx="3">
-            <a:schemeClr val="accent5"/>
+            <a:schemeClr val="accent4"/>
           </a:effectRef>
           <a:fontRef idx="minor">
             <a:schemeClr val="lt1"/>
@@ -24494,19 +24874,19 @@
           </a:prstGeom>
           <a:ln>
             <a:solidFill>
-              <a:schemeClr val="accent1"/>
+              <a:schemeClr val="accent4"/>
             </a:solidFill>
           </a:ln>
         </p:spPr>
         <p:style>
           <a:lnRef idx="0">
-            <a:schemeClr val="accent5"/>
+            <a:schemeClr val="accent4"/>
           </a:lnRef>
           <a:fillRef idx="3">
-            <a:schemeClr val="accent5"/>
+            <a:schemeClr val="accent4"/>
           </a:fillRef>
           <a:effectRef idx="3">
-            <a:schemeClr val="accent5"/>
+            <a:schemeClr val="accent4"/>
           </a:effectRef>
           <a:fontRef idx="minor">
             <a:schemeClr val="lt1"/>
@@ -24551,19 +24931,19 @@
           </a:prstGeom>
           <a:ln>
             <a:solidFill>
-              <a:schemeClr val="accent1"/>
+              <a:schemeClr val="accent4"/>
             </a:solidFill>
           </a:ln>
         </p:spPr>
         <p:style>
           <a:lnRef idx="0">
-            <a:schemeClr val="accent5"/>
+            <a:schemeClr val="accent4"/>
           </a:lnRef>
           <a:fillRef idx="3">
-            <a:schemeClr val="accent5"/>
+            <a:schemeClr val="accent4"/>
           </a:fillRef>
           <a:effectRef idx="3">
-            <a:schemeClr val="accent5"/>
+            <a:schemeClr val="accent4"/>
           </a:effectRef>
           <a:fontRef idx="minor">
             <a:schemeClr val="lt1"/>
@@ -24611,6 +24991,35 @@
           <a:chExt cx="0" cy="0"/>
         </a:xfrm>
       </p:grpSpPr>
+      <p:pic>
+        <p:nvPicPr>
+          <p:cNvPr id="12" name="Image 11">
+            <a:extLst>
+              <a:ext uri="{FF2B5EF4-FFF2-40B4-BE49-F238E27FC236}">
+                <a16:creationId xmlns:a16="http://schemas.microsoft.com/office/drawing/2014/main" id="{A04F54A9-DC11-4E5C-D6CC-5E6B335A409D}"/>
+              </a:ext>
+            </a:extLst>
+          </p:cNvPr>
+          <p:cNvPicPr>
+            <a:picLocks noChangeAspect="1"/>
+          </p:cNvPicPr>
+          <p:nvPr/>
+        </p:nvPicPr>
+        <p:blipFill>
+          <a:blip r:embed="rId2"/>
+          <a:srcRect l="53137" t="8170" r="2164" b="10572"/>
+          <a:stretch/>
+        </p:blipFill>
+        <p:spPr>
+          <a:xfrm>
+            <a:off x="4200872" y="2049070"/>
+            <a:ext cx="3474720" cy="3320866"/>
+          </a:xfrm>
+          <a:prstGeom prst="rect">
+            <a:avLst/>
+          </a:prstGeom>
+        </p:spPr>
+      </p:pic>
       <p:sp>
         <p:nvSpPr>
           <p:cNvPr id="2" name="Titre 1">
@@ -24672,35 +25081,6 @@
           </a:p>
         </p:txBody>
       </p:sp>
-      <p:pic>
-        <p:nvPicPr>
-          <p:cNvPr id="5" name="Image 4">
-            <a:extLst>
-              <a:ext uri="{FF2B5EF4-FFF2-40B4-BE49-F238E27FC236}">
-                <a16:creationId xmlns:a16="http://schemas.microsoft.com/office/drawing/2014/main" id="{84CC962D-3DBE-400A-60DA-11F73D3CE8A8}"/>
-              </a:ext>
-            </a:extLst>
-          </p:cNvPr>
-          <p:cNvPicPr>
-            <a:picLocks noChangeAspect="1"/>
-          </p:cNvPicPr>
-          <p:nvPr/>
-        </p:nvPicPr>
-        <p:blipFill rotWithShape="1">
-          <a:blip r:embed="rId2"/>
-          <a:srcRect l="53520" t="8353" r="1749" b="13785"/>
-          <a:stretch/>
-        </p:blipFill>
-        <p:spPr>
-          <a:xfrm>
-            <a:off x="4086224" y="2328593"/>
-            <a:ext cx="3476625" cy="2914650"/>
-          </a:xfrm>
-          <a:prstGeom prst="rect">
-            <a:avLst/>
-          </a:prstGeom>
-        </p:spPr>
-      </p:pic>
       <p:sp>
         <p:nvSpPr>
           <p:cNvPr id="7" name="Légende : encadrée à une bordure 6">
@@ -24715,32 +25095,32 @@
         </p:nvSpPr>
         <p:spPr>
           <a:xfrm flipH="1">
-            <a:off x="323702" y="3249449"/>
+            <a:off x="305069" y="4200798"/>
             <a:ext cx="3181935" cy="528401"/>
           </a:xfrm>
           <a:prstGeom prst="accentBorderCallout1">
             <a:avLst>
               <a:gd name="adj1" fmla="val 18750"/>
               <a:gd name="adj2" fmla="val -8333"/>
-              <a:gd name="adj3" fmla="val 160638"/>
-              <a:gd name="adj4" fmla="val -22953"/>
+              <a:gd name="adj3" fmla="val 31667"/>
+              <a:gd name="adj4" fmla="val -26206"/>
             </a:avLst>
           </a:prstGeom>
           <a:ln>
             <a:solidFill>
-              <a:schemeClr val="accent1"/>
+              <a:schemeClr val="accent4"/>
             </a:solidFill>
           </a:ln>
         </p:spPr>
         <p:style>
           <a:lnRef idx="0">
-            <a:schemeClr val="accent5"/>
+            <a:schemeClr val="accent4"/>
           </a:lnRef>
           <a:fillRef idx="3">
-            <a:schemeClr val="accent5"/>
+            <a:schemeClr val="accent4"/>
           </a:fillRef>
           <a:effectRef idx="3">
-            <a:schemeClr val="accent5"/>
+            <a:schemeClr val="accent4"/>
           </a:effectRef>
           <a:fontRef idx="minor">
             <a:schemeClr val="lt1"/>
@@ -24772,8 +25152,8 @@
         </p:nvSpPr>
         <p:spPr>
           <a:xfrm>
-            <a:off x="4241501" y="4036471"/>
-            <a:ext cx="1592082" cy="235042"/>
+            <a:off x="4328916" y="4117689"/>
+            <a:ext cx="1299240" cy="235042"/>
           </a:xfrm>
           <a:prstGeom prst="rect">
             <a:avLst/>
@@ -24781,7 +25161,7 @@
           <a:noFill/>
           <a:ln w="28575">
             <a:solidFill>
-              <a:srgbClr val="2349E3"/>
+              <a:srgbClr val="FFC000"/>
             </a:solidFill>
           </a:ln>
         </p:spPr>
@@ -24824,8 +25204,8 @@
         </p:nvSpPr>
         <p:spPr>
           <a:xfrm>
-            <a:off x="6096000" y="3621926"/>
-            <a:ext cx="1132936" cy="649587"/>
+            <a:off x="6172199" y="4582430"/>
+            <a:ext cx="907473" cy="313128"/>
           </a:xfrm>
           <a:prstGeom prst="rect">
             <a:avLst/>
@@ -24889,19 +25269,19 @@
           </a:prstGeom>
           <a:ln>
             <a:solidFill>
-              <a:schemeClr val="accent4"/>
+              <a:schemeClr val="accent1"/>
             </a:solidFill>
           </a:ln>
         </p:spPr>
         <p:style>
           <a:lnRef idx="0">
-            <a:schemeClr val="accent4"/>
+            <a:schemeClr val="accent5"/>
           </a:lnRef>
           <a:fillRef idx="3">
-            <a:schemeClr val="accent4"/>
+            <a:schemeClr val="accent5"/>
           </a:fillRef>
           <a:effectRef idx="3">
-            <a:schemeClr val="accent4"/>
+            <a:schemeClr val="accent5"/>
           </a:effectRef>
           <a:fontRef idx="minor">
             <a:schemeClr val="lt1"/>
@@ -24933,8 +25313,8 @@
         </p:nvSpPr>
         <p:spPr>
           <a:xfrm>
-            <a:off x="4203879" y="4668990"/>
-            <a:ext cx="3257372" cy="227575"/>
+            <a:off x="4292312" y="4933950"/>
+            <a:ext cx="3257372" cy="189182"/>
           </a:xfrm>
           <a:prstGeom prst="rect">
             <a:avLst/>
@@ -24942,7 +25322,7 @@
           <a:noFill/>
           <a:ln w="28575">
             <a:solidFill>
-              <a:srgbClr val="FFC000"/>
+              <a:srgbClr val="2349E3"/>
             </a:solidFill>
           </a:ln>
         </p:spPr>
@@ -24998,6 +25378,63 @@
           </a:prstGeom>
           <a:ln>
             <a:solidFill>
+              <a:schemeClr val="accent1"/>
+            </a:solidFill>
+          </a:ln>
+        </p:spPr>
+        <p:style>
+          <a:lnRef idx="0">
+            <a:schemeClr val="accent5"/>
+          </a:lnRef>
+          <a:fillRef idx="3">
+            <a:schemeClr val="accent5"/>
+          </a:fillRef>
+          <a:effectRef idx="3">
+            <a:schemeClr val="accent5"/>
+          </a:effectRef>
+          <a:fontRef idx="minor">
+            <a:schemeClr val="lt1"/>
+          </a:fontRef>
+        </p:style>
+        <p:txBody>
+          <a:bodyPr rtlCol="0" anchor="ctr"/>
+          <a:lstStyle/>
+          <a:p>
+            <a:pPr algn="ctr"/>
+            <a:r>
+              <a:rPr lang="fr-FR" sz="1400" dirty="0"/>
+              <a:t>Répertoire de travail de l’application</a:t>
+            </a:r>
+          </a:p>
+        </p:txBody>
+      </p:sp>
+      <p:sp>
+        <p:nvSpPr>
+          <p:cNvPr id="19" name="Légende : encadrée à une bordure 18">
+            <a:extLst>
+              <a:ext uri="{FF2B5EF4-FFF2-40B4-BE49-F238E27FC236}">
+                <a16:creationId xmlns:a16="http://schemas.microsoft.com/office/drawing/2014/main" id="{BCDCB479-EFDF-194D-1CBD-42B9F7A668CA}"/>
+              </a:ext>
+            </a:extLst>
+          </p:cNvPr>
+          <p:cNvSpPr/>
+          <p:nvPr/>
+        </p:nvSpPr>
+        <p:spPr>
+          <a:xfrm>
+            <a:off x="8143436" y="2328593"/>
+            <a:ext cx="2974144" cy="322765"/>
+          </a:xfrm>
+          <a:prstGeom prst="accentBorderCallout1">
+            <a:avLst>
+              <a:gd name="adj1" fmla="val 18750"/>
+              <a:gd name="adj2" fmla="val -8333"/>
+              <a:gd name="adj3" fmla="val 144407"/>
+              <a:gd name="adj4" fmla="val -37493"/>
+            </a:avLst>
+          </a:prstGeom>
+          <a:ln>
+            <a:solidFill>
               <a:schemeClr val="accent4"/>
             </a:solidFill>
           </a:ln>
@@ -25023,17 +25460,17 @@
             <a:pPr algn="ctr"/>
             <a:r>
               <a:rPr lang="fr-FR" sz="1400" dirty="0"/>
-              <a:t>Répertoire de travail de l’application</a:t>
-            </a:r>
-          </a:p>
-        </p:txBody>
-      </p:sp>
-      <p:sp>
-        <p:nvSpPr>
-          <p:cNvPr id="19" name="Légende : encadrée à une bordure 18">
-            <a:extLst>
-              <a:ext uri="{FF2B5EF4-FFF2-40B4-BE49-F238E27FC236}">
-                <a16:creationId xmlns:a16="http://schemas.microsoft.com/office/drawing/2014/main" id="{BCDCB479-EFDF-194D-1CBD-42B9F7A668CA}"/>
+              <a:t>Délai en seconde entre 2 générations</a:t>
+            </a:r>
+          </a:p>
+        </p:txBody>
+      </p:sp>
+      <p:sp>
+        <p:nvSpPr>
+          <p:cNvPr id="20" name="Rectangle 19">
+            <a:extLst>
+              <a:ext uri="{FF2B5EF4-FFF2-40B4-BE49-F238E27FC236}">
+                <a16:creationId xmlns:a16="http://schemas.microsoft.com/office/drawing/2014/main" id="{0061C9EA-91E8-100F-45B3-6EF6020CF3A5}"/>
               </a:ext>
             </a:extLst>
           </p:cNvPr>
@@ -25042,64 +25479,7 @@
         </p:nvSpPr>
         <p:spPr>
           <a:xfrm>
-            <a:off x="8143436" y="2328593"/>
-            <a:ext cx="2974144" cy="322765"/>
-          </a:xfrm>
-          <a:prstGeom prst="accentBorderCallout1">
-            <a:avLst>
-              <a:gd name="adj1" fmla="val 18750"/>
-              <a:gd name="adj2" fmla="val -8333"/>
-              <a:gd name="adj3" fmla="val 243268"/>
-              <a:gd name="adj4" fmla="val -41656"/>
-            </a:avLst>
-          </a:prstGeom>
-          <a:ln>
-            <a:solidFill>
-              <a:schemeClr val="accent1"/>
-            </a:solidFill>
-          </a:ln>
-        </p:spPr>
-        <p:style>
-          <a:lnRef idx="0">
-            <a:schemeClr val="accent5"/>
-          </a:lnRef>
-          <a:fillRef idx="3">
-            <a:schemeClr val="accent5"/>
-          </a:fillRef>
-          <a:effectRef idx="3">
-            <a:schemeClr val="accent5"/>
-          </a:effectRef>
-          <a:fontRef idx="minor">
-            <a:schemeClr val="lt1"/>
-          </a:fontRef>
-        </p:style>
-        <p:txBody>
-          <a:bodyPr rtlCol="0" anchor="ctr"/>
-          <a:lstStyle/>
-          <a:p>
-            <a:pPr algn="ctr"/>
-            <a:r>
-              <a:rPr lang="fr-FR" sz="1400" dirty="0"/>
-              <a:t>Délai en seconde entre 2 générations</a:t>
-            </a:r>
-          </a:p>
-        </p:txBody>
-      </p:sp>
-      <p:sp>
-        <p:nvSpPr>
-          <p:cNvPr id="20" name="Rectangle 19">
-            <a:extLst>
-              <a:ext uri="{FF2B5EF4-FFF2-40B4-BE49-F238E27FC236}">
-                <a16:creationId xmlns:a16="http://schemas.microsoft.com/office/drawing/2014/main" id="{0061C9EA-91E8-100F-45B3-6EF6020CF3A5}"/>
-              </a:ext>
-            </a:extLst>
-          </p:cNvPr>
-          <p:cNvSpPr/>
-          <p:nvPr/>
-        </p:nvSpPr>
-        <p:spPr>
-          <a:xfrm>
-            <a:off x="5911236" y="2950547"/>
+            <a:off x="6020773" y="2678960"/>
             <a:ext cx="984864" cy="235042"/>
           </a:xfrm>
           <a:prstGeom prst="rect">
@@ -25108,7 +25488,7 @@
           <a:noFill/>
           <a:ln w="28575">
             <a:solidFill>
-              <a:srgbClr val="2349E3"/>
+              <a:srgbClr val="FFC000"/>
             </a:solidFill>
           </a:ln>
         </p:spPr>
@@ -25158,25 +25538,25 @@
             <a:avLst>
               <a:gd name="adj1" fmla="val 18750"/>
               <a:gd name="adj2" fmla="val -8333"/>
-              <a:gd name="adj3" fmla="val 66934"/>
-              <a:gd name="adj4" fmla="val -41913"/>
+              <a:gd name="adj3" fmla="val 30757"/>
+              <a:gd name="adj4" fmla="val -37910"/>
             </a:avLst>
           </a:prstGeom>
           <a:ln>
             <a:solidFill>
-              <a:schemeClr val="accent1"/>
+              <a:schemeClr val="accent4"/>
             </a:solidFill>
           </a:ln>
         </p:spPr>
         <p:style>
           <a:lnRef idx="0">
-            <a:schemeClr val="accent5"/>
+            <a:schemeClr val="accent4"/>
           </a:lnRef>
           <a:fillRef idx="3">
-            <a:schemeClr val="accent5"/>
+            <a:schemeClr val="accent4"/>
           </a:fillRef>
           <a:effectRef idx="3">
-            <a:schemeClr val="accent5"/>
+            <a:schemeClr val="accent4"/>
           </a:effectRef>
           <a:fontRef idx="minor">
             <a:schemeClr val="lt1"/>
@@ -25208,7 +25588,7 @@
         </p:nvSpPr>
         <p:spPr>
           <a:xfrm>
-            <a:off x="5911236" y="3311479"/>
+            <a:off x="6020773" y="3052706"/>
             <a:ext cx="984864" cy="235042"/>
           </a:xfrm>
           <a:prstGeom prst="rect">
@@ -25217,7 +25597,7 @@
           <a:noFill/>
           <a:ln w="28575">
             <a:solidFill>
-              <a:srgbClr val="2349E3"/>
+              <a:srgbClr val="FFC000"/>
             </a:solidFill>
           </a:ln>
         </p:spPr>
@@ -25260,7 +25640,7 @@
         </p:nvSpPr>
         <p:spPr>
           <a:xfrm>
-            <a:off x="8143436" y="4657093"/>
+            <a:off x="8143436" y="4895557"/>
             <a:ext cx="2974144" cy="483119"/>
           </a:xfrm>
           <a:prstGeom prst="accentBorderCallout1">
@@ -25273,19 +25653,19 @@
           </a:prstGeom>
           <a:ln>
             <a:solidFill>
-              <a:schemeClr val="accent1"/>
+              <a:schemeClr val="accent4"/>
             </a:solidFill>
           </a:ln>
         </p:spPr>
         <p:style>
           <a:lnRef idx="0">
-            <a:schemeClr val="accent5"/>
+            <a:schemeClr val="accent4"/>
           </a:lnRef>
           <a:fillRef idx="3">
-            <a:schemeClr val="accent5"/>
+            <a:schemeClr val="accent4"/>
           </a:fillRef>
           <a:effectRef idx="3">
-            <a:schemeClr val="accent5"/>
+            <a:schemeClr val="accent4"/>
           </a:effectRef>
           <a:fontRef idx="minor">
             <a:schemeClr val="lt1"/>
@@ -25317,8 +25697,8 @@
         </p:nvSpPr>
         <p:spPr>
           <a:xfrm>
-            <a:off x="6206511" y="4322312"/>
-            <a:ext cx="899139" cy="283026"/>
+            <a:off x="6063635" y="3372135"/>
+            <a:ext cx="1137265" cy="1123665"/>
           </a:xfrm>
           <a:prstGeom prst="rect">
             <a:avLst/>
@@ -25352,6 +25732,157 @@
           <a:p>
             <a:pPr algn="ctr"/>
             <a:endParaRPr lang="fr-FR"/>
+          </a:p>
+        </p:txBody>
+      </p:sp>
+      <p:sp>
+        <p:nvSpPr>
+          <p:cNvPr id="13" name="Rectangle 12">
+            <a:extLst>
+              <a:ext uri="{FF2B5EF4-FFF2-40B4-BE49-F238E27FC236}">
+                <a16:creationId xmlns:a16="http://schemas.microsoft.com/office/drawing/2014/main" id="{95017283-CD23-6073-13F5-3183B7E8A9FE}"/>
+              </a:ext>
+            </a:extLst>
+          </p:cNvPr>
+          <p:cNvSpPr/>
+          <p:nvPr/>
+        </p:nvSpPr>
+        <p:spPr>
+          <a:xfrm>
+            <a:off x="5667375" y="4117689"/>
+            <a:ext cx="232244" cy="235042"/>
+          </a:xfrm>
+          <a:prstGeom prst="rect">
+            <a:avLst/>
+          </a:prstGeom>
+          <a:noFill/>
+          <a:ln w="28575">
+            <a:solidFill>
+              <a:srgbClr val="FFC000"/>
+            </a:solidFill>
+          </a:ln>
+        </p:spPr>
+        <p:style>
+          <a:lnRef idx="2">
+            <a:schemeClr val="accent1">
+              <a:shade val="15000"/>
+            </a:schemeClr>
+          </a:lnRef>
+          <a:fillRef idx="1">
+            <a:schemeClr val="accent1"/>
+          </a:fillRef>
+          <a:effectRef idx="0">
+            <a:schemeClr val="accent1"/>
+          </a:effectRef>
+          <a:fontRef idx="minor">
+            <a:schemeClr val="lt1"/>
+          </a:fontRef>
+        </p:style>
+        <p:txBody>
+          <a:bodyPr rtlCol="0" anchor="ctr"/>
+          <a:lstStyle/>
+          <a:p>
+            <a:pPr algn="ctr"/>
+            <a:endParaRPr lang="fr-FR"/>
+          </a:p>
+        </p:txBody>
+      </p:sp>
+      <p:sp>
+        <p:nvSpPr>
+          <p:cNvPr id="14" name="Légende : encadrée à une bordure 13">
+            <a:extLst>
+              <a:ext uri="{FF2B5EF4-FFF2-40B4-BE49-F238E27FC236}">
+                <a16:creationId xmlns:a16="http://schemas.microsoft.com/office/drawing/2014/main" id="{D35BE13C-247E-B746-8D5B-2BD4553393E3}"/>
+              </a:ext>
+            </a:extLst>
+          </p:cNvPr>
+          <p:cNvSpPr/>
+          <p:nvPr/>
+        </p:nvSpPr>
+        <p:spPr>
+          <a:xfrm flipH="1">
+            <a:off x="305069" y="3286236"/>
+            <a:ext cx="3181935" cy="528401"/>
+          </a:xfrm>
+          <a:prstGeom prst="accentBorderCallout1">
+            <a:avLst>
+              <a:gd name="adj1" fmla="val 18750"/>
+              <a:gd name="adj2" fmla="val -8333"/>
+              <a:gd name="adj3" fmla="val 150842"/>
+              <a:gd name="adj4" fmla="val -71210"/>
+            </a:avLst>
+          </a:prstGeom>
+          <a:ln>
+            <a:solidFill>
+              <a:schemeClr val="accent4"/>
+            </a:solidFill>
+          </a:ln>
+        </p:spPr>
+        <p:style>
+          <a:lnRef idx="0">
+            <a:schemeClr val="accent4"/>
+          </a:lnRef>
+          <a:fillRef idx="3">
+            <a:schemeClr val="accent4"/>
+          </a:fillRef>
+          <a:effectRef idx="3">
+            <a:schemeClr val="accent4"/>
+          </a:effectRef>
+          <a:fontRef idx="minor">
+            <a:schemeClr val="lt1"/>
+          </a:fontRef>
+        </p:style>
+        <p:txBody>
+          <a:bodyPr rtlCol="0" anchor="ctr"/>
+          <a:lstStyle/>
+          <a:p>
+            <a:pPr algn="ctr"/>
+            <a:r>
+              <a:rPr lang="fr-FR" sz="1400" dirty="0"/>
+              <a:t>Ajoute un logo dans la liste</a:t>
+            </a:r>
+          </a:p>
+        </p:txBody>
+      </p:sp>
+      <p:sp>
+        <p:nvSpPr>
+          <p:cNvPr id="25" name="Espace réservé du texte 2">
+            <a:extLst>
+              <a:ext uri="{FF2B5EF4-FFF2-40B4-BE49-F238E27FC236}">
+                <a16:creationId xmlns:a16="http://schemas.microsoft.com/office/drawing/2014/main" id="{D564C843-8267-7C67-D6D5-FAF034B79965}"/>
+              </a:ext>
+            </a:extLst>
+          </p:cNvPr>
+          <p:cNvSpPr>
+            <a:spLocks noGrp="1"/>
+          </p:cNvSpPr>
+          <p:nvPr>
+            <p:ph type="body" idx="1"/>
+          </p:nvPr>
+        </p:nvSpPr>
+        <p:spPr>
+          <a:xfrm>
+            <a:off x="411192" y="6135963"/>
+            <a:ext cx="11369615" cy="336752"/>
+          </a:xfrm>
+        </p:spPr>
+        <p:txBody>
+          <a:bodyPr>
+            <a:normAutofit fontScale="85000" lnSpcReduction="10000"/>
+          </a:bodyPr>
+          <a:lstStyle/>
+          <a:p>
+            <a:pPr marL="101598" indent="0">
+              <a:buNone/>
+            </a:pPr>
+            <a:r>
+              <a:rPr lang="fr-FR" sz="1800" b="1" i="1" dirty="0"/>
+              <a:t>Note</a:t>
+            </a:r>
+            <a:r>
+              <a:rPr lang="fr-FR" sz="1800" i="1" dirty="0"/>
+              <a:t>: Pour ajouter un logo, ce dernier doit être au format png, avoir une taille maximum de 200x200 et contenir le mot « logo » dans son nom.</a:t>
+            </a:r>
           </a:p>
         </p:txBody>
       </p:sp>
@@ -34944,6 +35475,32 @@
                 <a:latin typeface="Barlow" panose="00000500000000000000" pitchFamily="2" charset="0"/>
               </a:rPr>
               <a:t>Correction de bugs divers</a:t>
+            </a:r>
+          </a:p>
+          <a:p>
+            <a:pPr lvl="1">
+              <a:spcBef>
+                <a:spcPts val="0"/>
+              </a:spcBef>
+            </a:pPr>
+            <a:r>
+              <a:rPr lang="fr-FR" sz="1200" dirty="0">
+                <a:latin typeface="Barlow" panose="00000500000000000000" pitchFamily="2" charset="0"/>
+              </a:rPr>
+              <a:t>Ajout de la possibilité d’ajouter un logo personnalisé</a:t>
+            </a:r>
+          </a:p>
+          <a:p>
+            <a:pPr lvl="1">
+              <a:spcBef>
+                <a:spcPts val="0"/>
+              </a:spcBef>
+            </a:pPr>
+            <a:r>
+              <a:rPr lang="fr-FR" sz="1200" dirty="0">
+                <a:latin typeface="Barlow" panose="00000500000000000000" pitchFamily="2" charset="0"/>
+              </a:rPr>
+              <a:t>Gestion des URLs longues</a:t>
             </a:r>
           </a:p>
           <a:p>
@@ -45559,15 +46116,6 @@
 </file>
 
 <file path=customXml/item1.xml><?xml version="1.0" encoding="utf-8"?>
-<?mso-contentType ?>
-<FormTemplates xmlns="http://schemas.microsoft.com/sharepoint/v3/contenttype/forms">
-  <Display>DocumentLibraryForm</Display>
-  <Edit>DocumentLibraryForm</Edit>
-  <New>DocumentLibraryForm</New>
-</FormTemplates>
-</file>
-
-<file path=customXml/item2.xml><?xml version="1.0" encoding="utf-8"?>
 <p:properties xmlns:p="http://schemas.microsoft.com/office/2006/metadata/properties" xmlns:xsi="http://www.w3.org/2001/XMLSchema-instance" xmlns:pc="http://schemas.microsoft.com/office/infopath/2007/PartnerControls">
   <documentManagement>
     <TaxCatchAll xmlns="5d7a3535-6ccc-4381-989f-ae061031b78e" xsi:nil="true"/>
@@ -45578,7 +46126,7 @@
 </p:properties>
 </file>
 
-<file path=customXml/item3.xml><?xml version="1.0" encoding="utf-8"?>
+<file path=customXml/item2.xml><?xml version="1.0" encoding="utf-8"?>
 <ct:contentTypeSchema xmlns:ct="http://schemas.microsoft.com/office/2006/metadata/contentType" xmlns:ma="http://schemas.microsoft.com/office/2006/metadata/properties/metaAttributes" ct:_="" ma:_="" ma:contentTypeName="Document" ma:contentTypeID="0x01010094D69007D53E474D873D1C4BCA1E8F18" ma:contentTypeVersion="15" ma:contentTypeDescription="Crée un document." ma:contentTypeScope="" ma:versionID="b94b5753296409f7397b66632584fdb0">
   <xsd:schema xmlns:xsd="http://www.w3.org/2001/XMLSchema" xmlns:xs="http://www.w3.org/2001/XMLSchema" xmlns:p="http://schemas.microsoft.com/office/2006/metadata/properties" xmlns:ns2="f9bf1094-3609-4046-a6fd-76c9c0caa714" xmlns:ns3="5d7a3535-6ccc-4381-989f-ae061031b78e" targetNamespace="http://schemas.microsoft.com/office/2006/metadata/properties" ma:root="true" ma:fieldsID="fee6db9217be9a70816f6107f4b0cedb" ns2:_="" ns3:_="">
     <xsd:import namespace="f9bf1094-3609-4046-a6fd-76c9c0caa714"/>
@@ -45807,15 +46355,16 @@
 </ct:contentTypeSchema>
 </file>
 
-<file path=customXml/itemProps1.xml><?xml version="1.0" encoding="utf-8"?>
-<ds:datastoreItem xmlns:ds="http://schemas.openxmlformats.org/officeDocument/2006/customXml" ds:itemID="{37867E26-7D2E-4C08-8937-A5EDA2DC982A}">
-  <ds:schemaRefs>
-    <ds:schemaRef ds:uri="http://schemas.microsoft.com/sharepoint/v3/contenttype/forms"/>
-  </ds:schemaRefs>
-</ds:datastoreItem>
+<file path=customXml/item3.xml><?xml version="1.0" encoding="utf-8"?>
+<?mso-contentType ?>
+<FormTemplates xmlns="http://schemas.microsoft.com/sharepoint/v3/contenttype/forms">
+  <Display>DocumentLibraryForm</Display>
+  <Edit>DocumentLibraryForm</Edit>
+  <New>DocumentLibraryForm</New>
+</FormTemplates>
 </file>
 
-<file path=customXml/itemProps2.xml><?xml version="1.0" encoding="utf-8"?>
+<file path=customXml/itemProps1.xml><?xml version="1.0" encoding="utf-8"?>
 <ds:datastoreItem xmlns:ds="http://schemas.openxmlformats.org/officeDocument/2006/customXml" ds:itemID="{A397F285-9F9C-4CEA-8DC8-CF9392934C5A}">
   <ds:schemaRefs>
     <ds:schemaRef ds:uri="http://purl.org/dc/terms/"/>
@@ -45832,7 +46381,7 @@
 </ds:datastoreItem>
 </file>
 
-<file path=customXml/itemProps3.xml><?xml version="1.0" encoding="utf-8"?>
+<file path=customXml/itemProps2.xml><?xml version="1.0" encoding="utf-8"?>
 <ds:datastoreItem xmlns:ds="http://schemas.openxmlformats.org/officeDocument/2006/customXml" ds:itemID="{A23C0DE2-5723-4EBE-BB67-CD0D7BAFEF27}">
   <ds:schemaRefs>
     <ds:schemaRef ds:uri="http://schemas.microsoft.com/office/2006/metadata/contentType"/>
@@ -45849,4 +46398,12 @@
     <ds:schemaRef ds:uri="http://schemas.microsoft.com/internal/obd"/>
   </ds:schemaRefs>
 </ds:datastoreItem>
+</file>
+
+<file path=customXml/itemProps3.xml><?xml version="1.0" encoding="utf-8"?>
+<ds:datastoreItem xmlns:ds="http://schemas.openxmlformats.org/officeDocument/2006/customXml" ds:itemID="{37867E26-7D2E-4C08-8937-A5EDA2DC982A}">
+  <ds:schemaRefs>
+    <ds:schemaRef ds:uri="http://schemas.microsoft.com/sharepoint/v3/contenttype/forms"/>
+  </ds:schemaRefs>
+</ds:datastoreItem>
 </file>
</xml_diff>

<commit_message>
Mise a jour du manuel pour la version 1.3.0.1
</commit_message>
<xml_diff>
--- a/AppPublication/Documentation/PublicationSuiviCompetition - Manuel d'utilisation.pptx
+++ b/AppPublication/Documentation/PublicationSuiviCompetition - Manuel d'utilisation.pptx
@@ -269,7 +269,7 @@
           <a:p>
             <a:fld id="{2FC9C06B-3A03-409A-B425-472FC6ED632E}" type="datetimeFigureOut">
               <a:rPr lang="fr-FR" smtClean="0"/>
-              <a:t>17/12/2024</a:t>
+              <a:t>13/03/2025</a:t>
             </a:fld>
             <a:endParaRPr lang="fr-FR"/>
           </a:p>
@@ -347,7 +347,7 @@
           <a:p>
             <a:fld id="{4ADFDC2C-F50E-4BF3-9C13-9F892CB323EC}" type="slidenum">
               <a:rPr lang="fr-FR" smtClean="0"/>
-              <a:t>‹N°›</a:t>
+              <a:t>‹#›</a:t>
             </a:fld>
             <a:endParaRPr lang="fr-FR"/>
           </a:p>
@@ -446,7 +446,7 @@
           <a:p>
             <a:fld id="{1BF3F09E-A5E2-4FD2-AA48-324D4F0E8F41}" type="datetimeFigureOut">
               <a:rPr lang="fr"/>
-              <a:t>17/12/2024</a:t>
+              <a:t>13/03/2025</a:t>
             </a:fld>
             <a:endParaRPr lang="en-US"/>
           </a:p>
@@ -604,7 +604,7 @@
           <a:p>
             <a:fld id="{17CAC06C-F8C2-46C2-88FF-6CBC2099D08A}" type="slidenum">
               <a:rPr lang="fr"/>
-              <a:t>‹N°›</a:t>
+              <a:t>‹#›</a:t>
             </a:fld>
             <a:endParaRPr lang="en-US"/>
           </a:p>
@@ -895,7 +895,7 @@
             <a:fld id="{00000000-1234-1234-1234-123412341234}" type="slidenum">
               <a:rPr lang="fr-FR" smtClean="0"/>
               <a:pPr/>
-              <a:t>‹N°›</a:t>
+              <a:t>‹#›</a:t>
             </a:fld>
             <a:endParaRPr lang="fr-FR" dirty="0"/>
           </a:p>
@@ -3322,7 +3322,7 @@
             <a:fld id="{00000000-1234-1234-1234-123412341234}" type="slidenum">
               <a:rPr lang="fr-FR" smtClean="0"/>
               <a:pPr/>
-              <a:t>‹N°›</a:t>
+              <a:t>‹#›</a:t>
             </a:fld>
             <a:endParaRPr lang="fr-FR" dirty="0"/>
           </a:p>
@@ -3669,7 +3669,7 @@
             <a:fld id="{00000000-1234-1234-1234-123412341234}" type="slidenum">
               <a:rPr lang="fr-FR" smtClean="0"/>
               <a:pPr/>
-              <a:t>‹N°›</a:t>
+              <a:t>‹#›</a:t>
             </a:fld>
             <a:endParaRPr lang="fr-FR" dirty="0"/>
           </a:p>
@@ -3888,7 +3888,7 @@
             <a:fld id="{00000000-1234-1234-1234-123412341234}" type="slidenum">
               <a:rPr lang="fr-FR" smtClean="0"/>
               <a:pPr/>
-              <a:t>‹N°›</a:t>
+              <a:t>‹#›</a:t>
             </a:fld>
             <a:endParaRPr lang="fr-FR" dirty="0"/>
           </a:p>
@@ -4004,7 +4004,7 @@
             <a:fld id="{00000000-1234-1234-1234-123412341234}" type="slidenum">
               <a:rPr lang="fr-FR" smtClean="0"/>
               <a:pPr/>
-              <a:t>‹N°›</a:t>
+              <a:t>‹#›</a:t>
             </a:fld>
             <a:endParaRPr lang="fr-FR" dirty="0"/>
           </a:p>
@@ -7227,7 +7227,7 @@
             <a:fld id="{00000000-1234-1234-1234-123412341234}" type="slidenum">
               <a:rPr lang="fr-FR" smtClean="0"/>
               <a:pPr/>
-              <a:t>‹N°›</a:t>
+              <a:t>‹#›</a:t>
             </a:fld>
             <a:endParaRPr lang="fr-FR" dirty="0"/>
           </a:p>
@@ -7678,7 +7678,7 @@
             <a:fld id="{00000000-1234-1234-1234-123412341234}" type="slidenum">
               <a:rPr lang="fr-FR" smtClean="0"/>
               <a:pPr/>
-              <a:t>‹N°›</a:t>
+              <a:t>‹#›</a:t>
             </a:fld>
             <a:endParaRPr lang="fr-FR" dirty="0"/>
           </a:p>
@@ -8589,7 +8589,7 @@
             <a:fld id="{00000000-1234-1234-1234-123412341234}" type="slidenum">
               <a:rPr lang="fr-FR" smtClean="0"/>
               <a:pPr/>
-              <a:t>‹N°›</a:t>
+              <a:t>‹#›</a:t>
             </a:fld>
             <a:endParaRPr lang="fr-FR" dirty="0"/>
           </a:p>
@@ -9538,7 +9538,7 @@
             <a:fld id="{00000000-1234-1234-1234-123412341234}" type="slidenum">
               <a:rPr lang="fr-FR" smtClean="0"/>
               <a:pPr/>
-              <a:t>‹N°›</a:t>
+              <a:t>‹#›</a:t>
             </a:fld>
             <a:endParaRPr lang="fr-FR" dirty="0"/>
           </a:p>
@@ -9939,7 +9939,7 @@
             <a:fld id="{00000000-1234-1234-1234-123412341234}" type="slidenum">
               <a:rPr lang="fr-FR" smtClean="0"/>
               <a:pPr/>
-              <a:t>‹N°›</a:t>
+              <a:t>‹#›</a:t>
             </a:fld>
             <a:endParaRPr lang="fr-FR" dirty="0"/>
           </a:p>
@@ -11247,7 +11247,7 @@
             <a:fld id="{00000000-1234-1234-1234-123412341234}" type="slidenum">
               <a:rPr lang="fr-FR" smtClean="0"/>
               <a:pPr/>
-              <a:t>‹N°›</a:t>
+              <a:t>‹#›</a:t>
             </a:fld>
             <a:endParaRPr lang="fr-FR" dirty="0"/>
           </a:p>
@@ -12096,7 +12096,7 @@
             <a:fld id="{00000000-1234-1234-1234-123412341234}" type="slidenum">
               <a:rPr lang="fr-FR" smtClean="0"/>
               <a:pPr/>
-              <a:t>‹N°›</a:t>
+              <a:t>‹#›</a:t>
             </a:fld>
             <a:endParaRPr lang="fr-FR" dirty="0"/>
           </a:p>
@@ -13027,7 +13027,7 @@
             <a:fld id="{00000000-1234-1234-1234-123412341234}" type="slidenum">
               <a:rPr lang="fr-FR" smtClean="0"/>
               <a:pPr/>
-              <a:t>‹N°›</a:t>
+              <a:t>‹#›</a:t>
             </a:fld>
             <a:endParaRPr lang="fr-FR" dirty="0"/>
           </a:p>
@@ -14163,7 +14163,7 @@
             <a:fld id="{00000000-1234-1234-1234-123412341234}" type="slidenum">
               <a:rPr lang="fr-FR" smtClean="0"/>
               <a:pPr/>
-              <a:t>‹N°›</a:t>
+              <a:t>‹#›</a:t>
             </a:fld>
             <a:endParaRPr lang="fr-FR" dirty="0"/>
           </a:p>
@@ -15607,7 +15607,7 @@
             <a:fld id="{00000000-1234-1234-1234-123412341234}" type="slidenum">
               <a:rPr lang="fr-FR" smtClean="0"/>
               <a:pPr/>
-              <a:t>‹N°›</a:t>
+              <a:t>‹#›</a:t>
             </a:fld>
             <a:endParaRPr lang="fr-FR" dirty="0"/>
           </a:p>
@@ -15824,7 +15824,7 @@
             <a:fld id="{00000000-1234-1234-1234-123412341234}" type="slidenum">
               <a:rPr lang="fr-FR" smtClean="0"/>
               <a:pPr/>
-              <a:t>‹N°›</a:t>
+              <a:t>‹#›</a:t>
             </a:fld>
             <a:endParaRPr lang="fr-FR" dirty="0"/>
           </a:p>
@@ -17570,7 +17570,7 @@
                 </a:solidFill>
                 <a:latin typeface="Montserrat" panose="00000800000000000000" pitchFamily="2" charset="0"/>
               </a:rPr>
-              <a:t>V1.3.0.0 – 01/12/2024 </a:t>
+              <a:t>V1.3.0.1 – 03/2025 </a:t>
             </a:r>
           </a:p>
         </p:txBody>
@@ -25862,8 +25862,8 @@
         </p:nvSpPr>
         <p:spPr>
           <a:xfrm>
-            <a:off x="411192" y="6135963"/>
-            <a:ext cx="11369615" cy="336752"/>
+            <a:off x="411192" y="5689825"/>
+            <a:ext cx="11369615" cy="782889"/>
           </a:xfrm>
         </p:spPr>
         <p:txBody>
@@ -25877,11 +25877,39 @@
             </a:pPr>
             <a:r>
               <a:rPr lang="fr-FR" sz="1800" b="1" i="1" dirty="0"/>
-              <a:t>Note</a:t>
+              <a:t>Notes</a:t>
             </a:r>
             <a:r>
               <a:rPr lang="fr-FR" sz="1800" i="1" dirty="0"/>
-              <a:t>: Pour ajouter un logo, ce dernier doit être au format png, avoir une taille maximum de 200x200 et contenir le mot « logo » dans son nom.</a:t>
+              <a:t>:</a:t>
+            </a:r>
+          </a:p>
+          <a:p>
+            <a:r>
+              <a:rPr lang="fr-FR" sz="1800" i="1" dirty="0"/>
+              <a:t>Pour ajouter un logo, ce dernier doit être au format png, avoir une taille maximum de 200x200 et contenir le mot « logo » dans son nom.</a:t>
+            </a:r>
+          </a:p>
+          <a:p>
+            <a:r>
+              <a:rPr lang="fr-FR" sz="1800" i="1" dirty="0"/>
+              <a:t>Le répertoire de travail ne doit pas être un répertoire synchronisé type OneDrive, </a:t>
+            </a:r>
+            <a:r>
+              <a:rPr lang="fr-FR" sz="1800" i="1" dirty="0" err="1"/>
+              <a:t>pCloud</a:t>
+            </a:r>
+            <a:r>
+              <a:rPr lang="fr-FR" sz="1800" i="1" dirty="0"/>
+              <a:t>, </a:t>
+            </a:r>
+            <a:r>
+              <a:rPr lang="fr-FR" sz="1800" i="1" dirty="0" err="1"/>
+              <a:t>DropBox</a:t>
+            </a:r>
+            <a:r>
+              <a:rPr lang="fr-FR" sz="1800" i="1" dirty="0"/>
+              <a:t>, etc.</a:t>
             </a:r>
           </a:p>
         </p:txBody>
@@ -33824,14 +33852,14 @@
           <p:nvPr>
             <p:extLst>
               <p:ext uri="{D42A27DB-BD31-4B8C-83A1-F6EECF244321}">
-                <p14:modId xmlns:p14="http://schemas.microsoft.com/office/powerpoint/2010/main" val="1698129580"/>
+                <p14:modId xmlns:p14="http://schemas.microsoft.com/office/powerpoint/2010/main" val="886254712"/>
               </p:ext>
             </p:extLst>
           </p:nvPr>
         </p:nvGraphicFramePr>
         <p:xfrm>
-          <a:off x="1282097" y="1914605"/>
-          <a:ext cx="9140816" cy="3309637"/>
+          <a:off x="762665" y="1861946"/>
+          <a:ext cx="9603970" cy="3731047"/>
         </p:xfrm>
         <a:graphic>
           <a:graphicData uri="http://schemas.openxmlformats.org/drawingml/2006/table">
@@ -33840,80 +33868,87 @@
                 <a:tableStyleId>{7DF18680-E054-41AD-8BC1-D1AEF772440D}</a:tableStyleId>
               </a:tblPr>
               <a:tblGrid>
-                <a:gridCol w="515345">
+                <a:gridCol w="491612">
                   <a:extLst>
                     <a:ext uri="{9D8B030D-6E8A-4147-A177-3AD203B41FA5}">
                       <a16:colId xmlns:a16="http://schemas.microsoft.com/office/drawing/2014/main" val="3736857135"/>
                     </a:ext>
                   </a:extLst>
                 </a:gridCol>
-                <a:gridCol w="849471">
+                <a:gridCol w="870268">
                   <a:extLst>
                     <a:ext uri="{9D8B030D-6E8A-4147-A177-3AD203B41FA5}">
                       <a16:colId xmlns:a16="http://schemas.microsoft.com/office/drawing/2014/main" val="3696878891"/>
                     </a:ext>
                   </a:extLst>
                 </a:gridCol>
-                <a:gridCol w="864000">
+                <a:gridCol w="824209">
                   <a:extLst>
                     <a:ext uri="{9D8B030D-6E8A-4147-A177-3AD203B41FA5}">
                       <a16:colId xmlns:a16="http://schemas.microsoft.com/office/drawing/2014/main" val="2257898591"/>
                     </a:ext>
                   </a:extLst>
                 </a:gridCol>
-                <a:gridCol w="864000">
+                <a:gridCol w="824209">
                   <a:extLst>
                     <a:ext uri="{9D8B030D-6E8A-4147-A177-3AD203B41FA5}">
                       <a16:colId xmlns:a16="http://schemas.microsoft.com/office/drawing/2014/main" val="2384296798"/>
                     </a:ext>
                   </a:extLst>
                 </a:gridCol>
-                <a:gridCol w="864000">
+                <a:gridCol w="824209">
                   <a:extLst>
                     <a:ext uri="{9D8B030D-6E8A-4147-A177-3AD203B41FA5}">
                       <a16:colId xmlns:a16="http://schemas.microsoft.com/office/drawing/2014/main" val="618733032"/>
                     </a:ext>
                   </a:extLst>
                 </a:gridCol>
-                <a:gridCol w="864000">
+                <a:gridCol w="824209">
                   <a:extLst>
                     <a:ext uri="{9D8B030D-6E8A-4147-A177-3AD203B41FA5}">
                       <a16:colId xmlns:a16="http://schemas.microsoft.com/office/drawing/2014/main" val="3964921429"/>
                     </a:ext>
                   </a:extLst>
                 </a:gridCol>
-                <a:gridCol w="864000">
+                <a:gridCol w="824209">
                   <a:extLst>
                     <a:ext uri="{9D8B030D-6E8A-4147-A177-3AD203B41FA5}">
                       <a16:colId xmlns:a16="http://schemas.microsoft.com/office/drawing/2014/main" val="2528599786"/>
                     </a:ext>
                   </a:extLst>
                 </a:gridCol>
-                <a:gridCol w="864000">
+                <a:gridCol w="824209">
                   <a:extLst>
                     <a:ext uri="{9D8B030D-6E8A-4147-A177-3AD203B41FA5}">
                       <a16:colId xmlns:a16="http://schemas.microsoft.com/office/drawing/2014/main" val="2631112101"/>
                     </a:ext>
                   </a:extLst>
                 </a:gridCol>
-                <a:gridCol w="864000">
+                <a:gridCol w="824209">
                   <a:extLst>
                     <a:ext uri="{9D8B030D-6E8A-4147-A177-3AD203B41FA5}">
                       <a16:colId xmlns:a16="http://schemas.microsoft.com/office/drawing/2014/main" val="1640724778"/>
                     </a:ext>
                   </a:extLst>
                 </a:gridCol>
-                <a:gridCol w="864000">
+                <a:gridCol w="824209">
                   <a:extLst>
                     <a:ext uri="{9D8B030D-6E8A-4147-A177-3AD203B41FA5}">
                       <a16:colId xmlns:a16="http://schemas.microsoft.com/office/drawing/2014/main" val="2824390373"/>
                     </a:ext>
                   </a:extLst>
                 </a:gridCol>
-                <a:gridCol w="864000">
+                <a:gridCol w="824209">
                   <a:extLst>
                     <a:ext uri="{9D8B030D-6E8A-4147-A177-3AD203B41FA5}">
                       <a16:colId xmlns:a16="http://schemas.microsoft.com/office/drawing/2014/main" val="3229000006"/>
+                    </a:ext>
+                  </a:extLst>
+                </a:gridCol>
+                <a:gridCol w="824209">
+                  <a:extLst>
+                    <a:ext uri="{9D8B030D-6E8A-4147-A177-3AD203B41FA5}">
+                      <a16:colId xmlns:a16="http://schemas.microsoft.com/office/drawing/2014/main" val="788621322"/>
                     </a:ext>
                   </a:extLst>
                 </a:gridCol>
@@ -33939,7 +33974,7 @@
                   </a:txBody>
                   <a:tcPr anchor="ctr"/>
                 </a:tc>
-                <a:tc gridSpan="9">
+                <a:tc gridSpan="10">
                   <a:txBody>
                     <a:bodyPr/>
                     <a:lstStyle/>
@@ -34025,6 +34060,25 @@
                     </a:p>
                   </a:txBody>
                   <a:tcPr/>
+                </a:tc>
+                <a:tc hMerge="1">
+                  <a:txBody>
+                    <a:bodyPr/>
+                    <a:lstStyle/>
+                    <a:p>
+                      <a:pPr algn="ctr"/>
+                      <a:endParaRPr lang="fr-FR" dirty="0">
+                        <a:solidFill>
+                          <a:schemeClr val="bg1"/>
+                        </a:solidFill>
+                      </a:endParaRPr>
+                    </a:p>
+                  </a:txBody>
+                  <a:tcPr anchor="ctr">
+                    <a:solidFill>
+                      <a:schemeClr val="accent1"/>
+                    </a:solidFill>
+                  </a:tcPr>
                 </a:tc>
                 <a:tc hMerge="1">
                   <a:txBody>
@@ -34280,6 +34334,27 @@
                     </a:solidFill>
                   </a:tcPr>
                 </a:tc>
+                <a:tc>
+                  <a:txBody>
+                    <a:bodyPr/>
+                    <a:lstStyle/>
+                    <a:p>
+                      <a:r>
+                        <a:rPr lang="fr-FR" dirty="0">
+                          <a:solidFill>
+                            <a:schemeClr val="bg1"/>
+                          </a:solidFill>
+                        </a:rPr>
+                        <a:t>1.3.0.1</a:t>
+                      </a:r>
+                    </a:p>
+                  </a:txBody>
+                  <a:tcPr anchor="ctr">
+                    <a:solidFill>
+                      <a:schemeClr val="accent1"/>
+                    </a:solidFill>
+                  </a:tcPr>
+                </a:tc>
                 <a:extLst>
                   <a:ext uri="{0D108BD9-81ED-4DB2-BD59-A6C34878D82A}">
                     <a16:rowId xmlns:a16="http://schemas.microsoft.com/office/drawing/2014/main" val="407517425"/>
@@ -34287,7 +34362,7 @@
                 </a:extLst>
               </a:tr>
               <a:tr h="421410">
-                <a:tc rowSpan="5">
+                <a:tc rowSpan="6">
                   <a:txBody>
                     <a:bodyPr/>
                     <a:lstStyle/>
@@ -34472,6 +34547,20 @@
                     </a:solidFill>
                   </a:tcPr>
                 </a:tc>
+                <a:tc>
+                  <a:txBody>
+                    <a:bodyPr/>
+                    <a:lstStyle/>
+                    <a:p>
+                      <a:endParaRPr lang="fr-FR" dirty="0"/>
+                    </a:p>
+                  </a:txBody>
+                  <a:tcPr anchor="ctr">
+                    <a:solidFill>
+                      <a:srgbClr val="FFC000"/>
+                    </a:solidFill>
+                  </a:tcPr>
+                </a:tc>
                 <a:extLst>
                   <a:ext uri="{0D108BD9-81ED-4DB2-BD59-A6C34878D82A}">
                     <a16:rowId xmlns:a16="http://schemas.microsoft.com/office/drawing/2014/main" val="1939122409"/>
@@ -34591,6 +34680,20 @@
                   <a:tcPr anchor="ctr">
                     <a:solidFill>
                       <a:srgbClr val="FFC000"/>
+                    </a:solidFill>
+                  </a:tcPr>
+                </a:tc>
+                <a:tc>
+                  <a:txBody>
+                    <a:bodyPr/>
+                    <a:lstStyle/>
+                    <a:p>
+                      <a:endParaRPr lang="fr-FR" dirty="0"/>
+                    </a:p>
+                  </a:txBody>
+                  <a:tcPr anchor="ctr">
+                    <a:solidFill>
+                      <a:schemeClr val="accent6"/>
                     </a:solidFill>
                   </a:tcPr>
                 </a:tc>
@@ -34817,6 +34920,20 @@
                     </a:solidFill>
                   </a:tcPr>
                 </a:tc>
+                <a:tc>
+                  <a:txBody>
+                    <a:bodyPr/>
+                    <a:lstStyle/>
+                    <a:p>
+                      <a:endParaRPr lang="fr-FR" dirty="0"/>
+                    </a:p>
+                  </a:txBody>
+                  <a:tcPr anchor="ctr">
+                    <a:solidFill>
+                      <a:schemeClr val="accent6"/>
+                    </a:solidFill>
+                  </a:tcPr>
+                </a:tc>
                 <a:extLst>
                   <a:ext uri="{0D108BD9-81ED-4DB2-BD59-A6C34878D82A}">
                     <a16:rowId xmlns:a16="http://schemas.microsoft.com/office/drawing/2014/main" val="2246006590"/>
@@ -34953,6 +35070,20 @@
                   <a:tcPr anchor="ctr">
                     <a:solidFill>
                       <a:srgbClr val="FFC000"/>
+                    </a:solidFill>
+                  </a:tcPr>
+                </a:tc>
+                <a:tc>
+                  <a:txBody>
+                    <a:bodyPr/>
+                    <a:lstStyle/>
+                    <a:p>
+                      <a:endParaRPr lang="fr-FR" dirty="0"/>
+                    </a:p>
+                  </a:txBody>
+                  <a:tcPr anchor="ctr">
+                    <a:solidFill>
+                      <a:schemeClr val="accent6"/>
                     </a:solidFill>
                   </a:tcPr>
                 </a:tc>
@@ -35179,9 +35310,243 @@
                     </a:solidFill>
                   </a:tcPr>
                 </a:tc>
+                <a:tc>
+                  <a:txBody>
+                    <a:bodyPr/>
+                    <a:lstStyle/>
+                    <a:p>
+                      <a:endParaRPr lang="fr-FR" dirty="0"/>
+                    </a:p>
+                  </a:txBody>
+                  <a:tcPr anchor="ctr">
+                    <a:solidFill>
+                      <a:schemeClr val="accent6"/>
+                    </a:solidFill>
+                  </a:tcPr>
+                </a:tc>
                 <a:extLst>
                   <a:ext uri="{0D108BD9-81ED-4DB2-BD59-A6C34878D82A}">
                     <a16:rowId xmlns:a16="http://schemas.microsoft.com/office/drawing/2014/main" val="1191909874"/>
+                  </a:ext>
+                </a:extLst>
+              </a:tr>
+              <a:tr h="421410">
+                <a:tc vMerge="1">
+                  <a:txBody>
+                    <a:bodyPr/>
+                    <a:lstStyle/>
+                    <a:p>
+                      <a:pPr marL="0" marR="0" lvl="0" indent="0" algn="ctr" defTabSz="914400" rtl="0" eaLnBrk="1" fontAlgn="auto" latinLnBrk="0" hangingPunct="1">
+                        <a:lnSpc>
+                          <a:spcPct val="100000"/>
+                        </a:lnSpc>
+                        <a:spcBef>
+                          <a:spcPts val="0"/>
+                        </a:spcBef>
+                        <a:spcAft>
+                          <a:spcPts val="0"/>
+                        </a:spcAft>
+                        <a:buClrTx/>
+                        <a:buSzTx/>
+                        <a:buFontTx/>
+                        <a:buNone/>
+                        <a:tabLst/>
+                        <a:defRPr/>
+                      </a:pPr>
+                      <a:endParaRPr lang="fr-FR" dirty="0">
+                        <a:solidFill>
+                          <a:schemeClr val="bg1"/>
+                        </a:solidFill>
+                      </a:endParaRPr>
+                    </a:p>
+                  </a:txBody>
+                  <a:tcPr vert="vert270" anchor="ctr">
+                    <a:solidFill>
+                      <a:schemeClr val="accent1"/>
+                    </a:solidFill>
+                  </a:tcPr>
+                </a:tc>
+                <a:tc>
+                  <a:txBody>
+                    <a:bodyPr/>
+                    <a:lstStyle/>
+                    <a:p>
+                      <a:pPr marL="0" marR="0" lvl="0" indent="0" algn="l" defTabSz="914400" rtl="0" eaLnBrk="1" fontAlgn="auto" latinLnBrk="0" hangingPunct="1">
+                        <a:lnSpc>
+                          <a:spcPct val="100000"/>
+                        </a:lnSpc>
+                        <a:spcBef>
+                          <a:spcPts val="0"/>
+                        </a:spcBef>
+                        <a:spcAft>
+                          <a:spcPts val="0"/>
+                        </a:spcAft>
+                        <a:buClrTx/>
+                        <a:buSzTx/>
+                        <a:buFontTx/>
+                        <a:buNone/>
+                        <a:tabLst/>
+                        <a:defRPr/>
+                      </a:pPr>
+                      <a:r>
+                        <a:rPr lang="fr-FR" dirty="0">
+                          <a:solidFill>
+                            <a:schemeClr val="bg1"/>
+                          </a:solidFill>
+                        </a:rPr>
+                        <a:t>1.2.6.6</a:t>
+                      </a:r>
+                    </a:p>
+                  </a:txBody>
+                  <a:tcPr anchor="ctr">
+                    <a:solidFill>
+                      <a:schemeClr val="accent1"/>
+                    </a:solidFill>
+                  </a:tcPr>
+                </a:tc>
+                <a:tc>
+                  <a:txBody>
+                    <a:bodyPr/>
+                    <a:lstStyle/>
+                    <a:p>
+                      <a:endParaRPr lang="fr-FR" dirty="0"/>
+                    </a:p>
+                  </a:txBody>
+                  <a:tcPr anchor="ctr">
+                    <a:solidFill>
+                      <a:srgbClr val="FFC000"/>
+                    </a:solidFill>
+                  </a:tcPr>
+                </a:tc>
+                <a:tc>
+                  <a:txBody>
+                    <a:bodyPr/>
+                    <a:lstStyle/>
+                    <a:p>
+                      <a:endParaRPr lang="fr-FR" dirty="0"/>
+                    </a:p>
+                  </a:txBody>
+                  <a:tcPr anchor="ctr">
+                    <a:solidFill>
+                      <a:srgbClr val="FFC000"/>
+                    </a:solidFill>
+                  </a:tcPr>
+                </a:tc>
+                <a:tc>
+                  <a:txBody>
+                    <a:bodyPr/>
+                    <a:lstStyle/>
+                    <a:p>
+                      <a:endParaRPr lang="fr-FR" dirty="0"/>
+                    </a:p>
+                  </a:txBody>
+                  <a:tcPr anchor="ctr">
+                    <a:solidFill>
+                      <a:srgbClr val="FFC000"/>
+                    </a:solidFill>
+                  </a:tcPr>
+                </a:tc>
+                <a:tc>
+                  <a:txBody>
+                    <a:bodyPr/>
+                    <a:lstStyle/>
+                    <a:p>
+                      <a:endParaRPr lang="fr-FR" dirty="0"/>
+                    </a:p>
+                  </a:txBody>
+                  <a:tcPr anchor="ctr">
+                    <a:solidFill>
+                      <a:srgbClr val="FFC000"/>
+                    </a:solidFill>
+                  </a:tcPr>
+                </a:tc>
+                <a:tc>
+                  <a:txBody>
+                    <a:bodyPr/>
+                    <a:lstStyle/>
+                    <a:p>
+                      <a:endParaRPr lang="fr-FR" dirty="0"/>
+                    </a:p>
+                  </a:txBody>
+                  <a:tcPr anchor="ctr">
+                    <a:solidFill>
+                      <a:srgbClr val="FFC000"/>
+                    </a:solidFill>
+                  </a:tcPr>
+                </a:tc>
+                <a:tc>
+                  <a:txBody>
+                    <a:bodyPr/>
+                    <a:lstStyle/>
+                    <a:p>
+                      <a:endParaRPr lang="fr-FR" dirty="0"/>
+                    </a:p>
+                  </a:txBody>
+                  <a:tcPr anchor="ctr">
+                    <a:solidFill>
+                      <a:srgbClr val="FFC000"/>
+                    </a:solidFill>
+                  </a:tcPr>
+                </a:tc>
+                <a:tc>
+                  <a:txBody>
+                    <a:bodyPr/>
+                    <a:lstStyle/>
+                    <a:p>
+                      <a:endParaRPr lang="fr-FR" dirty="0"/>
+                    </a:p>
+                  </a:txBody>
+                  <a:tcPr anchor="ctr">
+                    <a:solidFill>
+                      <a:srgbClr val="FFC000"/>
+                    </a:solidFill>
+                  </a:tcPr>
+                </a:tc>
+                <a:tc>
+                  <a:txBody>
+                    <a:bodyPr/>
+                    <a:lstStyle/>
+                    <a:p>
+                      <a:endParaRPr lang="fr-FR" dirty="0"/>
+                    </a:p>
+                  </a:txBody>
+                  <a:tcPr anchor="ctr">
+                    <a:solidFill>
+                      <a:srgbClr val="FFC000"/>
+                    </a:solidFill>
+                  </a:tcPr>
+                </a:tc>
+                <a:tc>
+                  <a:txBody>
+                    <a:bodyPr/>
+                    <a:lstStyle/>
+                    <a:p>
+                      <a:endParaRPr lang="fr-FR" dirty="0"/>
+                    </a:p>
+                  </a:txBody>
+                  <a:tcPr anchor="ctr">
+                    <a:solidFill>
+                      <a:schemeClr val="accent6"/>
+                    </a:solidFill>
+                  </a:tcPr>
+                </a:tc>
+                <a:tc>
+                  <a:txBody>
+                    <a:bodyPr/>
+                    <a:lstStyle/>
+                    <a:p>
+                      <a:endParaRPr lang="fr-FR" dirty="0"/>
+                    </a:p>
+                  </a:txBody>
+                  <a:tcPr anchor="ctr">
+                    <a:solidFill>
+                      <a:schemeClr val="accent6"/>
+                    </a:solidFill>
+                  </a:tcPr>
+                </a:tc>
+                <a:extLst>
+                  <a:ext uri="{0D108BD9-81ED-4DB2-BD59-A6C34878D82A}">
+                    <a16:rowId xmlns:a16="http://schemas.microsoft.com/office/drawing/2014/main" val="3979160886"/>
                   </a:ext>
                 </a:extLst>
               </a:tr>
@@ -35413,7 +35778,63 @@
               <a:rPr lang="fr-FR" sz="1200" b="1" dirty="0">
                 <a:latin typeface="Barlow" panose="00000500000000000000" pitchFamily="2" charset="0"/>
               </a:rPr>
-              <a:t>V1.3.0.0 – 01/12/2024</a:t>
+              <a:t>v1.3.0.3 – 03</a:t>
+            </a:r>
+          </a:p>
+          <a:p>
+            <a:pPr lvl="1">
+              <a:spcBef>
+                <a:spcPts val="0"/>
+              </a:spcBef>
+            </a:pPr>
+            <a:r>
+              <a:rPr lang="fr-FR" sz="1200" dirty="0">
+                <a:latin typeface="Barlow" panose="00000500000000000000" pitchFamily="2" charset="0"/>
+              </a:rPr>
+              <a:t>Correction des problèmes de synchronisations sur </a:t>
+            </a:r>
+            <a:r>
+              <a:rPr lang="fr-FR" sz="1200" dirty="0" err="1">
+                <a:latin typeface="Barlow" panose="00000500000000000000" pitchFamily="2" charset="0"/>
+              </a:rPr>
+              <a:t>FFJudo</a:t>
+            </a:r>
+            <a:endParaRPr lang="fr-FR" sz="1200" dirty="0">
+              <a:latin typeface="Barlow" panose="00000500000000000000" pitchFamily="2" charset="0"/>
+            </a:endParaRPr>
+          </a:p>
+          <a:p>
+            <a:pPr lvl="1">
+              <a:spcBef>
+                <a:spcPts val="0"/>
+              </a:spcBef>
+            </a:pPr>
+            <a:r>
+              <a:rPr lang="fr-FR" sz="1200" dirty="0">
+                <a:latin typeface="Barlow" panose="00000500000000000000" pitchFamily="2" charset="0"/>
+              </a:rPr>
+              <a:t>Correction de problèmes mineurs d’affichage</a:t>
+            </a:r>
+          </a:p>
+          <a:p>
+            <a:pPr lvl="1">
+              <a:spcBef>
+                <a:spcPts val="0"/>
+              </a:spcBef>
+            </a:pPr>
+            <a:r>
+              <a:rPr lang="fr-FR" sz="1200" dirty="0">
+                <a:latin typeface="Barlow" panose="00000500000000000000" pitchFamily="2" charset="0"/>
+              </a:rPr>
+              <a:t>Modification de répertoire de travail par défaut</a:t>
+            </a:r>
+          </a:p>
+          <a:p>
+            <a:r>
+              <a:rPr lang="fr-FR" sz="1200" b="1" dirty="0">
+                <a:latin typeface="Barlow" panose="00000500000000000000" pitchFamily="2" charset="0"/>
+              </a:rPr>
+              <a:t>v1.3.0.0 – 01/12/2024</a:t>
             </a:r>
           </a:p>
           <a:p>
@@ -35501,6 +35922,19 @@
                 <a:latin typeface="Barlow" panose="00000500000000000000" pitchFamily="2" charset="0"/>
               </a:rPr>
               <a:t>Gestion des URLs longues</a:t>
+            </a:r>
+          </a:p>
+          <a:p>
+            <a:pPr lvl="1">
+              <a:spcBef>
+                <a:spcPts val="0"/>
+              </a:spcBef>
+            </a:pPr>
+            <a:r>
+              <a:rPr lang="fr-FR" sz="1200" dirty="0">
+                <a:latin typeface="Barlow" panose="00000500000000000000" pitchFamily="2" charset="0"/>
+              </a:rPr>
+              <a:t>Prise en compte des Yukos</a:t>
             </a:r>
           </a:p>
           <a:p>
@@ -46116,17 +46550,6 @@
 </file>
 
 <file path=customXml/item1.xml><?xml version="1.0" encoding="utf-8"?>
-<p:properties xmlns:p="http://schemas.microsoft.com/office/2006/metadata/properties" xmlns:xsi="http://www.w3.org/2001/XMLSchema-instance" xmlns:pc="http://schemas.microsoft.com/office/infopath/2007/PartnerControls">
-  <documentManagement>
-    <TaxCatchAll xmlns="5d7a3535-6ccc-4381-989f-ae061031b78e" xsi:nil="true"/>
-    <lcf76f155ced4ddcb4097134ff3c332f xmlns="f9bf1094-3609-4046-a6fd-76c9c0caa714">
-      <Terms xmlns="http://schemas.microsoft.com/office/infopath/2007/PartnerControls"/>
-    </lcf76f155ced4ddcb4097134ff3c332f>
-  </documentManagement>
-</p:properties>
-</file>
-
-<file path=customXml/item2.xml><?xml version="1.0" encoding="utf-8"?>
 <ct:contentTypeSchema xmlns:ct="http://schemas.microsoft.com/office/2006/metadata/contentType" xmlns:ma="http://schemas.microsoft.com/office/2006/metadata/properties/metaAttributes" ct:_="" ma:_="" ma:contentTypeName="Document" ma:contentTypeID="0x01010094D69007D53E474D873D1C4BCA1E8F18" ma:contentTypeVersion="15" ma:contentTypeDescription="Crée un document." ma:contentTypeScope="" ma:versionID="b94b5753296409f7397b66632584fdb0">
   <xsd:schema xmlns:xsd="http://www.w3.org/2001/XMLSchema" xmlns:xs="http://www.w3.org/2001/XMLSchema" xmlns:p="http://schemas.microsoft.com/office/2006/metadata/properties" xmlns:ns2="f9bf1094-3609-4046-a6fd-76c9c0caa714" xmlns:ns3="5d7a3535-6ccc-4381-989f-ae061031b78e" targetNamespace="http://schemas.microsoft.com/office/2006/metadata/properties" ma:root="true" ma:fieldsID="fee6db9217be9a70816f6107f4b0cedb" ns2:_="" ns3:_="">
     <xsd:import namespace="f9bf1094-3609-4046-a6fd-76c9c0caa714"/>
@@ -46355,7 +46778,7 @@
 </ct:contentTypeSchema>
 </file>
 
-<file path=customXml/item3.xml><?xml version="1.0" encoding="utf-8"?>
+<file path=customXml/item2.xml><?xml version="1.0" encoding="utf-8"?>
 <?mso-contentType ?>
 <FormTemplates xmlns="http://schemas.microsoft.com/sharepoint/v3/contenttype/forms">
   <Display>DocumentLibraryForm</Display>
@@ -46364,24 +46787,18 @@
 </FormTemplates>
 </file>
 
-<file path=customXml/itemProps1.xml><?xml version="1.0" encoding="utf-8"?>
-<ds:datastoreItem xmlns:ds="http://schemas.openxmlformats.org/officeDocument/2006/customXml" ds:itemID="{A397F285-9F9C-4CEA-8DC8-CF9392934C5A}">
-  <ds:schemaRefs>
-    <ds:schemaRef ds:uri="http://purl.org/dc/terms/"/>
-    <ds:schemaRef ds:uri="http://purl.org/dc/dcmitype/"/>
-    <ds:schemaRef ds:uri="http://www.w3.org/XML/1998/namespace"/>
-    <ds:schemaRef ds:uri="http://schemas.microsoft.com/office/2006/documentManagement/types"/>
-    <ds:schemaRef ds:uri="http://schemas.openxmlformats.org/package/2006/metadata/core-properties"/>
-    <ds:schemaRef ds:uri="http://schemas.microsoft.com/office/infopath/2007/PartnerControls"/>
-    <ds:schemaRef ds:uri="f9bf1094-3609-4046-a6fd-76c9c0caa714"/>
-    <ds:schemaRef ds:uri="http://schemas.microsoft.com/office/2006/metadata/properties"/>
-    <ds:schemaRef ds:uri="5d7a3535-6ccc-4381-989f-ae061031b78e"/>
-    <ds:schemaRef ds:uri="http://purl.org/dc/elements/1.1/"/>
-  </ds:schemaRefs>
-</ds:datastoreItem>
+<file path=customXml/item3.xml><?xml version="1.0" encoding="utf-8"?>
+<p:properties xmlns:p="http://schemas.microsoft.com/office/2006/metadata/properties" xmlns:xsi="http://www.w3.org/2001/XMLSchema-instance" xmlns:pc="http://schemas.microsoft.com/office/infopath/2007/PartnerControls">
+  <documentManagement>
+    <TaxCatchAll xmlns="5d7a3535-6ccc-4381-989f-ae061031b78e" xsi:nil="true"/>
+    <lcf76f155ced4ddcb4097134ff3c332f xmlns="f9bf1094-3609-4046-a6fd-76c9c0caa714">
+      <Terms xmlns="http://schemas.microsoft.com/office/infopath/2007/PartnerControls"/>
+    </lcf76f155ced4ddcb4097134ff3c332f>
+  </documentManagement>
+</p:properties>
 </file>
 
-<file path=customXml/itemProps2.xml><?xml version="1.0" encoding="utf-8"?>
+<file path=customXml/itemProps1.xml><?xml version="1.0" encoding="utf-8"?>
 <ds:datastoreItem xmlns:ds="http://schemas.openxmlformats.org/officeDocument/2006/customXml" ds:itemID="{A23C0DE2-5723-4EBE-BB67-CD0D7BAFEF27}">
   <ds:schemaRefs>
     <ds:schemaRef ds:uri="http://schemas.microsoft.com/office/2006/metadata/contentType"/>
@@ -46400,10 +46817,27 @@
 </ds:datastoreItem>
 </file>
 
-<file path=customXml/itemProps3.xml><?xml version="1.0" encoding="utf-8"?>
+<file path=customXml/itemProps2.xml><?xml version="1.0" encoding="utf-8"?>
 <ds:datastoreItem xmlns:ds="http://schemas.openxmlformats.org/officeDocument/2006/customXml" ds:itemID="{37867E26-7D2E-4C08-8937-A5EDA2DC982A}">
   <ds:schemaRefs>
     <ds:schemaRef ds:uri="http://schemas.microsoft.com/sharepoint/v3/contenttype/forms"/>
   </ds:schemaRefs>
 </ds:datastoreItem>
+</file>
+
+<file path=customXml/itemProps3.xml><?xml version="1.0" encoding="utf-8"?>
+<ds:datastoreItem xmlns:ds="http://schemas.openxmlformats.org/officeDocument/2006/customXml" ds:itemID="{A397F285-9F9C-4CEA-8DC8-CF9392934C5A}">
+  <ds:schemaRefs>
+    <ds:schemaRef ds:uri="http://purl.org/dc/terms/"/>
+    <ds:schemaRef ds:uri="http://purl.org/dc/dcmitype/"/>
+    <ds:schemaRef ds:uri="http://www.w3.org/XML/1998/namespace"/>
+    <ds:schemaRef ds:uri="http://schemas.microsoft.com/office/2006/documentManagement/types"/>
+    <ds:schemaRef ds:uri="http://schemas.openxmlformats.org/package/2006/metadata/core-properties"/>
+    <ds:schemaRef ds:uri="http://schemas.microsoft.com/office/infopath/2007/PartnerControls"/>
+    <ds:schemaRef ds:uri="f9bf1094-3609-4046-a6fd-76c9c0caa714"/>
+    <ds:schemaRef ds:uri="http://schemas.microsoft.com/office/2006/metadata/properties"/>
+    <ds:schemaRef ds:uri="5d7a3535-6ccc-4381-989f-ae061031b78e"/>
+    <ds:schemaRef ds:uri="http://purl.org/dc/elements/1.1/"/>
+  </ds:schemaRefs>
+</ds:datastoreItem>
 </file>
</xml_diff>

<commit_message>
Mise a jour manuel 1.3.1.0 Correction erreur d'affichage icone starter noire
</commit_message>
<xml_diff>
--- a/AppPublication/Documentation/PublicationSuiviCompetition - Manuel d'utilisation.pptx
+++ b/AppPublication/Documentation/PublicationSuiviCompetition - Manuel d'utilisation.pptx
@@ -269,7 +269,7 @@
           <a:p>
             <a:fld id="{2FC9C06B-3A03-409A-B425-472FC6ED632E}" type="datetimeFigureOut">
               <a:rPr lang="fr-FR" smtClean="0"/>
-              <a:t>13/03/2025</a:t>
+              <a:t>17/05/2025</a:t>
             </a:fld>
             <a:endParaRPr lang="fr-FR"/>
           </a:p>
@@ -347,7 +347,7 @@
           <a:p>
             <a:fld id="{4ADFDC2C-F50E-4BF3-9C13-9F892CB323EC}" type="slidenum">
               <a:rPr lang="fr-FR" smtClean="0"/>
-              <a:t>‹#›</a:t>
+              <a:t>‹N°›</a:t>
             </a:fld>
             <a:endParaRPr lang="fr-FR"/>
           </a:p>
@@ -446,7 +446,7 @@
           <a:p>
             <a:fld id="{1BF3F09E-A5E2-4FD2-AA48-324D4F0E8F41}" type="datetimeFigureOut">
               <a:rPr lang="fr"/>
-              <a:t>13/03/2025</a:t>
+              <a:t>17/05/2025</a:t>
             </a:fld>
             <a:endParaRPr lang="en-US"/>
           </a:p>
@@ -604,7 +604,7 @@
           <a:p>
             <a:fld id="{17CAC06C-F8C2-46C2-88FF-6CBC2099D08A}" type="slidenum">
               <a:rPr lang="fr"/>
-              <a:t>‹#›</a:t>
+              <a:t>‹N°›</a:t>
             </a:fld>
             <a:endParaRPr lang="en-US"/>
           </a:p>
@@ -895,7 +895,7 @@
             <a:fld id="{00000000-1234-1234-1234-123412341234}" type="slidenum">
               <a:rPr lang="fr-FR" smtClean="0"/>
               <a:pPr/>
-              <a:t>‹#›</a:t>
+              <a:t>‹N°›</a:t>
             </a:fld>
             <a:endParaRPr lang="fr-FR" dirty="0"/>
           </a:p>
@@ -3322,7 +3322,7 @@
             <a:fld id="{00000000-1234-1234-1234-123412341234}" type="slidenum">
               <a:rPr lang="fr-FR" smtClean="0"/>
               <a:pPr/>
-              <a:t>‹#›</a:t>
+              <a:t>‹N°›</a:t>
             </a:fld>
             <a:endParaRPr lang="fr-FR" dirty="0"/>
           </a:p>
@@ -3669,7 +3669,7 @@
             <a:fld id="{00000000-1234-1234-1234-123412341234}" type="slidenum">
               <a:rPr lang="fr-FR" smtClean="0"/>
               <a:pPr/>
-              <a:t>‹#›</a:t>
+              <a:t>‹N°›</a:t>
             </a:fld>
             <a:endParaRPr lang="fr-FR" dirty="0"/>
           </a:p>
@@ -3888,7 +3888,7 @@
             <a:fld id="{00000000-1234-1234-1234-123412341234}" type="slidenum">
               <a:rPr lang="fr-FR" smtClean="0"/>
               <a:pPr/>
-              <a:t>‹#›</a:t>
+              <a:t>‹N°›</a:t>
             </a:fld>
             <a:endParaRPr lang="fr-FR" dirty="0"/>
           </a:p>
@@ -4004,7 +4004,7 @@
             <a:fld id="{00000000-1234-1234-1234-123412341234}" type="slidenum">
               <a:rPr lang="fr-FR" smtClean="0"/>
               <a:pPr/>
-              <a:t>‹#›</a:t>
+              <a:t>‹N°›</a:t>
             </a:fld>
             <a:endParaRPr lang="fr-FR" dirty="0"/>
           </a:p>
@@ -7227,7 +7227,7 @@
             <a:fld id="{00000000-1234-1234-1234-123412341234}" type="slidenum">
               <a:rPr lang="fr-FR" smtClean="0"/>
               <a:pPr/>
-              <a:t>‹#›</a:t>
+              <a:t>‹N°›</a:t>
             </a:fld>
             <a:endParaRPr lang="fr-FR" dirty="0"/>
           </a:p>
@@ -7678,7 +7678,7 @@
             <a:fld id="{00000000-1234-1234-1234-123412341234}" type="slidenum">
               <a:rPr lang="fr-FR" smtClean="0"/>
               <a:pPr/>
-              <a:t>‹#›</a:t>
+              <a:t>‹N°›</a:t>
             </a:fld>
             <a:endParaRPr lang="fr-FR" dirty="0"/>
           </a:p>
@@ -8589,7 +8589,7 @@
             <a:fld id="{00000000-1234-1234-1234-123412341234}" type="slidenum">
               <a:rPr lang="fr-FR" smtClean="0"/>
               <a:pPr/>
-              <a:t>‹#›</a:t>
+              <a:t>‹N°›</a:t>
             </a:fld>
             <a:endParaRPr lang="fr-FR" dirty="0"/>
           </a:p>
@@ -9538,7 +9538,7 @@
             <a:fld id="{00000000-1234-1234-1234-123412341234}" type="slidenum">
               <a:rPr lang="fr-FR" smtClean="0"/>
               <a:pPr/>
-              <a:t>‹#›</a:t>
+              <a:t>‹N°›</a:t>
             </a:fld>
             <a:endParaRPr lang="fr-FR" dirty="0"/>
           </a:p>
@@ -9939,7 +9939,7 @@
             <a:fld id="{00000000-1234-1234-1234-123412341234}" type="slidenum">
               <a:rPr lang="fr-FR" smtClean="0"/>
               <a:pPr/>
-              <a:t>‹#›</a:t>
+              <a:t>‹N°›</a:t>
             </a:fld>
             <a:endParaRPr lang="fr-FR" dirty="0"/>
           </a:p>
@@ -11247,7 +11247,7 @@
             <a:fld id="{00000000-1234-1234-1234-123412341234}" type="slidenum">
               <a:rPr lang="fr-FR" smtClean="0"/>
               <a:pPr/>
-              <a:t>‹#›</a:t>
+              <a:t>‹N°›</a:t>
             </a:fld>
             <a:endParaRPr lang="fr-FR" dirty="0"/>
           </a:p>
@@ -12096,7 +12096,7 @@
             <a:fld id="{00000000-1234-1234-1234-123412341234}" type="slidenum">
               <a:rPr lang="fr-FR" smtClean="0"/>
               <a:pPr/>
-              <a:t>‹#›</a:t>
+              <a:t>‹N°›</a:t>
             </a:fld>
             <a:endParaRPr lang="fr-FR" dirty="0"/>
           </a:p>
@@ -13027,7 +13027,7 @@
             <a:fld id="{00000000-1234-1234-1234-123412341234}" type="slidenum">
               <a:rPr lang="fr-FR" smtClean="0"/>
               <a:pPr/>
-              <a:t>‹#›</a:t>
+              <a:t>‹N°›</a:t>
             </a:fld>
             <a:endParaRPr lang="fr-FR" dirty="0"/>
           </a:p>
@@ -14163,7 +14163,7 @@
             <a:fld id="{00000000-1234-1234-1234-123412341234}" type="slidenum">
               <a:rPr lang="fr-FR" smtClean="0"/>
               <a:pPr/>
-              <a:t>‹#›</a:t>
+              <a:t>‹N°›</a:t>
             </a:fld>
             <a:endParaRPr lang="fr-FR" dirty="0"/>
           </a:p>
@@ -15607,7 +15607,7 @@
             <a:fld id="{00000000-1234-1234-1234-123412341234}" type="slidenum">
               <a:rPr lang="fr-FR" smtClean="0"/>
               <a:pPr/>
-              <a:t>‹#›</a:t>
+              <a:t>‹N°›</a:t>
             </a:fld>
             <a:endParaRPr lang="fr-FR" dirty="0"/>
           </a:p>
@@ -15824,7 +15824,7 @@
             <a:fld id="{00000000-1234-1234-1234-123412341234}" type="slidenum">
               <a:rPr lang="fr-FR" smtClean="0"/>
               <a:pPr/>
-              <a:t>‹#›</a:t>
+              <a:t>‹N°›</a:t>
             </a:fld>
             <a:endParaRPr lang="fr-FR" dirty="0"/>
           </a:p>
@@ -17570,7 +17570,7 @@
                 </a:solidFill>
                 <a:latin typeface="Montserrat" panose="00000800000000000000" pitchFamily="2" charset="0"/>
               </a:rPr>
-              <a:t>V1.3.0.1 – 03/2025 </a:t>
+              <a:t>V1.3.1.0 – 05/2025 </a:t>
             </a:r>
           </a:p>
         </p:txBody>
@@ -33852,14 +33852,14 @@
           <p:nvPr>
             <p:extLst>
               <p:ext uri="{D42A27DB-BD31-4B8C-83A1-F6EECF244321}">
-                <p14:modId xmlns:p14="http://schemas.microsoft.com/office/powerpoint/2010/main" val="886254712"/>
+                <p14:modId xmlns:p14="http://schemas.microsoft.com/office/powerpoint/2010/main" val="776795178"/>
               </p:ext>
             </p:extLst>
           </p:nvPr>
         </p:nvGraphicFramePr>
         <p:xfrm>
-          <a:off x="762665" y="1861946"/>
-          <a:ext cx="9603970" cy="3731047"/>
+          <a:off x="1031598" y="1659834"/>
+          <a:ext cx="9603968" cy="4152457"/>
         </p:xfrm>
         <a:graphic>
           <a:graphicData uri="http://schemas.openxmlformats.org/drawingml/2006/table">
@@ -33868,87 +33868,94 @@
                 <a:tableStyleId>{7DF18680-E054-41AD-8BC1-D1AEF772440D}</a:tableStyleId>
               </a:tblPr>
               <a:tblGrid>
-                <a:gridCol w="491612">
+                <a:gridCol w="452757">
                   <a:extLst>
                     <a:ext uri="{9D8B030D-6E8A-4147-A177-3AD203B41FA5}">
                       <a16:colId xmlns:a16="http://schemas.microsoft.com/office/drawing/2014/main" val="3736857135"/>
                     </a:ext>
                   </a:extLst>
                 </a:gridCol>
-                <a:gridCol w="870268">
+                <a:gridCol w="801485">
                   <a:extLst>
                     <a:ext uri="{9D8B030D-6E8A-4147-A177-3AD203B41FA5}">
                       <a16:colId xmlns:a16="http://schemas.microsoft.com/office/drawing/2014/main" val="3696878891"/>
                     </a:ext>
                   </a:extLst>
                 </a:gridCol>
-                <a:gridCol w="824209">
+                <a:gridCol w="759066">
                   <a:extLst>
                     <a:ext uri="{9D8B030D-6E8A-4147-A177-3AD203B41FA5}">
                       <a16:colId xmlns:a16="http://schemas.microsoft.com/office/drawing/2014/main" val="2257898591"/>
                     </a:ext>
                   </a:extLst>
                 </a:gridCol>
-                <a:gridCol w="824209">
+                <a:gridCol w="759066">
                   <a:extLst>
                     <a:ext uri="{9D8B030D-6E8A-4147-A177-3AD203B41FA5}">
                       <a16:colId xmlns:a16="http://schemas.microsoft.com/office/drawing/2014/main" val="2384296798"/>
                     </a:ext>
                   </a:extLst>
                 </a:gridCol>
-                <a:gridCol w="824209">
+                <a:gridCol w="759066">
                   <a:extLst>
                     <a:ext uri="{9D8B030D-6E8A-4147-A177-3AD203B41FA5}">
                       <a16:colId xmlns:a16="http://schemas.microsoft.com/office/drawing/2014/main" val="618733032"/>
                     </a:ext>
                   </a:extLst>
                 </a:gridCol>
-                <a:gridCol w="824209">
+                <a:gridCol w="759066">
                   <a:extLst>
                     <a:ext uri="{9D8B030D-6E8A-4147-A177-3AD203B41FA5}">
                       <a16:colId xmlns:a16="http://schemas.microsoft.com/office/drawing/2014/main" val="3964921429"/>
                     </a:ext>
                   </a:extLst>
                 </a:gridCol>
-                <a:gridCol w="824209">
+                <a:gridCol w="759066">
                   <a:extLst>
                     <a:ext uri="{9D8B030D-6E8A-4147-A177-3AD203B41FA5}">
                       <a16:colId xmlns:a16="http://schemas.microsoft.com/office/drawing/2014/main" val="2528599786"/>
                     </a:ext>
                   </a:extLst>
                 </a:gridCol>
-                <a:gridCol w="824209">
+                <a:gridCol w="759066">
                   <a:extLst>
                     <a:ext uri="{9D8B030D-6E8A-4147-A177-3AD203B41FA5}">
                       <a16:colId xmlns:a16="http://schemas.microsoft.com/office/drawing/2014/main" val="2631112101"/>
                     </a:ext>
                   </a:extLst>
                 </a:gridCol>
-                <a:gridCol w="824209">
+                <a:gridCol w="759066">
                   <a:extLst>
                     <a:ext uri="{9D8B030D-6E8A-4147-A177-3AD203B41FA5}">
                       <a16:colId xmlns:a16="http://schemas.microsoft.com/office/drawing/2014/main" val="1640724778"/>
                     </a:ext>
                   </a:extLst>
                 </a:gridCol>
-                <a:gridCol w="824209">
+                <a:gridCol w="759066">
                   <a:extLst>
                     <a:ext uri="{9D8B030D-6E8A-4147-A177-3AD203B41FA5}">
                       <a16:colId xmlns:a16="http://schemas.microsoft.com/office/drawing/2014/main" val="2824390373"/>
                     </a:ext>
                   </a:extLst>
                 </a:gridCol>
-                <a:gridCol w="824209">
+                <a:gridCol w="759066">
                   <a:extLst>
                     <a:ext uri="{9D8B030D-6E8A-4147-A177-3AD203B41FA5}">
                       <a16:colId xmlns:a16="http://schemas.microsoft.com/office/drawing/2014/main" val="3229000006"/>
                     </a:ext>
                   </a:extLst>
                 </a:gridCol>
-                <a:gridCol w="824209">
+                <a:gridCol w="759066">
                   <a:extLst>
                     <a:ext uri="{9D8B030D-6E8A-4147-A177-3AD203B41FA5}">
                       <a16:colId xmlns:a16="http://schemas.microsoft.com/office/drawing/2014/main" val="788621322"/>
+                    </a:ext>
+                  </a:extLst>
+                </a:gridCol>
+                <a:gridCol w="759066">
+                  <a:extLst>
+                    <a:ext uri="{9D8B030D-6E8A-4147-A177-3AD203B41FA5}">
+                      <a16:colId xmlns:a16="http://schemas.microsoft.com/office/drawing/2014/main" val="1839021779"/>
                     </a:ext>
                   </a:extLst>
                 </a:gridCol>
@@ -33959,7 +33966,7 @@
                     <a:bodyPr/>
                     <a:lstStyle/>
                     <a:p>
-                      <a:endParaRPr lang="fr-FR" dirty="0"/>
+                      <a:endParaRPr lang="fr-FR" sz="1600" dirty="0"/>
                     </a:p>
                   </a:txBody>
                   <a:tcPr anchor="ctr"/>
@@ -33969,26 +33976,26 @@
                     <a:bodyPr/>
                     <a:lstStyle/>
                     <a:p>
-                      <a:endParaRPr lang="fr-FR" dirty="0"/>
+                      <a:endParaRPr lang="fr-FR" sz="1600" dirty="0"/>
                     </a:p>
                   </a:txBody>
                   <a:tcPr anchor="ctr"/>
                 </a:tc>
-                <a:tc gridSpan="10">
+                <a:tc gridSpan="11">
                   <a:txBody>
                     <a:bodyPr/>
                     <a:lstStyle/>
                     <a:p>
                       <a:pPr algn="ctr"/>
                       <a:r>
-                        <a:rPr lang="fr-FR" sz="1800" dirty="0" err="1">
+                        <a:rPr lang="fr-FR" sz="1600" dirty="0" err="1">
                           <a:solidFill>
                             <a:schemeClr val="bg1"/>
                           </a:solidFill>
                         </a:rPr>
                         <a:t>PublicationSuiviCompetition</a:t>
                       </a:r>
-                      <a:endParaRPr lang="fr-FR" dirty="0">
+                      <a:endParaRPr lang="fr-FR" sz="1600" dirty="0">
                         <a:solidFill>
                           <a:schemeClr val="bg1"/>
                         </a:solidFill>
@@ -34118,6 +34125,25 @@
                     </a:solidFill>
                   </a:tcPr>
                 </a:tc>
+                <a:tc hMerge="1">
+                  <a:txBody>
+                    <a:bodyPr/>
+                    <a:lstStyle/>
+                    <a:p>
+                      <a:pPr algn="ctr"/>
+                      <a:endParaRPr lang="fr-FR" dirty="0">
+                        <a:solidFill>
+                          <a:schemeClr val="bg1"/>
+                        </a:solidFill>
+                      </a:endParaRPr>
+                    </a:p>
+                  </a:txBody>
+                  <a:tcPr anchor="ctr">
+                    <a:solidFill>
+                      <a:schemeClr val="accent1"/>
+                    </a:solidFill>
+                  </a:tcPr>
+                </a:tc>
                 <a:extLst>
                   <a:ext uri="{0D108BD9-81ED-4DB2-BD59-A6C34878D82A}">
                     <a16:rowId xmlns:a16="http://schemas.microsoft.com/office/drawing/2014/main" val="1913834373"/>
@@ -34130,7 +34156,7 @@
                     <a:bodyPr/>
                     <a:lstStyle/>
                     <a:p>
-                      <a:endParaRPr lang="fr-FR" dirty="0"/>
+                      <a:endParaRPr lang="fr-FR" sz="1600" dirty="0"/>
                     </a:p>
                   </a:txBody>
                   <a:tcPr anchor="ctr"/>
@@ -34140,7 +34166,7 @@
                     <a:bodyPr/>
                     <a:lstStyle/>
                     <a:p>
-                      <a:endParaRPr lang="fr-FR" dirty="0"/>
+                      <a:endParaRPr lang="fr-FR" sz="1600" dirty="0"/>
                     </a:p>
                   </a:txBody>
                   <a:tcPr anchor="ctr"/>
@@ -34151,7 +34177,7 @@
                     <a:lstStyle/>
                     <a:p>
                       <a:r>
-                        <a:rPr lang="fr-FR" dirty="0">
+                        <a:rPr lang="fr-FR" sz="1600" dirty="0">
                           <a:solidFill>
                             <a:schemeClr val="bg1"/>
                           </a:solidFill>
@@ -34172,7 +34198,7 @@
                     <a:lstStyle/>
                     <a:p>
                       <a:r>
-                        <a:rPr lang="fr-FR" dirty="0">
+                        <a:rPr lang="fr-FR" sz="1600" dirty="0">
                           <a:solidFill>
                             <a:schemeClr val="bg1"/>
                           </a:solidFill>
@@ -34193,7 +34219,7 @@
                     <a:lstStyle/>
                     <a:p>
                       <a:r>
-                        <a:rPr lang="fr-FR" dirty="0">
+                        <a:rPr lang="fr-FR" sz="1600" dirty="0">
                           <a:solidFill>
                             <a:schemeClr val="bg1"/>
                           </a:solidFill>
@@ -34214,7 +34240,7 @@
                     <a:lstStyle/>
                     <a:p>
                       <a:r>
-                        <a:rPr lang="fr-FR" dirty="0">
+                        <a:rPr lang="fr-FR" sz="1600" dirty="0">
                           <a:solidFill>
                             <a:schemeClr val="bg1"/>
                           </a:solidFill>
@@ -34235,7 +34261,7 @@
                     <a:lstStyle/>
                     <a:p>
                       <a:r>
-                        <a:rPr lang="fr-FR" dirty="0">
+                        <a:rPr lang="fr-FR" sz="1600" dirty="0">
                           <a:solidFill>
                             <a:schemeClr val="bg1"/>
                           </a:solidFill>
@@ -34256,7 +34282,7 @@
                     <a:lstStyle/>
                     <a:p>
                       <a:r>
-                        <a:rPr lang="fr-FR" dirty="0">
+                        <a:rPr lang="fr-FR" sz="1600" dirty="0">
                           <a:solidFill>
                             <a:schemeClr val="bg1"/>
                           </a:solidFill>
@@ -34277,7 +34303,7 @@
                     <a:lstStyle/>
                     <a:p>
                       <a:r>
-                        <a:rPr lang="fr-FR" dirty="0">
+                        <a:rPr lang="fr-FR" sz="1600" dirty="0">
                           <a:solidFill>
                             <a:schemeClr val="bg1"/>
                           </a:solidFill>
@@ -34298,7 +34324,7 @@
                     <a:lstStyle/>
                     <a:p>
                       <a:r>
-                        <a:rPr lang="fr-FR" dirty="0">
+                        <a:rPr lang="fr-FR" sz="1600" dirty="0">
                           <a:solidFill>
                             <a:schemeClr val="bg1"/>
                           </a:solidFill>
@@ -34319,7 +34345,7 @@
                     <a:lstStyle/>
                     <a:p>
                       <a:r>
-                        <a:rPr lang="fr-FR" dirty="0">
+                        <a:rPr lang="fr-FR" sz="1600" dirty="0">
                           <a:solidFill>
                             <a:schemeClr val="bg1"/>
                           </a:solidFill>
@@ -34340,12 +34366,33 @@
                     <a:lstStyle/>
                     <a:p>
                       <a:r>
-                        <a:rPr lang="fr-FR" dirty="0">
+                        <a:rPr lang="fr-FR" sz="1600" dirty="0">
                           <a:solidFill>
                             <a:schemeClr val="bg1"/>
                           </a:solidFill>
                         </a:rPr>
                         <a:t>1.3.0.1</a:t>
+                      </a:r>
+                    </a:p>
+                  </a:txBody>
+                  <a:tcPr anchor="ctr">
+                    <a:solidFill>
+                      <a:schemeClr val="accent1"/>
+                    </a:solidFill>
+                  </a:tcPr>
+                </a:tc>
+                <a:tc>
+                  <a:txBody>
+                    <a:bodyPr/>
+                    <a:lstStyle/>
+                    <a:p>
+                      <a:r>
+                        <a:rPr lang="fr-FR" sz="1600" dirty="0">
+                          <a:solidFill>
+                            <a:schemeClr val="bg1"/>
+                          </a:solidFill>
+                        </a:rPr>
+                        <a:t>1.3.1.0</a:t>
                       </a:r>
                     </a:p>
                   </a:txBody>
@@ -34362,7 +34409,7 @@
                 </a:extLst>
               </a:tr>
               <a:tr h="421410">
-                <a:tc rowSpan="6">
+                <a:tc rowSpan="7">
                   <a:txBody>
                     <a:bodyPr/>
                     <a:lstStyle/>
@@ -34385,7 +34432,7 @@
                         <a:defRPr/>
                       </a:pPr>
                       <a:r>
-                        <a:rPr lang="fr-FR" dirty="0">
+                        <a:rPr lang="fr-FR" sz="1600" dirty="0">
                           <a:solidFill>
                             <a:schemeClr val="bg1"/>
                           </a:solidFill>
@@ -34406,7 +34453,7 @@
                     <a:lstStyle/>
                     <a:p>
                       <a:r>
-                        <a:rPr lang="fr-FR" dirty="0">
+                        <a:rPr lang="fr-FR" sz="1600" dirty="0">
                           <a:solidFill>
                             <a:schemeClr val="bg1"/>
                           </a:solidFill>
@@ -34426,7 +34473,7 @@
                     <a:bodyPr/>
                     <a:lstStyle/>
                     <a:p>
-                      <a:endParaRPr lang="fr-FR" dirty="0"/>
+                      <a:endParaRPr lang="fr-FR" sz="1600" dirty="0"/>
                     </a:p>
                   </a:txBody>
                   <a:tcPr anchor="ctr">
@@ -34440,7 +34487,7 @@
                     <a:bodyPr/>
                     <a:lstStyle/>
                     <a:p>
-                      <a:endParaRPr lang="fr-FR" dirty="0"/>
+                      <a:endParaRPr lang="fr-FR" sz="1600" dirty="0"/>
                     </a:p>
                   </a:txBody>
                   <a:tcPr anchor="ctr">
@@ -34454,7 +34501,7 @@
                     <a:bodyPr/>
                     <a:lstStyle/>
                     <a:p>
-                      <a:endParaRPr lang="fr-FR" dirty="0"/>
+                      <a:endParaRPr lang="fr-FR" sz="1600" dirty="0"/>
                     </a:p>
                   </a:txBody>
                   <a:tcPr anchor="ctr">
@@ -34468,7 +34515,7 @@
                     <a:bodyPr/>
                     <a:lstStyle/>
                     <a:p>
-                      <a:endParaRPr lang="fr-FR" dirty="0"/>
+                      <a:endParaRPr lang="fr-FR" sz="1600" dirty="0"/>
                     </a:p>
                   </a:txBody>
                   <a:tcPr anchor="ctr">
@@ -34482,7 +34529,7 @@
                     <a:bodyPr/>
                     <a:lstStyle/>
                     <a:p>
-                      <a:endParaRPr lang="fr-FR" dirty="0"/>
+                      <a:endParaRPr lang="fr-FR" sz="1600" dirty="0"/>
                     </a:p>
                   </a:txBody>
                   <a:tcPr anchor="ctr">
@@ -34496,7 +34543,7 @@
                     <a:bodyPr/>
                     <a:lstStyle/>
                     <a:p>
-                      <a:endParaRPr lang="fr-FR" dirty="0"/>
+                      <a:endParaRPr lang="fr-FR" sz="1600" dirty="0"/>
                     </a:p>
                   </a:txBody>
                   <a:tcPr anchor="ctr">
@@ -34510,7 +34557,7 @@
                     <a:bodyPr/>
                     <a:lstStyle/>
                     <a:p>
-                      <a:endParaRPr lang="fr-FR" dirty="0"/>
+                      <a:endParaRPr lang="fr-FR" sz="1600" dirty="0"/>
                     </a:p>
                   </a:txBody>
                   <a:tcPr anchor="ctr">
@@ -34524,7 +34571,7 @@
                     <a:bodyPr/>
                     <a:lstStyle/>
                     <a:p>
-                      <a:endParaRPr lang="fr-FR" dirty="0"/>
+                      <a:endParaRPr lang="fr-FR" sz="1600" dirty="0"/>
                     </a:p>
                   </a:txBody>
                   <a:tcPr anchor="ctr">
@@ -34538,7 +34585,7 @@
                     <a:bodyPr/>
                     <a:lstStyle/>
                     <a:p>
-                      <a:endParaRPr lang="fr-FR" dirty="0"/>
+                      <a:endParaRPr lang="fr-FR" sz="1600" dirty="0"/>
                     </a:p>
                   </a:txBody>
                   <a:tcPr anchor="ctr">
@@ -34552,7 +34599,21 @@
                     <a:bodyPr/>
                     <a:lstStyle/>
                     <a:p>
-                      <a:endParaRPr lang="fr-FR" dirty="0"/>
+                      <a:endParaRPr lang="fr-FR" sz="1600" dirty="0"/>
+                    </a:p>
+                  </a:txBody>
+                  <a:tcPr anchor="ctr">
+                    <a:solidFill>
+                      <a:srgbClr val="FFC000"/>
+                    </a:solidFill>
+                  </a:tcPr>
+                </a:tc>
+                <a:tc>
+                  <a:txBody>
+                    <a:bodyPr/>
+                    <a:lstStyle/>
+                    <a:p>
+                      <a:endParaRPr lang="fr-FR" sz="1600" dirty="0"/>
                     </a:p>
                   </a:txBody>
                   <a:tcPr anchor="ctr">
@@ -34584,7 +34645,7 @@
                     <a:lstStyle/>
                     <a:p>
                       <a:r>
-                        <a:rPr lang="fr-FR" dirty="0">
+                        <a:rPr lang="fr-FR" sz="1600" dirty="0">
                           <a:solidFill>
                             <a:schemeClr val="bg1"/>
                           </a:solidFill>
@@ -34604,7 +34665,7 @@
                     <a:bodyPr/>
                     <a:lstStyle/>
                     <a:p>
-                      <a:endParaRPr lang="fr-FR" dirty="0"/>
+                      <a:endParaRPr lang="fr-FR" sz="1600" dirty="0"/>
                     </a:p>
                   </a:txBody>
                   <a:tcPr anchor="ctr">
@@ -34618,7 +34679,7 @@
                     <a:bodyPr/>
                     <a:lstStyle/>
                     <a:p>
-                      <a:endParaRPr lang="fr-FR" dirty="0"/>
+                      <a:endParaRPr lang="fr-FR" sz="1600" dirty="0"/>
                     </a:p>
                   </a:txBody>
                   <a:tcPr anchor="ctr">
@@ -34632,7 +34693,7 @@
                     <a:bodyPr/>
                     <a:lstStyle/>
                     <a:p>
-                      <a:endParaRPr lang="fr-FR" dirty="0"/>
+                      <a:endParaRPr lang="fr-FR" sz="1600" dirty="0"/>
                     </a:p>
                   </a:txBody>
                   <a:tcPr anchor="ctr">
@@ -34646,7 +34707,7 @@
                     <a:bodyPr/>
                     <a:lstStyle/>
                     <a:p>
-                      <a:endParaRPr lang="fr-FR" dirty="0"/>
+                      <a:endParaRPr lang="fr-FR" sz="1600" dirty="0"/>
                     </a:p>
                   </a:txBody>
                   <a:tcPr anchor="ctr">
@@ -34660,7 +34721,7 @@
                     <a:bodyPr/>
                     <a:lstStyle/>
                     <a:p>
-                      <a:endParaRPr lang="fr-FR" dirty="0"/>
+                      <a:endParaRPr lang="fr-FR" sz="1600" dirty="0"/>
                     </a:p>
                   </a:txBody>
                   <a:tcPr anchor="ctr">
@@ -34674,7 +34735,7 @@
                     <a:bodyPr/>
                     <a:lstStyle/>
                     <a:p>
-                      <a:endParaRPr lang="fr-FR" dirty="0"/>
+                      <a:endParaRPr lang="fr-FR" sz="1600" dirty="0"/>
                     </a:p>
                   </a:txBody>
                   <a:tcPr anchor="ctr">
@@ -34688,7 +34749,7 @@
                     <a:bodyPr/>
                     <a:lstStyle/>
                     <a:p>
-                      <a:endParaRPr lang="fr-FR" dirty="0"/>
+                      <a:endParaRPr lang="fr-FR" sz="1600" dirty="0"/>
                     </a:p>
                   </a:txBody>
                   <a:tcPr anchor="ctr">
@@ -34702,7 +34763,7 @@
                     <a:bodyPr/>
                     <a:lstStyle/>
                     <a:p>
-                      <a:endParaRPr lang="fr-FR" dirty="0"/>
+                      <a:endParaRPr lang="fr-FR" sz="1600" dirty="0"/>
                     </a:p>
                   </a:txBody>
                   <a:tcPr anchor="ctr">
@@ -34716,7 +34777,7 @@
                     <a:bodyPr/>
                     <a:lstStyle/>
                     <a:p>
-                      <a:endParaRPr lang="fr-FR" dirty="0"/>
+                      <a:endParaRPr lang="fr-FR" sz="1600" dirty="0"/>
                     </a:p>
                   </a:txBody>
                   <a:tcPr anchor="ctr">
@@ -34730,7 +34791,21 @@
                     <a:bodyPr/>
                     <a:lstStyle/>
                     <a:p>
-                      <a:endParaRPr lang="fr-FR" dirty="0"/>
+                      <a:endParaRPr lang="fr-FR" sz="1600" dirty="0"/>
+                    </a:p>
+                  </a:txBody>
+                  <a:tcPr anchor="ctr">
+                    <a:solidFill>
+                      <a:schemeClr val="accent6"/>
+                    </a:solidFill>
+                  </a:tcPr>
+                </a:tc>
+                <a:tc>
+                  <a:txBody>
+                    <a:bodyPr/>
+                    <a:lstStyle/>
+                    <a:p>
+                      <a:endParaRPr lang="fr-FR" sz="1600" dirty="0"/>
                     </a:p>
                   </a:txBody>
                   <a:tcPr anchor="ctr">
@@ -34779,7 +34854,7 @@
                         <a:defRPr/>
                       </a:pPr>
                       <a:r>
-                        <a:rPr lang="fr-FR" dirty="0">
+                        <a:rPr lang="fr-FR" sz="1600" dirty="0">
                           <a:solidFill>
                             <a:schemeClr val="bg1"/>
                           </a:solidFill>
@@ -34799,7 +34874,7 @@
                     <a:bodyPr/>
                     <a:lstStyle/>
                     <a:p>
-                      <a:endParaRPr lang="fr-FR"/>
+                      <a:endParaRPr lang="fr-FR" sz="1600"/>
                     </a:p>
                   </a:txBody>
                   <a:tcPr anchor="ctr">
@@ -34813,7 +34888,7 @@
                     <a:bodyPr/>
                     <a:lstStyle/>
                     <a:p>
-                      <a:endParaRPr lang="fr-FR"/>
+                      <a:endParaRPr lang="fr-FR" sz="1600"/>
                     </a:p>
                   </a:txBody>
                   <a:tcPr anchor="ctr">
@@ -34827,7 +34902,7 @@
                     <a:bodyPr/>
                     <a:lstStyle/>
                     <a:p>
-                      <a:endParaRPr lang="fr-FR" dirty="0"/>
+                      <a:endParaRPr lang="fr-FR" sz="1600" dirty="0"/>
                     </a:p>
                   </a:txBody>
                   <a:tcPr anchor="ctr">
@@ -34841,7 +34916,7 @@
                     <a:bodyPr/>
                     <a:lstStyle/>
                     <a:p>
-                      <a:endParaRPr lang="fr-FR"/>
+                      <a:endParaRPr lang="fr-FR" sz="1600"/>
                     </a:p>
                   </a:txBody>
                   <a:tcPr anchor="ctr">
@@ -34855,7 +34930,7 @@
                     <a:bodyPr/>
                     <a:lstStyle/>
                     <a:p>
-                      <a:endParaRPr lang="fr-FR" dirty="0"/>
+                      <a:endParaRPr lang="fr-FR" sz="1600" dirty="0"/>
                     </a:p>
                   </a:txBody>
                   <a:tcPr anchor="ctr">
@@ -34869,7 +34944,7 @@
                     <a:bodyPr/>
                     <a:lstStyle/>
                     <a:p>
-                      <a:endParaRPr lang="fr-FR"/>
+                      <a:endParaRPr lang="fr-FR" sz="1600" dirty="0"/>
                     </a:p>
                   </a:txBody>
                   <a:tcPr anchor="ctr">
@@ -34883,7 +34958,7 @@
                     <a:bodyPr/>
                     <a:lstStyle/>
                     <a:p>
-                      <a:endParaRPr lang="fr-FR" dirty="0"/>
+                      <a:endParaRPr lang="fr-FR" sz="1600" dirty="0"/>
                     </a:p>
                   </a:txBody>
                   <a:tcPr anchor="ctr">
@@ -34897,7 +34972,7 @@
                     <a:bodyPr/>
                     <a:lstStyle/>
                     <a:p>
-                      <a:endParaRPr lang="fr-FR" dirty="0"/>
+                      <a:endParaRPr lang="fr-FR" sz="1600" dirty="0"/>
                     </a:p>
                   </a:txBody>
                   <a:tcPr anchor="ctr">
@@ -34911,7 +34986,7 @@
                     <a:bodyPr/>
                     <a:lstStyle/>
                     <a:p>
-                      <a:endParaRPr lang="fr-FR" dirty="0"/>
+                      <a:endParaRPr lang="fr-FR" sz="1600" dirty="0"/>
                     </a:p>
                   </a:txBody>
                   <a:tcPr anchor="ctr">
@@ -34925,7 +35000,21 @@
                     <a:bodyPr/>
                     <a:lstStyle/>
                     <a:p>
-                      <a:endParaRPr lang="fr-FR" dirty="0"/>
+                      <a:endParaRPr lang="fr-FR" sz="1600" dirty="0"/>
+                    </a:p>
+                  </a:txBody>
+                  <a:tcPr anchor="ctr">
+                    <a:solidFill>
+                      <a:schemeClr val="accent6"/>
+                    </a:solidFill>
+                  </a:tcPr>
+                </a:tc>
+                <a:tc>
+                  <a:txBody>
+                    <a:bodyPr/>
+                    <a:lstStyle/>
+                    <a:p>
+                      <a:endParaRPr lang="fr-FR" sz="1600" dirty="0"/>
                     </a:p>
                   </a:txBody>
                   <a:tcPr anchor="ctr">
@@ -34974,7 +35063,7 @@
                         <a:defRPr/>
                       </a:pPr>
                       <a:r>
-                        <a:rPr lang="fr-FR" dirty="0">
+                        <a:rPr lang="fr-FR" sz="1600" dirty="0">
                           <a:solidFill>
                             <a:schemeClr val="bg1"/>
                           </a:solidFill>
@@ -34994,7 +35083,7 @@
                     <a:bodyPr/>
                     <a:lstStyle/>
                     <a:p>
-                      <a:endParaRPr lang="fr-FR"/>
+                      <a:endParaRPr lang="fr-FR" sz="1600"/>
                     </a:p>
                   </a:txBody>
                   <a:tcPr anchor="ctr">
@@ -35008,7 +35097,7 @@
                     <a:bodyPr/>
                     <a:lstStyle/>
                     <a:p>
-                      <a:endParaRPr lang="fr-FR"/>
+                      <a:endParaRPr lang="fr-FR" sz="1600"/>
                     </a:p>
                   </a:txBody>
                   <a:tcPr anchor="ctr">
@@ -35022,7 +35111,7 @@
                     <a:bodyPr/>
                     <a:lstStyle/>
                     <a:p>
-                      <a:endParaRPr lang="fr-FR"/>
+                      <a:endParaRPr lang="fr-FR" sz="1600"/>
                     </a:p>
                   </a:txBody>
                   <a:tcPr anchor="ctr">
@@ -35036,7 +35125,7 @@
                     <a:bodyPr/>
                     <a:lstStyle/>
                     <a:p>
-                      <a:endParaRPr lang="fr-FR"/>
+                      <a:endParaRPr lang="fr-FR" sz="1600"/>
                     </a:p>
                   </a:txBody>
                   <a:tcPr anchor="ctr">
@@ -35050,7 +35139,7 @@
                     <a:bodyPr/>
                     <a:lstStyle/>
                     <a:p>
-                      <a:endParaRPr lang="fr-FR" dirty="0"/>
+                      <a:endParaRPr lang="fr-FR" sz="1600" dirty="0"/>
                     </a:p>
                   </a:txBody>
                   <a:tcPr anchor="ctr">
@@ -35064,7 +35153,7 @@
                     <a:bodyPr/>
                     <a:lstStyle/>
                     <a:p>
-                      <a:endParaRPr lang="fr-FR"/>
+                      <a:endParaRPr lang="fr-FR" sz="1600"/>
                     </a:p>
                   </a:txBody>
                   <a:tcPr anchor="ctr">
@@ -35078,7 +35167,7 @@
                     <a:bodyPr/>
                     <a:lstStyle/>
                     <a:p>
-                      <a:endParaRPr lang="fr-FR" dirty="0"/>
+                      <a:endParaRPr lang="fr-FR" sz="1600" dirty="0"/>
                     </a:p>
                   </a:txBody>
                   <a:tcPr anchor="ctr">
@@ -35092,7 +35181,7 @@
                     <a:bodyPr/>
                     <a:lstStyle/>
                     <a:p>
-                      <a:endParaRPr lang="fr-FR" dirty="0"/>
+                      <a:endParaRPr lang="fr-FR" sz="1600" dirty="0"/>
                     </a:p>
                   </a:txBody>
                   <a:tcPr anchor="ctr">
@@ -35106,7 +35195,7 @@
                     <a:bodyPr/>
                     <a:lstStyle/>
                     <a:p>
-                      <a:endParaRPr lang="fr-FR" dirty="0"/>
+                      <a:endParaRPr lang="fr-FR" sz="1600" dirty="0"/>
                     </a:p>
                   </a:txBody>
                   <a:tcPr anchor="ctr">
@@ -35120,7 +35209,21 @@
                     <a:bodyPr/>
                     <a:lstStyle/>
                     <a:p>
-                      <a:endParaRPr lang="fr-FR" dirty="0"/>
+                      <a:endParaRPr lang="fr-FR" sz="1600" dirty="0"/>
+                    </a:p>
+                  </a:txBody>
+                  <a:tcPr anchor="ctr">
+                    <a:solidFill>
+                      <a:schemeClr val="accent6"/>
+                    </a:solidFill>
+                  </a:tcPr>
+                </a:tc>
+                <a:tc>
+                  <a:txBody>
+                    <a:bodyPr/>
+                    <a:lstStyle/>
+                    <a:p>
+                      <a:endParaRPr lang="fr-FR" sz="1600" dirty="0"/>
                     </a:p>
                   </a:txBody>
                   <a:tcPr anchor="ctr">
@@ -35169,7 +35272,7 @@
                         <a:defRPr/>
                       </a:pPr>
                       <a:r>
-                        <a:rPr lang="fr-FR" dirty="0">
+                        <a:rPr lang="fr-FR" sz="1600" dirty="0">
                           <a:solidFill>
                             <a:schemeClr val="bg1"/>
                           </a:solidFill>
@@ -35189,7 +35292,7 @@
                     <a:bodyPr/>
                     <a:lstStyle/>
                     <a:p>
-                      <a:endParaRPr lang="fr-FR" dirty="0"/>
+                      <a:endParaRPr lang="fr-FR" sz="1600" dirty="0"/>
                     </a:p>
                   </a:txBody>
                   <a:tcPr anchor="ctr">
@@ -35203,7 +35306,7 @@
                     <a:bodyPr/>
                     <a:lstStyle/>
                     <a:p>
-                      <a:endParaRPr lang="fr-FR" dirty="0"/>
+                      <a:endParaRPr lang="fr-FR" sz="1600" dirty="0"/>
                     </a:p>
                   </a:txBody>
                   <a:tcPr anchor="ctr">
@@ -35217,7 +35320,7 @@
                     <a:bodyPr/>
                     <a:lstStyle/>
                     <a:p>
-                      <a:endParaRPr lang="fr-FR" dirty="0"/>
+                      <a:endParaRPr lang="fr-FR" sz="1600" dirty="0"/>
                     </a:p>
                   </a:txBody>
                   <a:tcPr anchor="ctr">
@@ -35231,7 +35334,7 @@
                     <a:bodyPr/>
                     <a:lstStyle/>
                     <a:p>
-                      <a:endParaRPr lang="fr-FR" dirty="0"/>
+                      <a:endParaRPr lang="fr-FR" sz="1600" dirty="0"/>
                     </a:p>
                   </a:txBody>
                   <a:tcPr anchor="ctr">
@@ -35245,7 +35348,7 @@
                     <a:bodyPr/>
                     <a:lstStyle/>
                     <a:p>
-                      <a:endParaRPr lang="fr-FR" dirty="0"/>
+                      <a:endParaRPr lang="fr-FR" sz="1600" dirty="0"/>
                     </a:p>
                   </a:txBody>
                   <a:tcPr anchor="ctr">
@@ -35259,7 +35362,7 @@
                     <a:bodyPr/>
                     <a:lstStyle/>
                     <a:p>
-                      <a:endParaRPr lang="fr-FR" dirty="0"/>
+                      <a:endParaRPr lang="fr-FR" sz="1600" dirty="0"/>
                     </a:p>
                   </a:txBody>
                   <a:tcPr anchor="ctr">
@@ -35273,7 +35376,7 @@
                     <a:bodyPr/>
                     <a:lstStyle/>
                     <a:p>
-                      <a:endParaRPr lang="fr-FR" dirty="0"/>
+                      <a:endParaRPr lang="fr-FR" sz="1600" dirty="0"/>
                     </a:p>
                   </a:txBody>
                   <a:tcPr anchor="ctr">
@@ -35287,7 +35390,7 @@
                     <a:bodyPr/>
                     <a:lstStyle/>
                     <a:p>
-                      <a:endParaRPr lang="fr-FR" dirty="0"/>
+                      <a:endParaRPr lang="fr-FR" sz="1600" dirty="0"/>
                     </a:p>
                   </a:txBody>
                   <a:tcPr anchor="ctr">
@@ -35301,7 +35404,7 @@
                     <a:bodyPr/>
                     <a:lstStyle/>
                     <a:p>
-                      <a:endParaRPr lang="fr-FR" dirty="0"/>
+                      <a:endParaRPr lang="fr-FR" sz="1600" dirty="0"/>
                     </a:p>
                   </a:txBody>
                   <a:tcPr anchor="ctr">
@@ -35315,7 +35418,21 @@
                     <a:bodyPr/>
                     <a:lstStyle/>
                     <a:p>
-                      <a:endParaRPr lang="fr-FR" dirty="0"/>
+                      <a:endParaRPr lang="fr-FR" sz="1600" dirty="0"/>
+                    </a:p>
+                  </a:txBody>
+                  <a:tcPr anchor="ctr">
+                    <a:solidFill>
+                      <a:schemeClr val="accent6"/>
+                    </a:solidFill>
+                  </a:tcPr>
+                </a:tc>
+                <a:tc>
+                  <a:txBody>
+                    <a:bodyPr/>
+                    <a:lstStyle/>
+                    <a:p>
+                      <a:endParaRPr lang="fr-FR" sz="1600" dirty="0"/>
                     </a:p>
                   </a:txBody>
                   <a:tcPr anchor="ctr">
@@ -35389,7 +35506,7 @@
                         <a:defRPr/>
                       </a:pPr>
                       <a:r>
-                        <a:rPr lang="fr-FR" dirty="0">
+                        <a:rPr lang="fr-FR" sz="1600" dirty="0">
                           <a:solidFill>
                             <a:schemeClr val="bg1"/>
                           </a:solidFill>
@@ -35409,7 +35526,7 @@
                     <a:bodyPr/>
                     <a:lstStyle/>
                     <a:p>
-                      <a:endParaRPr lang="fr-FR" dirty="0"/>
+                      <a:endParaRPr lang="fr-FR" sz="1600" dirty="0"/>
                     </a:p>
                   </a:txBody>
                   <a:tcPr anchor="ctr">
@@ -35423,7 +35540,7 @@
                     <a:bodyPr/>
                     <a:lstStyle/>
                     <a:p>
-                      <a:endParaRPr lang="fr-FR" dirty="0"/>
+                      <a:endParaRPr lang="fr-FR" sz="1600" dirty="0"/>
                     </a:p>
                   </a:txBody>
                   <a:tcPr anchor="ctr">
@@ -35437,7 +35554,7 @@
                     <a:bodyPr/>
                     <a:lstStyle/>
                     <a:p>
-                      <a:endParaRPr lang="fr-FR" dirty="0"/>
+                      <a:endParaRPr lang="fr-FR" sz="1600" dirty="0"/>
                     </a:p>
                   </a:txBody>
                   <a:tcPr anchor="ctr">
@@ -35451,7 +35568,7 @@
                     <a:bodyPr/>
                     <a:lstStyle/>
                     <a:p>
-                      <a:endParaRPr lang="fr-FR" dirty="0"/>
+                      <a:endParaRPr lang="fr-FR" sz="1600" dirty="0"/>
                     </a:p>
                   </a:txBody>
                   <a:tcPr anchor="ctr">
@@ -35465,7 +35582,7 @@
                     <a:bodyPr/>
                     <a:lstStyle/>
                     <a:p>
-                      <a:endParaRPr lang="fr-FR" dirty="0"/>
+                      <a:endParaRPr lang="fr-FR" sz="1600" dirty="0"/>
                     </a:p>
                   </a:txBody>
                   <a:tcPr anchor="ctr">
@@ -35479,7 +35596,7 @@
                     <a:bodyPr/>
                     <a:lstStyle/>
                     <a:p>
-                      <a:endParaRPr lang="fr-FR" dirty="0"/>
+                      <a:endParaRPr lang="fr-FR" sz="1600" dirty="0"/>
                     </a:p>
                   </a:txBody>
                   <a:tcPr anchor="ctr">
@@ -35493,7 +35610,7 @@
                     <a:bodyPr/>
                     <a:lstStyle/>
                     <a:p>
-                      <a:endParaRPr lang="fr-FR" dirty="0"/>
+                      <a:endParaRPr lang="fr-FR" sz="1600" dirty="0"/>
                     </a:p>
                   </a:txBody>
                   <a:tcPr anchor="ctr">
@@ -35507,7 +35624,7 @@
                     <a:bodyPr/>
                     <a:lstStyle/>
                     <a:p>
-                      <a:endParaRPr lang="fr-FR" dirty="0"/>
+                      <a:endParaRPr lang="fr-FR" sz="1600" dirty="0"/>
                     </a:p>
                   </a:txBody>
                   <a:tcPr anchor="ctr">
@@ -35521,7 +35638,7 @@
                     <a:bodyPr/>
                     <a:lstStyle/>
                     <a:p>
-                      <a:endParaRPr lang="fr-FR" dirty="0"/>
+                      <a:endParaRPr lang="fr-FR" sz="1600" dirty="0"/>
                     </a:p>
                   </a:txBody>
                   <a:tcPr anchor="ctr">
@@ -35535,7 +35652,21 @@
                     <a:bodyPr/>
                     <a:lstStyle/>
                     <a:p>
-                      <a:endParaRPr lang="fr-FR" dirty="0"/>
+                      <a:endParaRPr lang="fr-FR" sz="1600" dirty="0"/>
+                    </a:p>
+                  </a:txBody>
+                  <a:tcPr anchor="ctr">
+                    <a:solidFill>
+                      <a:schemeClr val="accent6"/>
+                    </a:solidFill>
+                  </a:tcPr>
+                </a:tc>
+                <a:tc>
+                  <a:txBody>
+                    <a:bodyPr/>
+                    <a:lstStyle/>
+                    <a:p>
+                      <a:endParaRPr lang="fr-FR" sz="1600" dirty="0"/>
                     </a:p>
                   </a:txBody>
                   <a:tcPr anchor="ctr">
@@ -35550,6 +35681,240 @@
                   </a:ext>
                 </a:extLst>
               </a:tr>
+              <a:tr h="421410">
+                <a:tc vMerge="1">
+                  <a:txBody>
+                    <a:bodyPr/>
+                    <a:lstStyle/>
+                    <a:p>
+                      <a:pPr marL="0" marR="0" lvl="0" indent="0" algn="ctr" defTabSz="914400" rtl="0" eaLnBrk="1" fontAlgn="auto" latinLnBrk="0" hangingPunct="1">
+                        <a:lnSpc>
+                          <a:spcPct val="100000"/>
+                        </a:lnSpc>
+                        <a:spcBef>
+                          <a:spcPts val="0"/>
+                        </a:spcBef>
+                        <a:spcAft>
+                          <a:spcPts val="0"/>
+                        </a:spcAft>
+                        <a:buClrTx/>
+                        <a:buSzTx/>
+                        <a:buFontTx/>
+                        <a:buNone/>
+                        <a:tabLst/>
+                        <a:defRPr/>
+                      </a:pPr>
+                      <a:endParaRPr lang="fr-FR" dirty="0">
+                        <a:solidFill>
+                          <a:schemeClr val="bg1"/>
+                        </a:solidFill>
+                      </a:endParaRPr>
+                    </a:p>
+                  </a:txBody>
+                  <a:tcPr vert="vert270" anchor="ctr">
+                    <a:solidFill>
+                      <a:schemeClr val="accent1"/>
+                    </a:solidFill>
+                  </a:tcPr>
+                </a:tc>
+                <a:tc>
+                  <a:txBody>
+                    <a:bodyPr/>
+                    <a:lstStyle/>
+                    <a:p>
+                      <a:pPr marL="0" marR="0" lvl="0" indent="0" algn="l" defTabSz="914400" rtl="0" eaLnBrk="1" fontAlgn="auto" latinLnBrk="0" hangingPunct="1">
+                        <a:lnSpc>
+                          <a:spcPct val="100000"/>
+                        </a:lnSpc>
+                        <a:spcBef>
+                          <a:spcPts val="0"/>
+                        </a:spcBef>
+                        <a:spcAft>
+                          <a:spcPts val="0"/>
+                        </a:spcAft>
+                        <a:buClrTx/>
+                        <a:buSzTx/>
+                        <a:buFontTx/>
+                        <a:buNone/>
+                        <a:tabLst/>
+                        <a:defRPr/>
+                      </a:pPr>
+                      <a:r>
+                        <a:rPr lang="fr-FR" sz="1600" dirty="0">
+                          <a:solidFill>
+                            <a:schemeClr val="bg1"/>
+                          </a:solidFill>
+                        </a:rPr>
+                        <a:t>1.2.7.3</a:t>
+                      </a:r>
+                    </a:p>
+                  </a:txBody>
+                  <a:tcPr anchor="ctr">
+                    <a:solidFill>
+                      <a:schemeClr val="accent1"/>
+                    </a:solidFill>
+                  </a:tcPr>
+                </a:tc>
+                <a:tc>
+                  <a:txBody>
+                    <a:bodyPr/>
+                    <a:lstStyle/>
+                    <a:p>
+                      <a:endParaRPr lang="fr-FR" sz="1600" dirty="0"/>
+                    </a:p>
+                  </a:txBody>
+                  <a:tcPr anchor="ctr">
+                    <a:solidFill>
+                      <a:srgbClr val="FFC000"/>
+                    </a:solidFill>
+                  </a:tcPr>
+                </a:tc>
+                <a:tc>
+                  <a:txBody>
+                    <a:bodyPr/>
+                    <a:lstStyle/>
+                    <a:p>
+                      <a:endParaRPr lang="fr-FR" sz="1600" dirty="0"/>
+                    </a:p>
+                  </a:txBody>
+                  <a:tcPr anchor="ctr">
+                    <a:solidFill>
+                      <a:srgbClr val="FFC000"/>
+                    </a:solidFill>
+                  </a:tcPr>
+                </a:tc>
+                <a:tc>
+                  <a:txBody>
+                    <a:bodyPr/>
+                    <a:lstStyle/>
+                    <a:p>
+                      <a:endParaRPr lang="fr-FR" sz="1600" dirty="0"/>
+                    </a:p>
+                  </a:txBody>
+                  <a:tcPr anchor="ctr">
+                    <a:solidFill>
+                      <a:srgbClr val="FFC000"/>
+                    </a:solidFill>
+                  </a:tcPr>
+                </a:tc>
+                <a:tc>
+                  <a:txBody>
+                    <a:bodyPr/>
+                    <a:lstStyle/>
+                    <a:p>
+                      <a:endParaRPr lang="fr-FR" sz="1600" dirty="0"/>
+                    </a:p>
+                  </a:txBody>
+                  <a:tcPr anchor="ctr">
+                    <a:solidFill>
+                      <a:srgbClr val="FFC000"/>
+                    </a:solidFill>
+                  </a:tcPr>
+                </a:tc>
+                <a:tc>
+                  <a:txBody>
+                    <a:bodyPr/>
+                    <a:lstStyle/>
+                    <a:p>
+                      <a:endParaRPr lang="fr-FR" sz="1600" dirty="0"/>
+                    </a:p>
+                  </a:txBody>
+                  <a:tcPr anchor="ctr">
+                    <a:solidFill>
+                      <a:srgbClr val="FFC000"/>
+                    </a:solidFill>
+                  </a:tcPr>
+                </a:tc>
+                <a:tc>
+                  <a:txBody>
+                    <a:bodyPr/>
+                    <a:lstStyle/>
+                    <a:p>
+                      <a:endParaRPr lang="fr-FR" sz="1600" dirty="0"/>
+                    </a:p>
+                  </a:txBody>
+                  <a:tcPr anchor="ctr">
+                    <a:solidFill>
+                      <a:srgbClr val="FFC000"/>
+                    </a:solidFill>
+                  </a:tcPr>
+                </a:tc>
+                <a:tc>
+                  <a:txBody>
+                    <a:bodyPr/>
+                    <a:lstStyle/>
+                    <a:p>
+                      <a:endParaRPr lang="fr-FR" sz="1600" dirty="0"/>
+                    </a:p>
+                  </a:txBody>
+                  <a:tcPr anchor="ctr">
+                    <a:solidFill>
+                      <a:srgbClr val="FFC000"/>
+                    </a:solidFill>
+                  </a:tcPr>
+                </a:tc>
+                <a:tc>
+                  <a:txBody>
+                    <a:bodyPr/>
+                    <a:lstStyle/>
+                    <a:p>
+                      <a:endParaRPr lang="fr-FR" sz="1600" dirty="0"/>
+                    </a:p>
+                  </a:txBody>
+                  <a:tcPr anchor="ctr">
+                    <a:solidFill>
+                      <a:srgbClr val="FFC000"/>
+                    </a:solidFill>
+                  </a:tcPr>
+                </a:tc>
+                <a:tc>
+                  <a:txBody>
+                    <a:bodyPr/>
+                    <a:lstStyle/>
+                    <a:p>
+                      <a:endParaRPr lang="fr-FR" sz="1600" dirty="0"/>
+                    </a:p>
+                  </a:txBody>
+                  <a:tcPr anchor="ctr">
+                    <a:solidFill>
+                      <a:schemeClr val="accent4"/>
+                    </a:solidFill>
+                  </a:tcPr>
+                </a:tc>
+                <a:tc>
+                  <a:txBody>
+                    <a:bodyPr/>
+                    <a:lstStyle/>
+                    <a:p>
+                      <a:endParaRPr lang="fr-FR" sz="1600" dirty="0"/>
+                    </a:p>
+                  </a:txBody>
+                  <a:tcPr anchor="ctr">
+                    <a:solidFill>
+                      <a:schemeClr val="accent4"/>
+                    </a:solidFill>
+                  </a:tcPr>
+                </a:tc>
+                <a:tc>
+                  <a:txBody>
+                    <a:bodyPr/>
+                    <a:lstStyle/>
+                    <a:p>
+                      <a:endParaRPr lang="fr-FR" sz="1600" dirty="0"/>
+                    </a:p>
+                  </a:txBody>
+                  <a:tcPr anchor="ctr">
+                    <a:solidFill>
+                      <a:schemeClr val="accent6"/>
+                    </a:solidFill>
+                  </a:tcPr>
+                </a:tc>
+                <a:extLst>
+                  <a:ext uri="{0D108BD9-81ED-4DB2-BD59-A6C34878D82A}">
+                    <a16:rowId xmlns:a16="http://schemas.microsoft.com/office/drawing/2014/main" val="914924728"/>
+                  </a:ext>
+                </a:extLst>
+              </a:tr>
             </a:tbl>
           </a:graphicData>
         </a:graphic>
@@ -35569,7 +35934,7 @@
           <p:nvPr>
             <p:extLst>
               <p:ext uri="{D42A27DB-BD31-4B8C-83A1-F6EECF244321}">
-                <p14:modId xmlns:p14="http://schemas.microsoft.com/office/powerpoint/2010/main" val="3205101607"/>
+                <p14:modId xmlns:p14="http://schemas.microsoft.com/office/powerpoint/2010/main" val="2606970922"/>
               </p:ext>
             </p:extLst>
           </p:nvPr>
@@ -35635,7 +36000,7 @@
                     <a:lstStyle/>
                     <a:p>
                       <a:r>
-                        <a:rPr lang="fr-FR" sz="1400" i="1" dirty="0"/>
+                        <a:rPr lang="fr-FR" sz="1100" i="1" dirty="0"/>
                         <a:t>Compatible</a:t>
                       </a:r>
                     </a:p>
@@ -35652,7 +36017,7 @@
                     <a:lstStyle/>
                     <a:p>
                       <a:r>
-                        <a:rPr lang="fr-FR" sz="1400" i="1" dirty="0"/>
+                        <a:rPr lang="fr-FR" sz="1100" i="1" dirty="0"/>
                         <a:t>Utilisable mais certaines données peuvent ne pas s’afficher correctement</a:t>
                       </a:r>
                     </a:p>
@@ -35669,7 +36034,7 @@
                     <a:lstStyle/>
                     <a:p>
                       <a:r>
-                        <a:rPr lang="fr-FR" sz="1400" i="1" dirty="0"/>
+                        <a:rPr lang="fr-FR" sz="1100" i="1" dirty="0"/>
                         <a:t>Incompatible</a:t>
                       </a:r>
                     </a:p>
@@ -35766,8 +36131,8 @@
         </p:nvSpPr>
         <p:spPr>
           <a:xfrm>
-            <a:off x="339901" y="2090500"/>
-            <a:ext cx="5153779" cy="1785717"/>
+            <a:off x="339901" y="1719483"/>
+            <a:ext cx="5153779" cy="4664064"/>
           </a:xfrm>
         </p:spPr>
         <p:txBody>
@@ -35778,7 +36143,51 @@
               <a:rPr lang="fr-FR" sz="1200" b="1" dirty="0">
                 <a:latin typeface="Barlow" panose="00000500000000000000" pitchFamily="2" charset="0"/>
               </a:rPr>
-              <a:t>v1.3.0.3 – 03</a:t>
+              <a:t>V1.3.1.0 – 05/2025</a:t>
+            </a:r>
+          </a:p>
+          <a:p>
+            <a:pPr lvl="1">
+              <a:spcBef>
+                <a:spcPts val="0"/>
+              </a:spcBef>
+            </a:pPr>
+            <a:r>
+              <a:rPr lang="fr-FR" sz="1200" dirty="0">
+                <a:latin typeface="Barlow" panose="00000500000000000000" pitchFamily="2" charset="0"/>
+              </a:rPr>
+              <a:t>Prise en charge des équipes mixtes</a:t>
+            </a:r>
+          </a:p>
+          <a:p>
+            <a:pPr lvl="1">
+              <a:spcBef>
+                <a:spcPts val="0"/>
+              </a:spcBef>
+            </a:pPr>
+            <a:r>
+              <a:rPr lang="fr-FR" sz="1200" dirty="0">
+                <a:latin typeface="Barlow" panose="00000500000000000000" pitchFamily="2" charset="0"/>
+              </a:rPr>
+              <a:t>Correction d’anomalies</a:t>
+            </a:r>
+          </a:p>
+          <a:p>
+            <a:pPr lvl="1">
+              <a:spcBef>
+                <a:spcPts val="0"/>
+              </a:spcBef>
+            </a:pPr>
+            <a:endParaRPr lang="fr-FR" sz="1200" b="1" dirty="0">
+              <a:latin typeface="Barlow" panose="00000500000000000000" pitchFamily="2" charset="0"/>
+            </a:endParaRPr>
+          </a:p>
+          <a:p>
+            <a:r>
+              <a:rPr lang="fr-FR" sz="1200" b="1" dirty="0">
+                <a:latin typeface="Barlow" panose="00000500000000000000" pitchFamily="2" charset="0"/>
+              </a:rPr>
+              <a:t>v1.3.0.3 – 03/2025</a:t>
             </a:r>
           </a:p>
           <a:p>
@@ -35828,6 +36237,16 @@
               </a:rPr>
               <a:t>Modification de répertoire de travail par défaut</a:t>
             </a:r>
+          </a:p>
+          <a:p>
+            <a:pPr lvl="1">
+              <a:spcBef>
+                <a:spcPts val="0"/>
+              </a:spcBef>
+            </a:pPr>
+            <a:endParaRPr lang="fr-FR" sz="1200" dirty="0">
+              <a:latin typeface="Barlow" panose="00000500000000000000" pitchFamily="2" charset="0"/>
+            </a:endParaRPr>
           </a:p>
           <a:p>
             <a:r>
@@ -35997,61 +36416,6 @@
               <a:latin typeface="Barlow" panose="00000500000000000000" pitchFamily="2" charset="0"/>
             </a:endParaRPr>
           </a:p>
-          <a:p>
-            <a:r>
-              <a:rPr lang="fr-FR" sz="1200" b="1" dirty="0">
-                <a:latin typeface="Barlow" panose="00000500000000000000" pitchFamily="2" charset="0"/>
-              </a:rPr>
-              <a:t>1.2.0.0 – 06/02/2024</a:t>
-            </a:r>
-          </a:p>
-          <a:p>
-            <a:pPr lvl="1">
-              <a:spcBef>
-                <a:spcPts val="0"/>
-              </a:spcBef>
-            </a:pPr>
-            <a:r>
-              <a:rPr lang="fr-FR" sz="1200" dirty="0">
-                <a:latin typeface="Barlow" panose="00000500000000000000" pitchFamily="2" charset="0"/>
-              </a:rPr>
-              <a:t>Ajout de la gestion de la chambre d'appel</a:t>
-            </a:r>
-          </a:p>
-          <a:p>
-            <a:pPr lvl="1">
-              <a:spcBef>
-                <a:spcPts val="0"/>
-              </a:spcBef>
-            </a:pPr>
-            <a:r>
-              <a:rPr lang="fr-FR" sz="1200" dirty="0">
-                <a:latin typeface="Barlow" panose="00000500000000000000" pitchFamily="2" charset="0"/>
-              </a:rPr>
-              <a:t>Correction graphique</a:t>
-            </a:r>
-          </a:p>
-          <a:p>
-            <a:pPr lvl="1">
-              <a:spcBef>
-                <a:spcPts val="0"/>
-              </a:spcBef>
-            </a:pPr>
-            <a:r>
-              <a:rPr lang="fr-FR" sz="1200" dirty="0">
-                <a:latin typeface="Barlow" panose="00000500000000000000" pitchFamily="2" charset="0"/>
-              </a:rPr>
-              <a:t>Amélioration de l'affichage des pages</a:t>
-            </a:r>
-          </a:p>
-          <a:p>
-            <a:pPr marL="101598" indent="0">
-              <a:buNone/>
-            </a:pPr>
-            <a:endParaRPr lang="fr-FR" sz="1200" b="1" dirty="0">
-              <a:latin typeface="Barlow" panose="00000500000000000000" pitchFamily="2" charset="0"/>
-            </a:endParaRPr>
-          </a:p>
         </p:txBody>
       </p:sp>
       <p:sp>
@@ -36098,8 +36462,8 @@
         </p:nvSpPr>
         <p:spPr>
           <a:xfrm>
-            <a:off x="5833582" y="2090500"/>
-            <a:ext cx="6277729" cy="3787178"/>
+            <a:off x="5833582" y="1508722"/>
+            <a:ext cx="6277729" cy="4368956"/>
           </a:xfrm>
           <a:prstGeom prst="rect">
             <a:avLst/>
@@ -36319,6 +36683,66 @@
               </a:defRPr>
             </a:lvl9pPr>
           </a:lstStyle>
+          <a:p>
+            <a:pPr marL="101598" indent="0">
+              <a:buNone/>
+            </a:pPr>
+            <a:endParaRPr lang="fr-FR" sz="1200" b="1" dirty="0">
+              <a:latin typeface="Barlow" panose="00000500000000000000" pitchFamily="2" charset="0"/>
+            </a:endParaRPr>
+          </a:p>
+          <a:p>
+            <a:r>
+              <a:rPr lang="fr-FR" sz="1200" b="1" dirty="0">
+                <a:latin typeface="Barlow" panose="00000500000000000000" pitchFamily="2" charset="0"/>
+              </a:rPr>
+              <a:t>1.2.0.0 – 06/02/2024</a:t>
+            </a:r>
+          </a:p>
+          <a:p>
+            <a:pPr lvl="1">
+              <a:spcBef>
+                <a:spcPts val="0"/>
+              </a:spcBef>
+            </a:pPr>
+            <a:r>
+              <a:rPr lang="fr-FR" sz="1200" dirty="0">
+                <a:latin typeface="Barlow" panose="00000500000000000000" pitchFamily="2" charset="0"/>
+              </a:rPr>
+              <a:t>Ajout de la gestion de la chambre d'appel</a:t>
+            </a:r>
+          </a:p>
+          <a:p>
+            <a:pPr lvl="1">
+              <a:spcBef>
+                <a:spcPts val="0"/>
+              </a:spcBef>
+            </a:pPr>
+            <a:r>
+              <a:rPr lang="fr-FR" sz="1200" dirty="0">
+                <a:latin typeface="Barlow" panose="00000500000000000000" pitchFamily="2" charset="0"/>
+              </a:rPr>
+              <a:t>Correction graphique</a:t>
+            </a:r>
+          </a:p>
+          <a:p>
+            <a:pPr lvl="1">
+              <a:spcBef>
+                <a:spcPts val="0"/>
+              </a:spcBef>
+            </a:pPr>
+            <a:r>
+              <a:rPr lang="fr-FR" sz="1200" dirty="0">
+                <a:latin typeface="Barlow" panose="00000500000000000000" pitchFamily="2" charset="0"/>
+              </a:rPr>
+              <a:t>Amélioration de l'affichage des pages</a:t>
+            </a:r>
+          </a:p>
+          <a:p>
+            <a:endParaRPr lang="fr-FR" sz="1200" b="1" dirty="0">
+              <a:latin typeface="Barlow" panose="00000500000000000000" pitchFamily="2" charset="0"/>
+            </a:endParaRPr>
+          </a:p>
           <a:p>
             <a:r>
               <a:rPr lang="fr-FR" sz="1200" b="1" dirty="0">
@@ -46550,6 +46974,17 @@
 </file>
 
 <file path=customXml/item1.xml><?xml version="1.0" encoding="utf-8"?>
+<p:properties xmlns:p="http://schemas.microsoft.com/office/2006/metadata/properties" xmlns:xsi="http://www.w3.org/2001/XMLSchema-instance" xmlns:pc="http://schemas.microsoft.com/office/infopath/2007/PartnerControls">
+  <documentManagement>
+    <TaxCatchAll xmlns="5d7a3535-6ccc-4381-989f-ae061031b78e" xsi:nil="true"/>
+    <lcf76f155ced4ddcb4097134ff3c332f xmlns="f9bf1094-3609-4046-a6fd-76c9c0caa714">
+      <Terms xmlns="http://schemas.microsoft.com/office/infopath/2007/PartnerControls"/>
+    </lcf76f155ced4ddcb4097134ff3c332f>
+  </documentManagement>
+</p:properties>
+</file>
+
+<file path=customXml/item2.xml><?xml version="1.0" encoding="utf-8"?>
 <ct:contentTypeSchema xmlns:ct="http://schemas.microsoft.com/office/2006/metadata/contentType" xmlns:ma="http://schemas.microsoft.com/office/2006/metadata/properties/metaAttributes" ct:_="" ma:_="" ma:contentTypeName="Document" ma:contentTypeID="0x01010094D69007D53E474D873D1C4BCA1E8F18" ma:contentTypeVersion="15" ma:contentTypeDescription="Crée un document." ma:contentTypeScope="" ma:versionID="b94b5753296409f7397b66632584fdb0">
   <xsd:schema xmlns:xsd="http://www.w3.org/2001/XMLSchema" xmlns:xs="http://www.w3.org/2001/XMLSchema" xmlns:p="http://schemas.microsoft.com/office/2006/metadata/properties" xmlns:ns2="f9bf1094-3609-4046-a6fd-76c9c0caa714" xmlns:ns3="5d7a3535-6ccc-4381-989f-ae061031b78e" targetNamespace="http://schemas.microsoft.com/office/2006/metadata/properties" ma:root="true" ma:fieldsID="fee6db9217be9a70816f6107f4b0cedb" ns2:_="" ns3:_="">
     <xsd:import namespace="f9bf1094-3609-4046-a6fd-76c9c0caa714"/>
@@ -46778,7 +47213,7 @@
 </ct:contentTypeSchema>
 </file>
 
-<file path=customXml/item2.xml><?xml version="1.0" encoding="utf-8"?>
+<file path=customXml/item3.xml><?xml version="1.0" encoding="utf-8"?>
 <?mso-contentType ?>
 <FormTemplates xmlns="http://schemas.microsoft.com/sharepoint/v3/contenttype/forms">
   <Display>DocumentLibraryForm</Display>
@@ -46787,18 +47222,24 @@
 </FormTemplates>
 </file>
 
-<file path=customXml/item3.xml><?xml version="1.0" encoding="utf-8"?>
-<p:properties xmlns:p="http://schemas.microsoft.com/office/2006/metadata/properties" xmlns:xsi="http://www.w3.org/2001/XMLSchema-instance" xmlns:pc="http://schemas.microsoft.com/office/infopath/2007/PartnerControls">
-  <documentManagement>
-    <TaxCatchAll xmlns="5d7a3535-6ccc-4381-989f-ae061031b78e" xsi:nil="true"/>
-    <lcf76f155ced4ddcb4097134ff3c332f xmlns="f9bf1094-3609-4046-a6fd-76c9c0caa714">
-      <Terms xmlns="http://schemas.microsoft.com/office/infopath/2007/PartnerControls"/>
-    </lcf76f155ced4ddcb4097134ff3c332f>
-  </documentManagement>
-</p:properties>
+<file path=customXml/itemProps1.xml><?xml version="1.0" encoding="utf-8"?>
+<ds:datastoreItem xmlns:ds="http://schemas.openxmlformats.org/officeDocument/2006/customXml" ds:itemID="{A397F285-9F9C-4CEA-8DC8-CF9392934C5A}">
+  <ds:schemaRefs>
+    <ds:schemaRef ds:uri="http://purl.org/dc/terms/"/>
+    <ds:schemaRef ds:uri="http://purl.org/dc/dcmitype/"/>
+    <ds:schemaRef ds:uri="http://www.w3.org/XML/1998/namespace"/>
+    <ds:schemaRef ds:uri="http://schemas.microsoft.com/office/2006/documentManagement/types"/>
+    <ds:schemaRef ds:uri="http://schemas.openxmlformats.org/package/2006/metadata/core-properties"/>
+    <ds:schemaRef ds:uri="http://schemas.microsoft.com/office/infopath/2007/PartnerControls"/>
+    <ds:schemaRef ds:uri="f9bf1094-3609-4046-a6fd-76c9c0caa714"/>
+    <ds:schemaRef ds:uri="http://schemas.microsoft.com/office/2006/metadata/properties"/>
+    <ds:schemaRef ds:uri="5d7a3535-6ccc-4381-989f-ae061031b78e"/>
+    <ds:schemaRef ds:uri="http://purl.org/dc/elements/1.1/"/>
+  </ds:schemaRefs>
+</ds:datastoreItem>
 </file>
 
-<file path=customXml/itemProps1.xml><?xml version="1.0" encoding="utf-8"?>
+<file path=customXml/itemProps2.xml><?xml version="1.0" encoding="utf-8"?>
 <ds:datastoreItem xmlns:ds="http://schemas.openxmlformats.org/officeDocument/2006/customXml" ds:itemID="{A23C0DE2-5723-4EBE-BB67-CD0D7BAFEF27}">
   <ds:schemaRefs>
     <ds:schemaRef ds:uri="http://schemas.microsoft.com/office/2006/metadata/contentType"/>
@@ -46817,27 +47258,10 @@
 </ds:datastoreItem>
 </file>
 
-<file path=customXml/itemProps2.xml><?xml version="1.0" encoding="utf-8"?>
+<file path=customXml/itemProps3.xml><?xml version="1.0" encoding="utf-8"?>
 <ds:datastoreItem xmlns:ds="http://schemas.openxmlformats.org/officeDocument/2006/customXml" ds:itemID="{37867E26-7D2E-4C08-8937-A5EDA2DC982A}">
   <ds:schemaRefs>
     <ds:schemaRef ds:uri="http://schemas.microsoft.com/sharepoint/v3/contenttype/forms"/>
   </ds:schemaRefs>
 </ds:datastoreItem>
-</file>
-
-<file path=customXml/itemProps3.xml><?xml version="1.0" encoding="utf-8"?>
-<ds:datastoreItem xmlns:ds="http://schemas.openxmlformats.org/officeDocument/2006/customXml" ds:itemID="{A397F285-9F9C-4CEA-8DC8-CF9392934C5A}">
-  <ds:schemaRefs>
-    <ds:schemaRef ds:uri="http://purl.org/dc/terms/"/>
-    <ds:schemaRef ds:uri="http://purl.org/dc/dcmitype/"/>
-    <ds:schemaRef ds:uri="http://www.w3.org/XML/1998/namespace"/>
-    <ds:schemaRef ds:uri="http://schemas.microsoft.com/office/2006/documentManagement/types"/>
-    <ds:schemaRef ds:uri="http://schemas.openxmlformats.org/package/2006/metadata/core-properties"/>
-    <ds:schemaRef ds:uri="http://schemas.microsoft.com/office/infopath/2007/PartnerControls"/>
-    <ds:schemaRef ds:uri="f9bf1094-3609-4046-a6fd-76c9c0caa714"/>
-    <ds:schemaRef ds:uri="http://schemas.microsoft.com/office/2006/metadata/properties"/>
-    <ds:schemaRef ds:uri="5d7a3535-6ccc-4381-989f-ae061031b78e"/>
-    <ds:schemaRef ds:uri="http://purl.org/dc/elements/1.1/"/>
-  </ds:schemaRefs>
-</ds:datastoreItem>
 </file>
</xml_diff>